<commit_message>
First updates of deck
</commit_message>
<xml_diff>
--- a/pres_deck.pptx
+++ b/pres_deck.pptx
@@ -6,6 +6,12 @@
   </p:sldMasterIdLst>
   <p:sldIdLst>
     <p:sldId id="256" r:id="rId2"/>
+    <p:sldId id="257" r:id="rId3"/>
+    <p:sldId id="258" r:id="rId4"/>
+    <p:sldId id="259" r:id="rId5"/>
+    <p:sldId id="260" r:id="rId6"/>
+    <p:sldId id="262" r:id="rId7"/>
+    <p:sldId id="261" r:id="rId8"/>
   </p:sldIdLst>
   <p:sldSz cx="12192000" cy="6858000"/>
   <p:notesSz cx="6858000" cy="9144000"/>
@@ -104,6 +110,11 @@
       </a:defRPr>
     </a:lvl9pPr>
   </p:defaultTextStyle>
+  <p:extLst>
+    <p:ext uri="{EFAFB233-063F-42B5-8137-9DF3F51BA10A}">
+      <p15:sldGuideLst xmlns:p15="http://schemas.microsoft.com/office/powerpoint/2012/main"/>
+    </p:ext>
+  </p:extLst>
 </p:presentation>
 </file>
 
@@ -254,7 +265,7 @@
           <a:p>
             <a:fld id="{6A2BB79C-6BB1-4438-8F46-9EDF1954807C}" type="datetimeFigureOut">
               <a:rPr lang="en-US" smtClean="0"/>
-              <a:t>8/31/2018</a:t>
+              <a:t>9/12/2018</a:t>
             </a:fld>
             <a:endParaRPr lang="en-US"/>
           </a:p>
@@ -452,7 +463,7 @@
           <a:p>
             <a:fld id="{6A2BB79C-6BB1-4438-8F46-9EDF1954807C}" type="datetimeFigureOut">
               <a:rPr lang="en-US" smtClean="0"/>
-              <a:t>8/31/2018</a:t>
+              <a:t>9/12/2018</a:t>
             </a:fld>
             <a:endParaRPr lang="en-US"/>
           </a:p>
@@ -660,7 +671,7 @@
           <a:p>
             <a:fld id="{6A2BB79C-6BB1-4438-8F46-9EDF1954807C}" type="datetimeFigureOut">
               <a:rPr lang="en-US" smtClean="0"/>
-              <a:t>8/31/2018</a:t>
+              <a:t>9/12/2018</a:t>
             </a:fld>
             <a:endParaRPr lang="en-US"/>
           </a:p>
@@ -858,7 +869,7 @@
           <a:p>
             <a:fld id="{6A2BB79C-6BB1-4438-8F46-9EDF1954807C}" type="datetimeFigureOut">
               <a:rPr lang="en-US" smtClean="0"/>
-              <a:t>8/31/2018</a:t>
+              <a:t>9/12/2018</a:t>
             </a:fld>
             <a:endParaRPr lang="en-US"/>
           </a:p>
@@ -1133,7 +1144,7 @@
           <a:p>
             <a:fld id="{6A2BB79C-6BB1-4438-8F46-9EDF1954807C}" type="datetimeFigureOut">
               <a:rPr lang="en-US" smtClean="0"/>
-              <a:t>8/31/2018</a:t>
+              <a:t>9/12/2018</a:t>
             </a:fld>
             <a:endParaRPr lang="en-US"/>
           </a:p>
@@ -1398,7 +1409,7 @@
           <a:p>
             <a:fld id="{6A2BB79C-6BB1-4438-8F46-9EDF1954807C}" type="datetimeFigureOut">
               <a:rPr lang="en-US" smtClean="0"/>
-              <a:t>8/31/2018</a:t>
+              <a:t>9/12/2018</a:t>
             </a:fld>
             <a:endParaRPr lang="en-US"/>
           </a:p>
@@ -1810,7 +1821,7 @@
           <a:p>
             <a:fld id="{6A2BB79C-6BB1-4438-8F46-9EDF1954807C}" type="datetimeFigureOut">
               <a:rPr lang="en-US" smtClean="0"/>
-              <a:t>8/31/2018</a:t>
+              <a:t>9/12/2018</a:t>
             </a:fld>
             <a:endParaRPr lang="en-US"/>
           </a:p>
@@ -1951,7 +1962,7 @@
           <a:p>
             <a:fld id="{6A2BB79C-6BB1-4438-8F46-9EDF1954807C}" type="datetimeFigureOut">
               <a:rPr lang="en-US" smtClean="0"/>
-              <a:t>8/31/2018</a:t>
+              <a:t>9/12/2018</a:t>
             </a:fld>
             <a:endParaRPr lang="en-US"/>
           </a:p>
@@ -2064,7 +2075,7 @@
           <a:p>
             <a:fld id="{6A2BB79C-6BB1-4438-8F46-9EDF1954807C}" type="datetimeFigureOut">
               <a:rPr lang="en-US" smtClean="0"/>
-              <a:t>8/31/2018</a:t>
+              <a:t>9/12/2018</a:t>
             </a:fld>
             <a:endParaRPr lang="en-US"/>
           </a:p>
@@ -2375,7 +2386,7 @@
           <a:p>
             <a:fld id="{6A2BB79C-6BB1-4438-8F46-9EDF1954807C}" type="datetimeFigureOut">
               <a:rPr lang="en-US" smtClean="0"/>
-              <a:t>8/31/2018</a:t>
+              <a:t>9/12/2018</a:t>
             </a:fld>
             <a:endParaRPr lang="en-US"/>
           </a:p>
@@ -2663,7 +2674,7 @@
           <a:p>
             <a:fld id="{6A2BB79C-6BB1-4438-8F46-9EDF1954807C}" type="datetimeFigureOut">
               <a:rPr lang="en-US" smtClean="0"/>
-              <a:t>8/31/2018</a:t>
+              <a:t>9/12/2018</a:t>
             </a:fld>
             <a:endParaRPr lang="en-US"/>
           </a:p>
@@ -2904,7 +2915,7 @@
           <a:p>
             <a:fld id="{6A2BB79C-6BB1-4438-8F46-9EDF1954807C}" type="datetimeFigureOut">
               <a:rPr lang="en-US" smtClean="0"/>
-              <a:t>8/31/2018</a:t>
+              <a:t>9/12/2018</a:t>
             </a:fld>
             <a:endParaRPr lang="en-US"/>
           </a:p>
@@ -3337,12 +3348,37 @@
             <p:ph type="ctrTitle"/>
           </p:nvPr>
         </p:nvSpPr>
-        <p:spPr/>
-        <p:txBody>
-          <a:bodyPr/>
-          <a:lstStyle/>
-          <a:p>
-            <a:endParaRPr lang="en-US"/>
+        <p:spPr>
+          <a:xfrm>
+            <a:off x="914400" y="457200"/>
+            <a:ext cx="10972800" cy="3200400"/>
+          </a:xfrm>
+        </p:spPr>
+        <p:txBody>
+          <a:bodyPr>
+            <a:normAutofit/>
+          </a:bodyPr>
+          <a:lstStyle/>
+          <a:p>
+            <a:pPr algn="l"/>
+            <a:r>
+              <a:rPr lang="en-US" dirty="0"/>
+              <a:t>Coming to a</a:t>
+            </a:r>
+            <a:br>
+              <a:rPr lang="en-US" dirty="0"/>
+            </a:br>
+            <a:r>
+              <a:rPr lang="en-US" dirty="0"/>
+              <a:t>Computing</a:t>
+            </a:r>
+            <a:br>
+              <a:rPr lang="en-US" dirty="0"/>
+            </a:br>
+            <a:r>
+              <a:rPr lang="en-US" dirty="0"/>
+              <a:t>Consensus</a:t>
+            </a:r>
           </a:p>
         </p:txBody>
       </p:sp>
@@ -3362,12 +3398,133 @@
             <p:ph type="subTitle" idx="1"/>
           </p:nvPr>
         </p:nvSpPr>
-        <p:spPr/>
-        <p:txBody>
-          <a:bodyPr/>
-          <a:lstStyle/>
-          <a:p>
-            <a:endParaRPr lang="en-US"/>
+        <p:spPr>
+          <a:xfrm>
+            <a:off x="914400" y="3657599"/>
+            <a:ext cx="10972800" cy="2743200"/>
+          </a:xfrm>
+        </p:spPr>
+        <p:txBody>
+          <a:bodyPr/>
+          <a:lstStyle/>
+          <a:p>
+            <a:pPr algn="l"/>
+            <a:r>
+              <a:rPr lang="en-US" dirty="0">
+                <a:solidFill>
+                  <a:schemeClr val="bg1">
+                    <a:lumMod val="50000"/>
+                  </a:schemeClr>
+                </a:solidFill>
+              </a:rPr>
+              <a:t>Braeden Van Deynze, Christie </a:t>
+            </a:r>
+            <a:r>
+              <a:rPr lang="en-US" dirty="0" err="1">
+                <a:solidFill>
+                  <a:schemeClr val="bg1">
+                    <a:lumMod val="50000"/>
+                  </a:schemeClr>
+                </a:solidFill>
+              </a:rPr>
+              <a:t>Bahlai</a:t>
+            </a:r>
+            <a:r>
+              <a:rPr lang="en-US" dirty="0">
+                <a:solidFill>
+                  <a:schemeClr val="bg1">
+                    <a:lumMod val="50000"/>
+                  </a:schemeClr>
+                </a:solidFill>
+              </a:rPr>
+              <a:t>, Chad </a:t>
+            </a:r>
+            <a:r>
+              <a:rPr lang="en-US" dirty="0" err="1">
+                <a:solidFill>
+                  <a:schemeClr val="bg1">
+                    <a:lumMod val="50000"/>
+                  </a:schemeClr>
+                </a:solidFill>
+              </a:rPr>
+              <a:t>Zirbel</a:t>
+            </a:r>
+            <a:endParaRPr lang="en-US" dirty="0">
+              <a:solidFill>
+                <a:schemeClr val="bg1">
+                  <a:lumMod val="50000"/>
+                </a:schemeClr>
+              </a:solidFill>
+            </a:endParaRPr>
+          </a:p>
+          <a:p>
+            <a:pPr algn="l"/>
+            <a:r>
+              <a:rPr lang="en-US" dirty="0">
+                <a:solidFill>
+                  <a:schemeClr val="bg1">
+                    <a:lumMod val="50000"/>
+                  </a:schemeClr>
+                </a:solidFill>
+              </a:rPr>
+              <a:t>LTER All Scientists’ Meeting 2018</a:t>
+            </a:r>
+          </a:p>
+          <a:p>
+            <a:pPr algn="l"/>
+            <a:r>
+              <a:rPr lang="en-US" dirty="0">
+                <a:solidFill>
+                  <a:schemeClr val="bg1">
+                    <a:lumMod val="50000"/>
+                  </a:schemeClr>
+                </a:solidFill>
+              </a:rPr>
+              <a:t>October 2</a:t>
+            </a:r>
+            <a:r>
+              <a:rPr lang="en-US" baseline="30000" dirty="0">
+                <a:solidFill>
+                  <a:schemeClr val="bg1">
+                    <a:lumMod val="50000"/>
+                  </a:schemeClr>
+                </a:solidFill>
+              </a:rPr>
+              <a:t>nd</a:t>
+            </a:r>
+            <a:r>
+              <a:rPr lang="en-US" dirty="0">
+                <a:solidFill>
+                  <a:schemeClr val="bg1">
+                    <a:lumMod val="50000"/>
+                  </a:schemeClr>
+                </a:solidFill>
+              </a:rPr>
+              <a:t>, 2018</a:t>
+            </a:r>
+          </a:p>
+          <a:p>
+            <a:pPr algn="l"/>
+            <a:r>
+              <a:rPr lang="en-US" dirty="0">
+                <a:solidFill>
+                  <a:schemeClr val="bg1">
+                    <a:lumMod val="50000"/>
+                  </a:schemeClr>
+                </a:solidFill>
+              </a:rPr>
+              <a:t>Pacific Grove, CA</a:t>
+            </a:r>
+          </a:p>
+          <a:p>
+            <a:pPr algn="l"/>
+            <a:endParaRPr lang="en-US" dirty="0">
+              <a:solidFill>
+                <a:schemeClr val="bg1">
+                  <a:lumMod val="50000"/>
+                </a:schemeClr>
+              </a:solidFill>
+            </a:endParaRPr>
           </a:p>
         </p:txBody>
       </p:sp>
@@ -3375,6 +3532,1045 @@
     <p:extLst>
       <p:ext uri="{BB962C8B-B14F-4D97-AF65-F5344CB8AC3E}">
         <p14:creationId xmlns:p14="http://schemas.microsoft.com/office/powerpoint/2010/main" val="2897198287"/>
+      </p:ext>
+    </p:extLst>
+  </p:cSld>
+  <p:clrMapOvr>
+    <a:masterClrMapping/>
+  </p:clrMapOvr>
+</p:sld>
+</file>
+
+<file path=ppt/slides/slide2.xml><?xml version="1.0" encoding="utf-8"?>
+<p:sld xmlns:a="http://schemas.openxmlformats.org/drawingml/2006/main" xmlns:r="http://schemas.openxmlformats.org/officeDocument/2006/relationships" xmlns:p="http://schemas.openxmlformats.org/presentationml/2006/main">
+  <p:cSld>
+    <p:spTree>
+      <p:nvGrpSpPr>
+        <p:cNvPr id="1" name=""/>
+        <p:cNvGrpSpPr/>
+        <p:nvPr/>
+      </p:nvGrpSpPr>
+      <p:grpSpPr>
+        <a:xfrm>
+          <a:off x="0" y="0"/>
+          <a:ext cx="0" cy="0"/>
+          <a:chOff x="0" y="0"/>
+          <a:chExt cx="0" cy="0"/>
+        </a:xfrm>
+      </p:grpSpPr>
+      <p:sp>
+        <p:nvSpPr>
+          <p:cNvPr id="2" name="Title 1">
+            <a:extLst>
+              <a:ext uri="{FF2B5EF4-FFF2-40B4-BE49-F238E27FC236}">
+                <a16:creationId xmlns:a16="http://schemas.microsoft.com/office/drawing/2014/main" id="{FC728CB8-3F1B-454E-96D3-68869D4E7D48}"/>
+              </a:ext>
+            </a:extLst>
+          </p:cNvPr>
+          <p:cNvSpPr>
+            <a:spLocks noGrp="1"/>
+          </p:cNvSpPr>
+          <p:nvPr>
+            <p:ph type="title"/>
+          </p:nvPr>
+        </p:nvSpPr>
+        <p:spPr/>
+        <p:txBody>
+          <a:bodyPr/>
+          <a:lstStyle/>
+          <a:p>
+            <a:r>
+              <a:rPr lang="en-US" dirty="0"/>
+              <a:t>Who We Are</a:t>
+            </a:r>
+          </a:p>
+        </p:txBody>
+      </p:sp>
+      <p:grpSp>
+        <p:nvGrpSpPr>
+          <p:cNvPr id="7" name="Group 6">
+            <a:extLst>
+              <a:ext uri="{FF2B5EF4-FFF2-40B4-BE49-F238E27FC236}">
+                <a16:creationId xmlns:a16="http://schemas.microsoft.com/office/drawing/2014/main" id="{8C951786-5BB8-4E28-B088-FA77705DC431}"/>
+              </a:ext>
+            </a:extLst>
+          </p:cNvPr>
+          <p:cNvGrpSpPr/>
+          <p:nvPr/>
+        </p:nvGrpSpPr>
+        <p:grpSpPr>
+          <a:xfrm>
+            <a:off x="4800600" y="1828800"/>
+            <a:ext cx="2286000" cy="4114800"/>
+            <a:chOff x="5000625" y="1400176"/>
+            <a:chExt cx="2286000" cy="4114800"/>
+          </a:xfrm>
+        </p:grpSpPr>
+        <p:pic>
+          <p:nvPicPr>
+            <p:cNvPr id="1028" name="Picture 4" descr="https://avatars3.githubusercontent.com/u/7469265?s=460&amp;v=4">
+              <a:extLst>
+                <a:ext uri="{FF2B5EF4-FFF2-40B4-BE49-F238E27FC236}">
+                  <a16:creationId xmlns:a16="http://schemas.microsoft.com/office/drawing/2014/main" id="{6C6E998C-285D-49D5-9AC3-F4F886068A19}"/>
+                </a:ext>
+              </a:extLst>
+            </p:cNvPr>
+            <p:cNvPicPr>
+              <a:picLocks noChangeAspect="1" noChangeArrowheads="1"/>
+            </p:cNvPicPr>
+            <p:nvPr/>
+          </p:nvPicPr>
+          <p:blipFill>
+            <a:blip r:embed="rId2">
+              <a:extLst>
+                <a:ext uri="{28A0092B-C50C-407E-A947-70E740481C1C}">
+                  <a14:useLocalDpi xmlns:a14="http://schemas.microsoft.com/office/drawing/2010/main" val="0"/>
+                </a:ext>
+              </a:extLst>
+            </a:blip>
+            <a:srcRect/>
+            <a:stretch>
+              <a:fillRect/>
+            </a:stretch>
+          </p:blipFill>
+          <p:spPr bwMode="auto">
+            <a:xfrm>
+              <a:off x="5000625" y="1400176"/>
+              <a:ext cx="2286000" cy="2286000"/>
+            </a:xfrm>
+            <a:prstGeom prst="rect">
+              <a:avLst/>
+            </a:prstGeom>
+            <a:noFill/>
+            <a:extLst>
+              <a:ext uri="{909E8E84-426E-40DD-AFC4-6F175D3DCCD1}">
+                <a14:hiddenFill xmlns:a14="http://schemas.microsoft.com/office/drawing/2010/main">
+                  <a:solidFill>
+                    <a:srgbClr val="FFFFFF"/>
+                  </a:solidFill>
+                </a14:hiddenFill>
+              </a:ext>
+            </a:extLst>
+          </p:spPr>
+        </p:pic>
+        <p:sp>
+          <p:nvSpPr>
+            <p:cNvPr id="9" name="TextBox 8">
+              <a:extLst>
+                <a:ext uri="{FF2B5EF4-FFF2-40B4-BE49-F238E27FC236}">
+                  <a16:creationId xmlns:a16="http://schemas.microsoft.com/office/drawing/2014/main" id="{E433AD24-DE76-413C-9AD8-2DF076A852D8}"/>
+                </a:ext>
+              </a:extLst>
+            </p:cNvPr>
+            <p:cNvSpPr txBox="1"/>
+            <p:nvPr/>
+          </p:nvSpPr>
+          <p:spPr>
+            <a:xfrm>
+              <a:off x="5000625" y="3686176"/>
+              <a:ext cx="2286000" cy="1828800"/>
+            </a:xfrm>
+            <a:prstGeom prst="rect">
+              <a:avLst/>
+            </a:prstGeom>
+            <a:noFill/>
+            <a:ln>
+              <a:noFill/>
+            </a:ln>
+          </p:spPr>
+          <p:txBody>
+            <a:bodyPr wrap="square" rtlCol="0">
+              <a:noAutofit/>
+            </a:bodyPr>
+            <a:lstStyle/>
+            <a:p>
+              <a:r>
+                <a:rPr lang="en-US" b="1" dirty="0"/>
+                <a:t>Christie </a:t>
+              </a:r>
+              <a:r>
+                <a:rPr lang="en-US" b="1" dirty="0" err="1"/>
+                <a:t>Bahlai</a:t>
+              </a:r>
+              <a:endParaRPr lang="en-US" b="1" dirty="0"/>
+            </a:p>
+            <a:p>
+              <a:r>
+                <a:rPr lang="en-US" dirty="0"/>
+                <a:t>Asst. Professor</a:t>
+              </a:r>
+            </a:p>
+            <a:p>
+              <a:r>
+                <a:rPr lang="en-US" dirty="0"/>
+                <a:t>Kent State</a:t>
+              </a:r>
+            </a:p>
+          </p:txBody>
+        </p:sp>
+      </p:grpSp>
+      <p:grpSp>
+        <p:nvGrpSpPr>
+          <p:cNvPr id="8" name="Group 7">
+            <a:extLst>
+              <a:ext uri="{FF2B5EF4-FFF2-40B4-BE49-F238E27FC236}">
+                <a16:creationId xmlns:a16="http://schemas.microsoft.com/office/drawing/2014/main" id="{BB23CFF0-C441-470C-9270-3371D3A5785F}"/>
+              </a:ext>
+            </a:extLst>
+          </p:cNvPr>
+          <p:cNvGrpSpPr/>
+          <p:nvPr/>
+        </p:nvGrpSpPr>
+        <p:grpSpPr>
+          <a:xfrm>
+            <a:off x="1097280" y="1828800"/>
+            <a:ext cx="2286000" cy="4114800"/>
+            <a:chOff x="1085850" y="1690688"/>
+            <a:chExt cx="2286000" cy="4114800"/>
+          </a:xfrm>
+        </p:grpSpPr>
+        <p:pic>
+          <p:nvPicPr>
+            <p:cNvPr id="1026" name="Picture 2" descr="https://avatars1.githubusercontent.com/u/25036622?s=400&amp;u=8c1ddb69439989307c3b662ea96424dc85e9fd6d&amp;v=4">
+              <a:extLst>
+                <a:ext uri="{FF2B5EF4-FFF2-40B4-BE49-F238E27FC236}">
+                  <a16:creationId xmlns:a16="http://schemas.microsoft.com/office/drawing/2014/main" id="{A9CD0541-F744-4C8D-A98C-B4E978D43A50}"/>
+                </a:ext>
+              </a:extLst>
+            </p:cNvPr>
+            <p:cNvPicPr>
+              <a:picLocks noChangeAspect="1" noChangeArrowheads="1"/>
+            </p:cNvPicPr>
+            <p:nvPr/>
+          </p:nvPicPr>
+          <p:blipFill>
+            <a:blip r:embed="rId3">
+              <a:extLst>
+                <a:ext uri="{28A0092B-C50C-407E-A947-70E740481C1C}">
+                  <a14:useLocalDpi xmlns:a14="http://schemas.microsoft.com/office/drawing/2010/main" val="0"/>
+                </a:ext>
+              </a:extLst>
+            </a:blip>
+            <a:srcRect/>
+            <a:stretch>
+              <a:fillRect/>
+            </a:stretch>
+          </p:blipFill>
+          <p:spPr bwMode="auto">
+            <a:xfrm>
+              <a:off x="1085850" y="1690688"/>
+              <a:ext cx="2286000" cy="2286000"/>
+            </a:xfrm>
+            <a:prstGeom prst="rect">
+              <a:avLst/>
+            </a:prstGeom>
+            <a:noFill/>
+            <a:extLst>
+              <a:ext uri="{909E8E84-426E-40DD-AFC4-6F175D3DCCD1}">
+                <a14:hiddenFill xmlns:a14="http://schemas.microsoft.com/office/drawing/2010/main">
+                  <a:solidFill>
+                    <a:srgbClr val="FFFFFF"/>
+                  </a:solidFill>
+                </a14:hiddenFill>
+              </a:ext>
+            </a:extLst>
+          </p:spPr>
+        </p:pic>
+        <p:sp>
+          <p:nvSpPr>
+            <p:cNvPr id="5" name="TextBox 4">
+              <a:extLst>
+                <a:ext uri="{FF2B5EF4-FFF2-40B4-BE49-F238E27FC236}">
+                  <a16:creationId xmlns:a16="http://schemas.microsoft.com/office/drawing/2014/main" id="{A6FC68F9-42DF-4EE9-B259-3D02C5A156AA}"/>
+                </a:ext>
+              </a:extLst>
+            </p:cNvPr>
+            <p:cNvSpPr txBox="1"/>
+            <p:nvPr/>
+          </p:nvSpPr>
+          <p:spPr>
+            <a:xfrm>
+              <a:off x="1085850" y="3976688"/>
+              <a:ext cx="2286000" cy="1828800"/>
+            </a:xfrm>
+            <a:prstGeom prst="rect">
+              <a:avLst/>
+            </a:prstGeom>
+            <a:noFill/>
+            <a:ln>
+              <a:noFill/>
+            </a:ln>
+          </p:spPr>
+          <p:txBody>
+            <a:bodyPr wrap="square" rtlCol="0">
+              <a:noAutofit/>
+            </a:bodyPr>
+            <a:lstStyle/>
+            <a:p>
+              <a:r>
+                <a:rPr lang="en-US" b="1" dirty="0"/>
+                <a:t>Braeden Van Deynze</a:t>
+              </a:r>
+            </a:p>
+            <a:p>
+              <a:r>
+                <a:rPr lang="en-US" dirty="0"/>
+                <a:t>Grad Student</a:t>
+              </a:r>
+            </a:p>
+            <a:p>
+              <a:r>
+                <a:rPr lang="en-US" dirty="0"/>
+                <a:t>Michigan State</a:t>
+              </a:r>
+            </a:p>
+          </p:txBody>
+        </p:sp>
+      </p:grpSp>
+      <p:grpSp>
+        <p:nvGrpSpPr>
+          <p:cNvPr id="11" name="Group 10">
+            <a:extLst>
+              <a:ext uri="{FF2B5EF4-FFF2-40B4-BE49-F238E27FC236}">
+                <a16:creationId xmlns:a16="http://schemas.microsoft.com/office/drawing/2014/main" id="{4AF0F817-0BFE-4AEF-82F8-5EE27CFE6AAD}"/>
+              </a:ext>
+            </a:extLst>
+          </p:cNvPr>
+          <p:cNvGrpSpPr/>
+          <p:nvPr/>
+        </p:nvGrpSpPr>
+        <p:grpSpPr>
+          <a:xfrm>
+            <a:off x="8595360" y="1828800"/>
+            <a:ext cx="2286000" cy="4114800"/>
+            <a:chOff x="8486535" y="1545432"/>
+            <a:chExt cx="2286000" cy="4114800"/>
+          </a:xfrm>
+        </p:grpSpPr>
+        <p:pic>
+          <p:nvPicPr>
+            <p:cNvPr id="1030" name="Picture 6" descr="https://avatars2.githubusercontent.com/u/25037010?s=460&amp;v=4">
+              <a:extLst>
+                <a:ext uri="{FF2B5EF4-FFF2-40B4-BE49-F238E27FC236}">
+                  <a16:creationId xmlns:a16="http://schemas.microsoft.com/office/drawing/2014/main" id="{08D4249F-FC99-4244-B4B1-B952F32D5832}"/>
+                </a:ext>
+              </a:extLst>
+            </p:cNvPr>
+            <p:cNvPicPr>
+              <a:picLocks noChangeAspect="1" noChangeArrowheads="1"/>
+            </p:cNvPicPr>
+            <p:nvPr/>
+          </p:nvPicPr>
+          <p:blipFill>
+            <a:blip r:embed="rId4">
+              <a:extLst>
+                <a:ext uri="{28A0092B-C50C-407E-A947-70E740481C1C}">
+                  <a14:useLocalDpi xmlns:a14="http://schemas.microsoft.com/office/drawing/2010/main" val="0"/>
+                </a:ext>
+              </a:extLst>
+            </a:blip>
+            <a:srcRect/>
+            <a:stretch>
+              <a:fillRect/>
+            </a:stretch>
+          </p:blipFill>
+          <p:spPr bwMode="auto">
+            <a:xfrm>
+              <a:off x="8486535" y="1545432"/>
+              <a:ext cx="2286000" cy="2286000"/>
+            </a:xfrm>
+            <a:prstGeom prst="rect">
+              <a:avLst/>
+            </a:prstGeom>
+            <a:noFill/>
+            <a:ln>
+              <a:noFill/>
+            </a:ln>
+            <a:extLst>
+              <a:ext uri="{909E8E84-426E-40DD-AFC4-6F175D3DCCD1}">
+                <a14:hiddenFill xmlns:a14="http://schemas.microsoft.com/office/drawing/2010/main">
+                  <a:solidFill>
+                    <a:srgbClr val="FFFFFF"/>
+                  </a:solidFill>
+                </a14:hiddenFill>
+              </a:ext>
+            </a:extLst>
+          </p:spPr>
+        </p:pic>
+        <p:sp>
+          <p:nvSpPr>
+            <p:cNvPr id="10" name="TextBox 9">
+              <a:extLst>
+                <a:ext uri="{FF2B5EF4-FFF2-40B4-BE49-F238E27FC236}">
+                  <a16:creationId xmlns:a16="http://schemas.microsoft.com/office/drawing/2014/main" id="{E91163AB-4C12-4FAA-8126-714BA13F94B9}"/>
+                </a:ext>
+              </a:extLst>
+            </p:cNvPr>
+            <p:cNvSpPr txBox="1"/>
+            <p:nvPr/>
+          </p:nvSpPr>
+          <p:spPr>
+            <a:xfrm>
+              <a:off x="8486535" y="3831432"/>
+              <a:ext cx="2286000" cy="1828800"/>
+            </a:xfrm>
+            <a:prstGeom prst="rect">
+              <a:avLst/>
+            </a:prstGeom>
+            <a:noFill/>
+            <a:ln>
+              <a:noFill/>
+            </a:ln>
+          </p:spPr>
+          <p:txBody>
+            <a:bodyPr wrap="square" rtlCol="0">
+              <a:noAutofit/>
+            </a:bodyPr>
+            <a:lstStyle/>
+            <a:p>
+              <a:r>
+                <a:rPr lang="en-US" b="1" dirty="0"/>
+                <a:t>Chad </a:t>
+              </a:r>
+              <a:r>
+                <a:rPr lang="en-US" b="1" dirty="0" err="1"/>
+                <a:t>Zirbel</a:t>
+              </a:r>
+              <a:endParaRPr lang="en-US" b="1" dirty="0"/>
+            </a:p>
+            <a:p>
+              <a:r>
+                <a:rPr lang="en-US" dirty="0"/>
+                <a:t>Post Doc</a:t>
+              </a:r>
+            </a:p>
+            <a:p>
+              <a:r>
+                <a:rPr lang="en-US" dirty="0"/>
+                <a:t>Minnesota</a:t>
+              </a:r>
+            </a:p>
+          </p:txBody>
+        </p:sp>
+      </p:grpSp>
+    </p:spTree>
+    <p:extLst>
+      <p:ext uri="{BB962C8B-B14F-4D97-AF65-F5344CB8AC3E}">
+        <p14:creationId xmlns:p14="http://schemas.microsoft.com/office/powerpoint/2010/main" val="4054958115"/>
+      </p:ext>
+    </p:extLst>
+  </p:cSld>
+  <p:clrMapOvr>
+    <a:masterClrMapping/>
+  </p:clrMapOvr>
+</p:sld>
+</file>
+
+<file path=ppt/slides/slide3.xml><?xml version="1.0" encoding="utf-8"?>
+<p:sld xmlns:a="http://schemas.openxmlformats.org/drawingml/2006/main" xmlns:r="http://schemas.openxmlformats.org/officeDocument/2006/relationships" xmlns:p="http://schemas.openxmlformats.org/presentationml/2006/main">
+  <p:cSld>
+    <p:spTree>
+      <p:nvGrpSpPr>
+        <p:cNvPr id="1" name=""/>
+        <p:cNvGrpSpPr/>
+        <p:nvPr/>
+      </p:nvGrpSpPr>
+      <p:grpSpPr>
+        <a:xfrm>
+          <a:off x="0" y="0"/>
+          <a:ext cx="0" cy="0"/>
+          <a:chOff x="0" y="0"/>
+          <a:chExt cx="0" cy="0"/>
+        </a:xfrm>
+      </p:grpSpPr>
+      <p:sp>
+        <p:nvSpPr>
+          <p:cNvPr id="2" name="Title 1">
+            <a:extLst>
+              <a:ext uri="{FF2B5EF4-FFF2-40B4-BE49-F238E27FC236}">
+                <a16:creationId xmlns:a16="http://schemas.microsoft.com/office/drawing/2014/main" id="{20C38387-8B78-44FA-9D77-60FF559F0F15}"/>
+              </a:ext>
+            </a:extLst>
+          </p:cNvPr>
+          <p:cNvSpPr>
+            <a:spLocks noGrp="1"/>
+          </p:cNvSpPr>
+          <p:nvPr>
+            <p:ph type="title"/>
+          </p:nvPr>
+        </p:nvSpPr>
+        <p:spPr/>
+        <p:txBody>
+          <a:bodyPr/>
+          <a:lstStyle/>
+          <a:p>
+            <a:r>
+              <a:rPr lang="en-US" dirty="0"/>
+              <a:t>Today’s Outline</a:t>
+            </a:r>
+          </a:p>
+        </p:txBody>
+      </p:sp>
+      <p:sp>
+        <p:nvSpPr>
+          <p:cNvPr id="3" name="Content Placeholder 2">
+            <a:extLst>
+              <a:ext uri="{FF2B5EF4-FFF2-40B4-BE49-F238E27FC236}">
+                <a16:creationId xmlns:a16="http://schemas.microsoft.com/office/drawing/2014/main" id="{240CE714-EFAE-491F-96F2-8E47136EDEC9}"/>
+              </a:ext>
+            </a:extLst>
+          </p:cNvPr>
+          <p:cNvSpPr>
+            <a:spLocks noGrp="1"/>
+          </p:cNvSpPr>
+          <p:nvPr>
+            <p:ph idx="1"/>
+          </p:nvPr>
+        </p:nvSpPr>
+        <p:spPr/>
+        <p:txBody>
+          <a:bodyPr/>
+          <a:lstStyle/>
+          <a:p>
+            <a:pPr marL="514350" indent="-514350">
+              <a:buFont typeface="+mj-lt"/>
+              <a:buAutoNum type="arabicPeriod"/>
+            </a:pPr>
+            <a:r>
+              <a:rPr lang="en-US" dirty="0"/>
+              <a:t>Challenges in Collaboration</a:t>
+            </a:r>
+          </a:p>
+          <a:p>
+            <a:pPr marL="514350" indent="-514350">
+              <a:buFont typeface="+mj-lt"/>
+              <a:buAutoNum type="arabicPeriod"/>
+            </a:pPr>
+            <a:r>
+              <a:rPr lang="en-US" dirty="0"/>
+              <a:t>Web-Based Collaboration Tools</a:t>
+            </a:r>
+          </a:p>
+          <a:p>
+            <a:pPr marL="514350" indent="-514350">
+              <a:buFont typeface="+mj-lt"/>
+              <a:buAutoNum type="arabicPeriod"/>
+            </a:pPr>
+            <a:r>
+              <a:rPr lang="en-US" dirty="0"/>
+              <a:t>Reflect on Past Experiences</a:t>
+            </a:r>
+          </a:p>
+          <a:p>
+            <a:pPr marL="514350" indent="-514350">
+              <a:buFont typeface="+mj-lt"/>
+              <a:buAutoNum type="arabicPeriod"/>
+            </a:pPr>
+            <a:r>
+              <a:rPr lang="en-US" dirty="0"/>
+              <a:t>Develop </a:t>
+            </a:r>
+            <a:r>
+              <a:rPr lang="en-US" i="1" dirty="0"/>
+              <a:t>The N Commandments of Collaborative Computing</a:t>
+            </a:r>
+          </a:p>
+          <a:p>
+            <a:pPr marL="0" indent="0">
+              <a:buNone/>
+            </a:pPr>
+            <a:endParaRPr lang="en-US" dirty="0"/>
+          </a:p>
+          <a:p>
+            <a:pPr marL="914400" indent="-914400">
+              <a:buNone/>
+            </a:pPr>
+            <a:r>
+              <a:rPr lang="en-US" b="1" dirty="0"/>
+              <a:t>Goal:	</a:t>
+            </a:r>
+            <a:r>
+              <a:rPr lang="en-US" dirty="0"/>
+              <a:t>Explore solutions to the challenges of modern, data-intensive collaborative projects over long-distances</a:t>
+            </a:r>
+            <a:endParaRPr lang="en-US" b="1" dirty="0"/>
+          </a:p>
+        </p:txBody>
+      </p:sp>
+    </p:spTree>
+    <p:extLst>
+      <p:ext uri="{BB962C8B-B14F-4D97-AF65-F5344CB8AC3E}">
+        <p14:creationId xmlns:p14="http://schemas.microsoft.com/office/powerpoint/2010/main" val="1924694988"/>
+      </p:ext>
+    </p:extLst>
+  </p:cSld>
+  <p:clrMapOvr>
+    <a:masterClrMapping/>
+  </p:clrMapOvr>
+</p:sld>
+</file>
+
+<file path=ppt/slides/slide4.xml><?xml version="1.0" encoding="utf-8"?>
+<p:sld xmlns:a="http://schemas.openxmlformats.org/drawingml/2006/main" xmlns:r="http://schemas.openxmlformats.org/officeDocument/2006/relationships" xmlns:p="http://schemas.openxmlformats.org/presentationml/2006/main">
+  <p:cSld>
+    <p:spTree>
+      <p:nvGrpSpPr>
+        <p:cNvPr id="1" name=""/>
+        <p:cNvGrpSpPr/>
+        <p:nvPr/>
+      </p:nvGrpSpPr>
+      <p:grpSpPr>
+        <a:xfrm>
+          <a:off x="0" y="0"/>
+          <a:ext cx="0" cy="0"/>
+          <a:chOff x="0" y="0"/>
+          <a:chExt cx="0" cy="0"/>
+        </a:xfrm>
+      </p:grpSpPr>
+      <p:sp>
+        <p:nvSpPr>
+          <p:cNvPr id="2" name="Title 1">
+            <a:extLst>
+              <a:ext uri="{FF2B5EF4-FFF2-40B4-BE49-F238E27FC236}">
+                <a16:creationId xmlns:a16="http://schemas.microsoft.com/office/drawing/2014/main" id="{2F7ECBC6-29E3-4723-A138-2DF125E2576A}"/>
+              </a:ext>
+            </a:extLst>
+          </p:cNvPr>
+          <p:cNvSpPr>
+            <a:spLocks noGrp="1"/>
+          </p:cNvSpPr>
+          <p:nvPr>
+            <p:ph type="title"/>
+          </p:nvPr>
+        </p:nvSpPr>
+        <p:spPr/>
+        <p:txBody>
+          <a:bodyPr/>
+          <a:lstStyle/>
+          <a:p>
+            <a:r>
+              <a:rPr lang="en-US" dirty="0"/>
+              <a:t>Challenges of Collaboration</a:t>
+            </a:r>
+          </a:p>
+        </p:txBody>
+      </p:sp>
+      <p:sp>
+        <p:nvSpPr>
+          <p:cNvPr id="3" name="Content Placeholder 2">
+            <a:extLst>
+              <a:ext uri="{FF2B5EF4-FFF2-40B4-BE49-F238E27FC236}">
+                <a16:creationId xmlns:a16="http://schemas.microsoft.com/office/drawing/2014/main" id="{14EB6FE5-AECE-4700-A24E-2EBD201F91BD}"/>
+              </a:ext>
+            </a:extLst>
+          </p:cNvPr>
+          <p:cNvSpPr>
+            <a:spLocks noGrp="1"/>
+          </p:cNvSpPr>
+          <p:nvPr>
+            <p:ph idx="1"/>
+          </p:nvPr>
+        </p:nvSpPr>
+        <p:spPr/>
+        <p:txBody>
+          <a:bodyPr/>
+          <a:lstStyle/>
+          <a:p>
+            <a:pPr marL="0" indent="0">
+              <a:buNone/>
+            </a:pPr>
+            <a:r>
+              <a:rPr lang="en-US" b="1" i="1" dirty="0"/>
+              <a:t>What conditions are necessary for collaboration?</a:t>
+            </a:r>
+          </a:p>
+          <a:p>
+            <a:pPr marL="0" indent="0">
+              <a:buNone/>
+            </a:pPr>
+            <a:endParaRPr lang="en-US" dirty="0"/>
+          </a:p>
+        </p:txBody>
+      </p:sp>
+    </p:spTree>
+    <p:extLst>
+      <p:ext uri="{BB962C8B-B14F-4D97-AF65-F5344CB8AC3E}">
+        <p14:creationId xmlns:p14="http://schemas.microsoft.com/office/powerpoint/2010/main" val="1584187434"/>
+      </p:ext>
+    </p:extLst>
+  </p:cSld>
+  <p:clrMapOvr>
+    <a:masterClrMapping/>
+  </p:clrMapOvr>
+</p:sld>
+</file>
+
+<file path=ppt/slides/slide5.xml><?xml version="1.0" encoding="utf-8"?>
+<p:sld xmlns:a="http://schemas.openxmlformats.org/drawingml/2006/main" xmlns:r="http://schemas.openxmlformats.org/officeDocument/2006/relationships" xmlns:p="http://schemas.openxmlformats.org/presentationml/2006/main">
+  <p:cSld>
+    <p:spTree>
+      <p:nvGrpSpPr>
+        <p:cNvPr id="1" name=""/>
+        <p:cNvGrpSpPr/>
+        <p:nvPr/>
+      </p:nvGrpSpPr>
+      <p:grpSpPr>
+        <a:xfrm>
+          <a:off x="0" y="0"/>
+          <a:ext cx="0" cy="0"/>
+          <a:chOff x="0" y="0"/>
+          <a:chExt cx="0" cy="0"/>
+        </a:xfrm>
+      </p:grpSpPr>
+      <p:sp>
+        <p:nvSpPr>
+          <p:cNvPr id="2" name="Title 1">
+            <a:extLst>
+              <a:ext uri="{FF2B5EF4-FFF2-40B4-BE49-F238E27FC236}">
+                <a16:creationId xmlns:a16="http://schemas.microsoft.com/office/drawing/2014/main" id="{2F7ECBC6-29E3-4723-A138-2DF125E2576A}"/>
+              </a:ext>
+            </a:extLst>
+          </p:cNvPr>
+          <p:cNvSpPr>
+            <a:spLocks noGrp="1"/>
+          </p:cNvSpPr>
+          <p:nvPr>
+            <p:ph type="title"/>
+          </p:nvPr>
+        </p:nvSpPr>
+        <p:spPr/>
+        <p:txBody>
+          <a:bodyPr/>
+          <a:lstStyle/>
+          <a:p>
+            <a:r>
+              <a:rPr lang="en-US" dirty="0"/>
+              <a:t>Challenges of Collaboration</a:t>
+            </a:r>
+          </a:p>
+        </p:txBody>
+      </p:sp>
+      <p:sp>
+        <p:nvSpPr>
+          <p:cNvPr id="3" name="Content Placeholder 2">
+            <a:extLst>
+              <a:ext uri="{FF2B5EF4-FFF2-40B4-BE49-F238E27FC236}">
+                <a16:creationId xmlns:a16="http://schemas.microsoft.com/office/drawing/2014/main" id="{14EB6FE5-AECE-4700-A24E-2EBD201F91BD}"/>
+              </a:ext>
+            </a:extLst>
+          </p:cNvPr>
+          <p:cNvSpPr>
+            <a:spLocks noGrp="1"/>
+          </p:cNvSpPr>
+          <p:nvPr>
+            <p:ph idx="1"/>
+          </p:nvPr>
+        </p:nvSpPr>
+        <p:spPr/>
+        <p:txBody>
+          <a:bodyPr/>
+          <a:lstStyle/>
+          <a:p>
+            <a:pPr marL="0" indent="0">
+              <a:buNone/>
+            </a:pPr>
+            <a:r>
+              <a:rPr lang="en-US" b="1" i="1" dirty="0"/>
+              <a:t>What conditions are necessary for collaboration?</a:t>
+            </a:r>
+          </a:p>
+          <a:p>
+            <a:pPr marL="514350" indent="-514350">
+              <a:buAutoNum type="arabicPeriod"/>
+            </a:pPr>
+            <a:r>
+              <a:rPr lang="en-US" dirty="0"/>
+              <a:t>Willing participants </a:t>
+            </a:r>
+          </a:p>
+          <a:p>
+            <a:pPr marL="514350" indent="-514350">
+              <a:buAutoNum type="arabicPeriod"/>
+            </a:pPr>
+            <a:r>
+              <a:rPr lang="en-US" dirty="0"/>
+              <a:t>A shared goal</a:t>
+            </a:r>
+          </a:p>
+          <a:p>
+            <a:pPr marL="514350" indent="-514350">
+              <a:buAutoNum type="arabicPeriod"/>
+            </a:pPr>
+            <a:r>
+              <a:rPr lang="en-US" dirty="0"/>
+              <a:t>Communication</a:t>
+            </a:r>
+          </a:p>
+          <a:p>
+            <a:pPr marL="514350" indent="-514350">
+              <a:buAutoNum type="arabicPeriod"/>
+            </a:pPr>
+            <a:r>
+              <a:rPr lang="en-US" dirty="0"/>
+              <a:t>Commitment</a:t>
+            </a:r>
+          </a:p>
+          <a:p>
+            <a:pPr marL="0" indent="0">
+              <a:buNone/>
+            </a:pPr>
+            <a:endParaRPr lang="en-US" dirty="0"/>
+          </a:p>
+        </p:txBody>
+      </p:sp>
+    </p:spTree>
+    <p:extLst>
+      <p:ext uri="{BB962C8B-B14F-4D97-AF65-F5344CB8AC3E}">
+        <p14:creationId xmlns:p14="http://schemas.microsoft.com/office/powerpoint/2010/main" val="293458417"/>
+      </p:ext>
+    </p:extLst>
+  </p:cSld>
+  <p:clrMapOvr>
+    <a:masterClrMapping/>
+  </p:clrMapOvr>
+</p:sld>
+</file>
+
+<file path=ppt/slides/slide6.xml><?xml version="1.0" encoding="utf-8"?>
+<p:sld xmlns:a="http://schemas.openxmlformats.org/drawingml/2006/main" xmlns:r="http://schemas.openxmlformats.org/officeDocument/2006/relationships" xmlns:p="http://schemas.openxmlformats.org/presentationml/2006/main">
+  <p:cSld>
+    <p:spTree>
+      <p:nvGrpSpPr>
+        <p:cNvPr id="1" name=""/>
+        <p:cNvGrpSpPr/>
+        <p:nvPr/>
+      </p:nvGrpSpPr>
+      <p:grpSpPr>
+        <a:xfrm>
+          <a:off x="0" y="0"/>
+          <a:ext cx="0" cy="0"/>
+          <a:chOff x="0" y="0"/>
+          <a:chExt cx="0" cy="0"/>
+        </a:xfrm>
+      </p:grpSpPr>
+      <p:sp>
+        <p:nvSpPr>
+          <p:cNvPr id="2" name="Title 1">
+            <a:extLst>
+              <a:ext uri="{FF2B5EF4-FFF2-40B4-BE49-F238E27FC236}">
+                <a16:creationId xmlns:a16="http://schemas.microsoft.com/office/drawing/2014/main" id="{2F7ECBC6-29E3-4723-A138-2DF125E2576A}"/>
+              </a:ext>
+            </a:extLst>
+          </p:cNvPr>
+          <p:cNvSpPr>
+            <a:spLocks noGrp="1"/>
+          </p:cNvSpPr>
+          <p:nvPr>
+            <p:ph type="title"/>
+          </p:nvPr>
+        </p:nvSpPr>
+        <p:spPr/>
+        <p:txBody>
+          <a:bodyPr/>
+          <a:lstStyle/>
+          <a:p>
+            <a:r>
+              <a:rPr lang="en-US" dirty="0"/>
+              <a:t>Challenges of Collaboration</a:t>
+            </a:r>
+          </a:p>
+        </p:txBody>
+      </p:sp>
+      <p:sp>
+        <p:nvSpPr>
+          <p:cNvPr id="3" name="Content Placeholder 2">
+            <a:extLst>
+              <a:ext uri="{FF2B5EF4-FFF2-40B4-BE49-F238E27FC236}">
+                <a16:creationId xmlns:a16="http://schemas.microsoft.com/office/drawing/2014/main" id="{14EB6FE5-AECE-4700-A24E-2EBD201F91BD}"/>
+              </a:ext>
+            </a:extLst>
+          </p:cNvPr>
+          <p:cNvSpPr>
+            <a:spLocks noGrp="1"/>
+          </p:cNvSpPr>
+          <p:nvPr>
+            <p:ph idx="1"/>
+          </p:nvPr>
+        </p:nvSpPr>
+        <p:spPr/>
+        <p:txBody>
+          <a:bodyPr/>
+          <a:lstStyle/>
+          <a:p>
+            <a:pPr marL="0" indent="0">
+              <a:buNone/>
+            </a:pPr>
+            <a:r>
+              <a:rPr lang="en-US" b="1" i="1" dirty="0"/>
+              <a:t>What additional challenges does cross-site LTER research introduce?</a:t>
+            </a:r>
+            <a:endParaRPr lang="en-US" dirty="0"/>
+          </a:p>
+          <a:p>
+            <a:pPr marL="0" indent="0">
+              <a:buNone/>
+            </a:pPr>
+            <a:endParaRPr lang="en-US" dirty="0"/>
+          </a:p>
+        </p:txBody>
+      </p:sp>
+    </p:spTree>
+    <p:extLst>
+      <p:ext uri="{BB962C8B-B14F-4D97-AF65-F5344CB8AC3E}">
+        <p14:creationId xmlns:p14="http://schemas.microsoft.com/office/powerpoint/2010/main" val="1784654015"/>
+      </p:ext>
+    </p:extLst>
+  </p:cSld>
+  <p:clrMapOvr>
+    <a:masterClrMapping/>
+  </p:clrMapOvr>
+</p:sld>
+</file>
+
+<file path=ppt/slides/slide7.xml><?xml version="1.0" encoding="utf-8"?>
+<p:sld xmlns:a="http://schemas.openxmlformats.org/drawingml/2006/main" xmlns:r="http://schemas.openxmlformats.org/officeDocument/2006/relationships" xmlns:p="http://schemas.openxmlformats.org/presentationml/2006/main">
+  <p:cSld>
+    <p:spTree>
+      <p:nvGrpSpPr>
+        <p:cNvPr id="1" name=""/>
+        <p:cNvGrpSpPr/>
+        <p:nvPr/>
+      </p:nvGrpSpPr>
+      <p:grpSpPr>
+        <a:xfrm>
+          <a:off x="0" y="0"/>
+          <a:ext cx="0" cy="0"/>
+          <a:chOff x="0" y="0"/>
+          <a:chExt cx="0" cy="0"/>
+        </a:xfrm>
+      </p:grpSpPr>
+      <p:sp>
+        <p:nvSpPr>
+          <p:cNvPr id="2" name="Title 1">
+            <a:extLst>
+              <a:ext uri="{FF2B5EF4-FFF2-40B4-BE49-F238E27FC236}">
+                <a16:creationId xmlns:a16="http://schemas.microsoft.com/office/drawing/2014/main" id="{2F7ECBC6-29E3-4723-A138-2DF125E2576A}"/>
+              </a:ext>
+            </a:extLst>
+          </p:cNvPr>
+          <p:cNvSpPr>
+            <a:spLocks noGrp="1"/>
+          </p:cNvSpPr>
+          <p:nvPr>
+            <p:ph type="title"/>
+          </p:nvPr>
+        </p:nvSpPr>
+        <p:spPr/>
+        <p:txBody>
+          <a:bodyPr/>
+          <a:lstStyle/>
+          <a:p>
+            <a:r>
+              <a:rPr lang="en-US" dirty="0"/>
+              <a:t>Challenges of Collaboration</a:t>
+            </a:r>
+          </a:p>
+        </p:txBody>
+      </p:sp>
+      <p:sp>
+        <p:nvSpPr>
+          <p:cNvPr id="3" name="Content Placeholder 2">
+            <a:extLst>
+              <a:ext uri="{FF2B5EF4-FFF2-40B4-BE49-F238E27FC236}">
+                <a16:creationId xmlns:a16="http://schemas.microsoft.com/office/drawing/2014/main" id="{14EB6FE5-AECE-4700-A24E-2EBD201F91BD}"/>
+              </a:ext>
+            </a:extLst>
+          </p:cNvPr>
+          <p:cNvSpPr>
+            <a:spLocks noGrp="1"/>
+          </p:cNvSpPr>
+          <p:nvPr>
+            <p:ph idx="1"/>
+          </p:nvPr>
+        </p:nvSpPr>
+        <p:spPr/>
+        <p:txBody>
+          <a:bodyPr/>
+          <a:lstStyle/>
+          <a:p>
+            <a:pPr marL="0" indent="0">
+              <a:buNone/>
+            </a:pPr>
+            <a:r>
+              <a:rPr lang="en-US" b="1" i="1" dirty="0"/>
+              <a:t>What additional challenges does cross-site LTER research introduce?</a:t>
+            </a:r>
+            <a:endParaRPr lang="en-US" dirty="0"/>
+          </a:p>
+          <a:p>
+            <a:pPr marL="514350" indent="-514350">
+              <a:buAutoNum type="arabicPeriod"/>
+            </a:pPr>
+            <a:r>
+              <a:rPr lang="en-US" dirty="0"/>
+              <a:t>Consistent communication and goals across…</a:t>
+            </a:r>
+          </a:p>
+          <a:p>
+            <a:pPr marL="971550" lvl="1" indent="-514350">
+              <a:buFont typeface="+mj-lt"/>
+              <a:buAutoNum type="alphaLcPeriod"/>
+            </a:pPr>
+            <a:r>
+              <a:rPr lang="en-US" dirty="0"/>
+              <a:t>Distance</a:t>
+            </a:r>
+          </a:p>
+          <a:p>
+            <a:pPr marL="971550" lvl="1" indent="-514350">
+              <a:buFont typeface="+mj-lt"/>
+              <a:buAutoNum type="alphaLcPeriod"/>
+            </a:pPr>
+            <a:r>
+              <a:rPr lang="en-US" dirty="0"/>
+              <a:t>Time</a:t>
+            </a:r>
+          </a:p>
+          <a:p>
+            <a:pPr marL="514350" indent="-514350">
+              <a:buAutoNum type="arabicPeriod"/>
+            </a:pPr>
+            <a:r>
+              <a:rPr lang="en-US" dirty="0"/>
+              <a:t>Cultural differences across…</a:t>
+            </a:r>
+          </a:p>
+          <a:p>
+            <a:pPr marL="971550" lvl="1" indent="-514350">
+              <a:buFont typeface="+mj-lt"/>
+              <a:buAutoNum type="alphaLcPeriod"/>
+            </a:pPr>
+            <a:r>
+              <a:rPr lang="en-US" dirty="0"/>
+              <a:t>Sites</a:t>
+            </a:r>
+          </a:p>
+          <a:p>
+            <a:pPr marL="971550" lvl="1" indent="-514350">
+              <a:buFont typeface="+mj-lt"/>
+              <a:buAutoNum type="alphaLcPeriod"/>
+            </a:pPr>
+            <a:r>
+              <a:rPr lang="en-US" dirty="0"/>
+              <a:t>Disciplines</a:t>
+            </a:r>
+          </a:p>
+        </p:txBody>
+      </p:sp>
+    </p:spTree>
+    <p:extLst>
+      <p:ext uri="{BB962C8B-B14F-4D97-AF65-F5344CB8AC3E}">
+        <p14:creationId xmlns:p14="http://schemas.microsoft.com/office/powerpoint/2010/main" val="4047680797"/>
       </p:ext>
     </p:extLst>
   </p:cSld>

</xml_diff>

<commit_message>
adding github info/discussion slides
</commit_message>
<xml_diff>
--- a/pres_deck.pptx
+++ b/pres_deck.pptx
@@ -12,6 +12,12 @@
     <p:sldId id="260" r:id="rId6"/>
     <p:sldId id="262" r:id="rId7"/>
     <p:sldId id="261" r:id="rId8"/>
+    <p:sldId id="263" r:id="rId9"/>
+    <p:sldId id="264" r:id="rId10"/>
+    <p:sldId id="265" r:id="rId11"/>
+    <p:sldId id="266" r:id="rId12"/>
+    <p:sldId id="267" r:id="rId13"/>
+    <p:sldId id="268" r:id="rId14"/>
   </p:sldIdLst>
   <p:sldSz cx="12192000" cy="6858000"/>
   <p:notesSz cx="6858000" cy="9144000"/>
@@ -111,6 +117,35 @@
     </a:lvl9pPr>
   </p:defaultTextStyle>
   <p:extLst>
+    <p:ext uri="{521415D9-36F7-43E2-AB2F-B90AF26B5E84}">
+      <p14:sectionLst xmlns:p14="http://schemas.microsoft.com/office/powerpoint/2010/main">
+        <p14:section name="Default Section" id="{7A0EB786-E1FC-44A0-AA2D-ED4C70538D1E}">
+          <p14:sldIdLst>
+            <p14:sldId id="256"/>
+          </p14:sldIdLst>
+        </p14:section>
+        <p14:section name="Introduction" id="{32D8DEAE-7F2C-45C7-939C-5A00BD9CCB29}">
+          <p14:sldIdLst>
+            <p14:sldId id="257"/>
+            <p14:sldId id="258"/>
+            <p14:sldId id="259"/>
+            <p14:sldId id="260"/>
+            <p14:sldId id="262"/>
+            <p14:sldId id="261"/>
+          </p14:sldIdLst>
+        </p14:section>
+        <p14:section name="Web-Based Collaboration Tools" id="{96588F59-B567-4672-A9AD-C144B9EA2878}">
+          <p14:sldIdLst>
+            <p14:sldId id="263"/>
+            <p14:sldId id="264"/>
+            <p14:sldId id="265"/>
+            <p14:sldId id="266"/>
+            <p14:sldId id="267"/>
+            <p14:sldId id="268"/>
+          </p14:sldIdLst>
+        </p14:section>
+      </p14:sectionLst>
+    </p:ext>
     <p:ext uri="{EFAFB233-063F-42B5-8137-9DF3F51BA10A}">
       <p15:sldGuideLst xmlns:p15="http://schemas.microsoft.com/office/powerpoint/2012/main"/>
     </p:ext>
@@ -265,7 +300,7 @@
           <a:p>
             <a:fld id="{6A2BB79C-6BB1-4438-8F46-9EDF1954807C}" type="datetimeFigureOut">
               <a:rPr lang="en-US" smtClean="0"/>
-              <a:t>9/12/2018</a:t>
+              <a:t>9/17/2018</a:t>
             </a:fld>
             <a:endParaRPr lang="en-US"/>
           </a:p>
@@ -463,7 +498,7 @@
           <a:p>
             <a:fld id="{6A2BB79C-6BB1-4438-8F46-9EDF1954807C}" type="datetimeFigureOut">
               <a:rPr lang="en-US" smtClean="0"/>
-              <a:t>9/12/2018</a:t>
+              <a:t>9/17/2018</a:t>
             </a:fld>
             <a:endParaRPr lang="en-US"/>
           </a:p>
@@ -671,7 +706,7 @@
           <a:p>
             <a:fld id="{6A2BB79C-6BB1-4438-8F46-9EDF1954807C}" type="datetimeFigureOut">
               <a:rPr lang="en-US" smtClean="0"/>
-              <a:t>9/12/2018</a:t>
+              <a:t>9/17/2018</a:t>
             </a:fld>
             <a:endParaRPr lang="en-US"/>
           </a:p>
@@ -869,7 +904,7 @@
           <a:p>
             <a:fld id="{6A2BB79C-6BB1-4438-8F46-9EDF1954807C}" type="datetimeFigureOut">
               <a:rPr lang="en-US" smtClean="0"/>
-              <a:t>9/12/2018</a:t>
+              <a:t>9/17/2018</a:t>
             </a:fld>
             <a:endParaRPr lang="en-US"/>
           </a:p>
@@ -1144,7 +1179,7 @@
           <a:p>
             <a:fld id="{6A2BB79C-6BB1-4438-8F46-9EDF1954807C}" type="datetimeFigureOut">
               <a:rPr lang="en-US" smtClean="0"/>
-              <a:t>9/12/2018</a:t>
+              <a:t>9/17/2018</a:t>
             </a:fld>
             <a:endParaRPr lang="en-US"/>
           </a:p>
@@ -1409,7 +1444,7 @@
           <a:p>
             <a:fld id="{6A2BB79C-6BB1-4438-8F46-9EDF1954807C}" type="datetimeFigureOut">
               <a:rPr lang="en-US" smtClean="0"/>
-              <a:t>9/12/2018</a:t>
+              <a:t>9/17/2018</a:t>
             </a:fld>
             <a:endParaRPr lang="en-US"/>
           </a:p>
@@ -1821,7 +1856,7 @@
           <a:p>
             <a:fld id="{6A2BB79C-6BB1-4438-8F46-9EDF1954807C}" type="datetimeFigureOut">
               <a:rPr lang="en-US" smtClean="0"/>
-              <a:t>9/12/2018</a:t>
+              <a:t>9/17/2018</a:t>
             </a:fld>
             <a:endParaRPr lang="en-US"/>
           </a:p>
@@ -1962,7 +1997,7 @@
           <a:p>
             <a:fld id="{6A2BB79C-6BB1-4438-8F46-9EDF1954807C}" type="datetimeFigureOut">
               <a:rPr lang="en-US" smtClean="0"/>
-              <a:t>9/12/2018</a:t>
+              <a:t>9/17/2018</a:t>
             </a:fld>
             <a:endParaRPr lang="en-US"/>
           </a:p>
@@ -2075,7 +2110,7 @@
           <a:p>
             <a:fld id="{6A2BB79C-6BB1-4438-8F46-9EDF1954807C}" type="datetimeFigureOut">
               <a:rPr lang="en-US" smtClean="0"/>
-              <a:t>9/12/2018</a:t>
+              <a:t>9/17/2018</a:t>
             </a:fld>
             <a:endParaRPr lang="en-US"/>
           </a:p>
@@ -2386,7 +2421,7 @@
           <a:p>
             <a:fld id="{6A2BB79C-6BB1-4438-8F46-9EDF1954807C}" type="datetimeFigureOut">
               <a:rPr lang="en-US" smtClean="0"/>
-              <a:t>9/12/2018</a:t>
+              <a:t>9/17/2018</a:t>
             </a:fld>
             <a:endParaRPr lang="en-US"/>
           </a:p>
@@ -2674,7 +2709,7 @@
           <a:p>
             <a:fld id="{6A2BB79C-6BB1-4438-8F46-9EDF1954807C}" type="datetimeFigureOut">
               <a:rPr lang="en-US" smtClean="0"/>
-              <a:t>9/12/2018</a:t>
+              <a:t>9/17/2018</a:t>
             </a:fld>
             <a:endParaRPr lang="en-US"/>
           </a:p>
@@ -2915,7 +2950,7 @@
           <a:p>
             <a:fld id="{6A2BB79C-6BB1-4438-8F46-9EDF1954807C}" type="datetimeFigureOut">
               <a:rPr lang="en-US" smtClean="0"/>
-              <a:t>9/12/2018</a:t>
+              <a:t>9/17/2018</a:t>
             </a:fld>
             <a:endParaRPr lang="en-US"/>
           </a:p>
@@ -3541,6 +3576,320 @@
 </p:sld>
 </file>
 
+<file path=ppt/slides/slide10.xml><?xml version="1.0" encoding="utf-8"?>
+<p:sld xmlns:a="http://schemas.openxmlformats.org/drawingml/2006/main" xmlns:r="http://schemas.openxmlformats.org/officeDocument/2006/relationships" xmlns:p="http://schemas.openxmlformats.org/presentationml/2006/main">
+  <p:cSld>
+    <p:spTree>
+      <p:nvGrpSpPr>
+        <p:cNvPr id="1" name=""/>
+        <p:cNvGrpSpPr/>
+        <p:nvPr/>
+      </p:nvGrpSpPr>
+      <p:grpSpPr>
+        <a:xfrm>
+          <a:off x="0" y="0"/>
+          <a:ext cx="0" cy="0"/>
+          <a:chOff x="0" y="0"/>
+          <a:chExt cx="0" cy="0"/>
+        </a:xfrm>
+      </p:grpSpPr>
+      <p:sp>
+        <p:nvSpPr>
+          <p:cNvPr id="2" name="Title 1"/>
+          <p:cNvSpPr>
+            <a:spLocks noGrp="1"/>
+          </p:cNvSpPr>
+          <p:nvPr>
+            <p:ph type="title"/>
+          </p:nvPr>
+        </p:nvSpPr>
+        <p:spPr/>
+        <p:txBody>
+          <a:bodyPr/>
+          <a:lstStyle/>
+          <a:p>
+            <a:r>
+              <a:rPr lang="en-US" dirty="0" smtClean="0"/>
+              <a:t>Some examples</a:t>
+            </a:r>
+            <a:endParaRPr lang="en-US" dirty="0"/>
+          </a:p>
+        </p:txBody>
+      </p:sp>
+      <p:sp>
+        <p:nvSpPr>
+          <p:cNvPr id="3" name="Content Placeholder 2"/>
+          <p:cNvSpPr>
+            <a:spLocks noGrp="1"/>
+          </p:cNvSpPr>
+          <p:nvPr>
+            <p:ph idx="1"/>
+          </p:nvPr>
+        </p:nvSpPr>
+        <p:spPr/>
+        <p:txBody>
+          <a:bodyPr/>
+          <a:lstStyle/>
+          <a:p>
+            <a:endParaRPr lang="en-US"/>
+          </a:p>
+        </p:txBody>
+      </p:sp>
+    </p:spTree>
+    <p:extLst>
+      <p:ext uri="{BB962C8B-B14F-4D97-AF65-F5344CB8AC3E}">
+        <p14:creationId xmlns:p14="http://schemas.microsoft.com/office/powerpoint/2010/main" val="1350611420"/>
+      </p:ext>
+    </p:extLst>
+  </p:cSld>
+  <p:clrMapOvr>
+    <a:masterClrMapping/>
+  </p:clrMapOvr>
+</p:sld>
+</file>
+
+<file path=ppt/slides/slide11.xml><?xml version="1.0" encoding="utf-8"?>
+<p:sld xmlns:a="http://schemas.openxmlformats.org/drawingml/2006/main" xmlns:r="http://schemas.openxmlformats.org/officeDocument/2006/relationships" xmlns:p="http://schemas.openxmlformats.org/presentationml/2006/main">
+  <p:cSld>
+    <p:spTree>
+      <p:nvGrpSpPr>
+        <p:cNvPr id="1" name=""/>
+        <p:cNvGrpSpPr/>
+        <p:nvPr/>
+      </p:nvGrpSpPr>
+      <p:grpSpPr>
+        <a:xfrm>
+          <a:off x="0" y="0"/>
+          <a:ext cx="0" cy="0"/>
+          <a:chOff x="0" y="0"/>
+          <a:chExt cx="0" cy="0"/>
+        </a:xfrm>
+      </p:grpSpPr>
+      <p:sp>
+        <p:nvSpPr>
+          <p:cNvPr id="2" name="Title 1"/>
+          <p:cNvSpPr>
+            <a:spLocks noGrp="1"/>
+          </p:cNvSpPr>
+          <p:nvPr>
+            <p:ph type="title"/>
+          </p:nvPr>
+        </p:nvSpPr>
+        <p:spPr/>
+        <p:txBody>
+          <a:bodyPr/>
+          <a:lstStyle/>
+          <a:p>
+            <a:r>
+              <a:rPr lang="en-US" dirty="0" smtClean="0"/>
+              <a:t>What are the pros of </a:t>
+            </a:r>
+            <a:r>
+              <a:rPr lang="en-US" dirty="0" err="1" smtClean="0"/>
+              <a:t>Github</a:t>
+            </a:r>
+            <a:r>
+              <a:rPr lang="en-US" dirty="0" smtClean="0"/>
+              <a:t>?</a:t>
+            </a:r>
+            <a:endParaRPr lang="en-US" dirty="0"/>
+          </a:p>
+        </p:txBody>
+      </p:sp>
+      <p:sp>
+        <p:nvSpPr>
+          <p:cNvPr id="3" name="Content Placeholder 2"/>
+          <p:cNvSpPr>
+            <a:spLocks noGrp="1"/>
+          </p:cNvSpPr>
+          <p:nvPr>
+            <p:ph idx="1"/>
+          </p:nvPr>
+        </p:nvSpPr>
+        <p:spPr/>
+        <p:txBody>
+          <a:bodyPr/>
+          <a:lstStyle/>
+          <a:p>
+            <a:r>
+              <a:rPr lang="en-US" dirty="0" smtClean="0"/>
+              <a:t>Discuss in groups (x minutes)</a:t>
+            </a:r>
+            <a:endParaRPr lang="en-US" dirty="0"/>
+          </a:p>
+        </p:txBody>
+      </p:sp>
+    </p:spTree>
+    <p:extLst>
+      <p:ext uri="{BB962C8B-B14F-4D97-AF65-F5344CB8AC3E}">
+        <p14:creationId xmlns:p14="http://schemas.microsoft.com/office/powerpoint/2010/main" val="2490276211"/>
+      </p:ext>
+    </p:extLst>
+  </p:cSld>
+  <p:clrMapOvr>
+    <a:masterClrMapping/>
+  </p:clrMapOvr>
+</p:sld>
+</file>
+
+<file path=ppt/slides/slide12.xml><?xml version="1.0" encoding="utf-8"?>
+<p:sld xmlns:a="http://schemas.openxmlformats.org/drawingml/2006/main" xmlns:r="http://schemas.openxmlformats.org/officeDocument/2006/relationships" xmlns:p="http://schemas.openxmlformats.org/presentationml/2006/main">
+  <p:cSld>
+    <p:spTree>
+      <p:nvGrpSpPr>
+        <p:cNvPr id="1" name=""/>
+        <p:cNvGrpSpPr/>
+        <p:nvPr/>
+      </p:nvGrpSpPr>
+      <p:grpSpPr>
+        <a:xfrm>
+          <a:off x="0" y="0"/>
+          <a:ext cx="0" cy="0"/>
+          <a:chOff x="0" y="0"/>
+          <a:chExt cx="0" cy="0"/>
+        </a:xfrm>
+      </p:grpSpPr>
+      <p:sp>
+        <p:nvSpPr>
+          <p:cNvPr id="2" name="Title 1"/>
+          <p:cNvSpPr>
+            <a:spLocks noGrp="1"/>
+          </p:cNvSpPr>
+          <p:nvPr>
+            <p:ph type="title"/>
+          </p:nvPr>
+        </p:nvSpPr>
+        <p:spPr/>
+        <p:txBody>
+          <a:bodyPr/>
+          <a:lstStyle/>
+          <a:p>
+            <a:r>
+              <a:rPr lang="en-US" dirty="0" smtClean="0"/>
+              <a:t>What are the cons of </a:t>
+            </a:r>
+            <a:r>
+              <a:rPr lang="en-US" dirty="0" err="1" smtClean="0"/>
+              <a:t>Github</a:t>
+            </a:r>
+            <a:r>
+              <a:rPr lang="en-US" dirty="0" smtClean="0"/>
+              <a:t>?</a:t>
+            </a:r>
+            <a:endParaRPr lang="en-US" dirty="0"/>
+          </a:p>
+        </p:txBody>
+      </p:sp>
+      <p:sp>
+        <p:nvSpPr>
+          <p:cNvPr id="3" name="Content Placeholder 2"/>
+          <p:cNvSpPr>
+            <a:spLocks noGrp="1"/>
+          </p:cNvSpPr>
+          <p:nvPr>
+            <p:ph idx="1"/>
+          </p:nvPr>
+        </p:nvSpPr>
+        <p:spPr/>
+        <p:txBody>
+          <a:bodyPr/>
+          <a:lstStyle/>
+          <a:p>
+            <a:r>
+              <a:rPr lang="en-US" dirty="0"/>
+              <a:t>Discuss in groups (x minutes)</a:t>
+            </a:r>
+          </a:p>
+          <a:p>
+            <a:endParaRPr lang="en-US" dirty="0"/>
+          </a:p>
+        </p:txBody>
+      </p:sp>
+    </p:spTree>
+    <p:extLst>
+      <p:ext uri="{BB962C8B-B14F-4D97-AF65-F5344CB8AC3E}">
+        <p14:creationId xmlns:p14="http://schemas.microsoft.com/office/powerpoint/2010/main" val="2174573096"/>
+      </p:ext>
+    </p:extLst>
+  </p:cSld>
+  <p:clrMapOvr>
+    <a:masterClrMapping/>
+  </p:clrMapOvr>
+</p:sld>
+</file>
+
+<file path=ppt/slides/slide13.xml><?xml version="1.0" encoding="utf-8"?>
+<p:sld xmlns:a="http://schemas.openxmlformats.org/drawingml/2006/main" xmlns:r="http://schemas.openxmlformats.org/officeDocument/2006/relationships" xmlns:p="http://schemas.openxmlformats.org/presentationml/2006/main">
+  <p:cSld>
+    <p:spTree>
+      <p:nvGrpSpPr>
+        <p:cNvPr id="1" name=""/>
+        <p:cNvGrpSpPr/>
+        <p:nvPr/>
+      </p:nvGrpSpPr>
+      <p:grpSpPr>
+        <a:xfrm>
+          <a:off x="0" y="0"/>
+          <a:ext cx="0" cy="0"/>
+          <a:chOff x="0" y="0"/>
+          <a:chExt cx="0" cy="0"/>
+        </a:xfrm>
+      </p:grpSpPr>
+      <p:sp>
+        <p:nvSpPr>
+          <p:cNvPr id="2" name="Title 1"/>
+          <p:cNvSpPr>
+            <a:spLocks noGrp="1"/>
+          </p:cNvSpPr>
+          <p:nvPr>
+            <p:ph type="title"/>
+          </p:nvPr>
+        </p:nvSpPr>
+        <p:spPr/>
+        <p:txBody>
+          <a:bodyPr/>
+          <a:lstStyle/>
+          <a:p>
+            <a:r>
+              <a:rPr lang="en-US" dirty="0" smtClean="0"/>
+              <a:t>Resources for learning more</a:t>
+            </a:r>
+            <a:endParaRPr lang="en-US" dirty="0"/>
+          </a:p>
+        </p:txBody>
+      </p:sp>
+      <p:sp>
+        <p:nvSpPr>
+          <p:cNvPr id="3" name="Content Placeholder 2"/>
+          <p:cNvSpPr>
+            <a:spLocks noGrp="1"/>
+          </p:cNvSpPr>
+          <p:nvPr>
+            <p:ph idx="1"/>
+          </p:nvPr>
+        </p:nvSpPr>
+        <p:spPr/>
+        <p:txBody>
+          <a:bodyPr/>
+          <a:lstStyle/>
+          <a:p>
+            <a:endParaRPr lang="en-US"/>
+          </a:p>
+        </p:txBody>
+      </p:sp>
+    </p:spTree>
+    <p:extLst>
+      <p:ext uri="{BB962C8B-B14F-4D97-AF65-F5344CB8AC3E}">
+        <p14:creationId xmlns:p14="http://schemas.microsoft.com/office/powerpoint/2010/main" val="2381293250"/>
+      </p:ext>
+    </p:extLst>
+  </p:cSld>
+  <p:clrMapOvr>
+    <a:masterClrMapping/>
+  </p:clrMapOvr>
+</p:sld>
+</file>
+
 <file path=ppt/slides/slide2.xml><?xml version="1.0" encoding="utf-8"?>
 <p:sld xmlns:a="http://schemas.openxmlformats.org/drawingml/2006/main" xmlns:r="http://schemas.openxmlformats.org/officeDocument/2006/relationships" xmlns:p="http://schemas.openxmlformats.org/presentationml/2006/main">
   <p:cSld>
@@ -4571,6 +4920,226 @@
     <p:extLst>
       <p:ext uri="{BB962C8B-B14F-4D97-AF65-F5344CB8AC3E}">
         <p14:creationId xmlns:p14="http://schemas.microsoft.com/office/powerpoint/2010/main" val="4047680797"/>
+      </p:ext>
+    </p:extLst>
+  </p:cSld>
+  <p:clrMapOvr>
+    <a:masterClrMapping/>
+  </p:clrMapOvr>
+</p:sld>
+</file>
+
+<file path=ppt/slides/slide8.xml><?xml version="1.0" encoding="utf-8"?>
+<p:sld xmlns:a="http://schemas.openxmlformats.org/drawingml/2006/main" xmlns:r="http://schemas.openxmlformats.org/officeDocument/2006/relationships" xmlns:p="http://schemas.openxmlformats.org/presentationml/2006/main">
+  <p:cSld>
+    <p:spTree>
+      <p:nvGrpSpPr>
+        <p:cNvPr id="1" name=""/>
+        <p:cNvGrpSpPr/>
+        <p:nvPr/>
+      </p:nvGrpSpPr>
+      <p:grpSpPr>
+        <a:xfrm>
+          <a:off x="0" y="0"/>
+          <a:ext cx="0" cy="0"/>
+          <a:chOff x="0" y="0"/>
+          <a:chExt cx="0" cy="0"/>
+        </a:xfrm>
+      </p:grpSpPr>
+      <p:sp>
+        <p:nvSpPr>
+          <p:cNvPr id="2" name="Title 1"/>
+          <p:cNvSpPr>
+            <a:spLocks noGrp="1"/>
+          </p:cNvSpPr>
+          <p:nvPr>
+            <p:ph type="title"/>
+          </p:nvPr>
+        </p:nvSpPr>
+        <p:spPr/>
+        <p:txBody>
+          <a:bodyPr/>
+          <a:lstStyle/>
+          <a:p>
+            <a:r>
+              <a:rPr lang="en-US" dirty="0"/>
+              <a:t>Web-Based Collaboration Tools</a:t>
+            </a:r>
+            <a:endParaRPr lang="en-US" dirty="0"/>
+          </a:p>
+        </p:txBody>
+      </p:sp>
+      <p:sp>
+        <p:nvSpPr>
+          <p:cNvPr id="3" name="Content Placeholder 2"/>
+          <p:cNvSpPr>
+            <a:spLocks noGrp="1"/>
+          </p:cNvSpPr>
+          <p:nvPr>
+            <p:ph idx="1"/>
+          </p:nvPr>
+        </p:nvSpPr>
+        <p:spPr/>
+        <p:txBody>
+          <a:bodyPr/>
+          <a:lstStyle/>
+          <a:p>
+            <a:endParaRPr lang="en-US"/>
+          </a:p>
+        </p:txBody>
+      </p:sp>
+    </p:spTree>
+    <p:extLst>
+      <p:ext uri="{BB962C8B-B14F-4D97-AF65-F5344CB8AC3E}">
+        <p14:creationId xmlns:p14="http://schemas.microsoft.com/office/powerpoint/2010/main" val="3145825190"/>
+      </p:ext>
+    </p:extLst>
+  </p:cSld>
+  <p:clrMapOvr>
+    <a:masterClrMapping/>
+  </p:clrMapOvr>
+</p:sld>
+</file>
+
+<file path=ppt/slides/slide9.xml><?xml version="1.0" encoding="utf-8"?>
+<p:sld xmlns:a="http://schemas.openxmlformats.org/drawingml/2006/main" xmlns:r="http://schemas.openxmlformats.org/officeDocument/2006/relationships" xmlns:p="http://schemas.openxmlformats.org/presentationml/2006/main">
+  <p:cSld>
+    <p:spTree>
+      <p:nvGrpSpPr>
+        <p:cNvPr id="1" name=""/>
+        <p:cNvGrpSpPr/>
+        <p:nvPr/>
+      </p:nvGrpSpPr>
+      <p:grpSpPr>
+        <a:xfrm>
+          <a:off x="0" y="0"/>
+          <a:ext cx="0" cy="0"/>
+          <a:chOff x="0" y="0"/>
+          <a:chExt cx="0" cy="0"/>
+        </a:xfrm>
+      </p:grpSpPr>
+      <p:sp>
+        <p:nvSpPr>
+          <p:cNvPr id="2" name="Title 1"/>
+          <p:cNvSpPr>
+            <a:spLocks noGrp="1"/>
+          </p:cNvSpPr>
+          <p:nvPr>
+            <p:ph type="title"/>
+          </p:nvPr>
+        </p:nvSpPr>
+        <p:spPr/>
+        <p:txBody>
+          <a:bodyPr/>
+          <a:lstStyle/>
+          <a:p>
+            <a:r>
+              <a:rPr lang="en-US" dirty="0" smtClean="0"/>
+              <a:t>What is </a:t>
+            </a:r>
+            <a:r>
+              <a:rPr lang="en-US" dirty="0" err="1" smtClean="0"/>
+              <a:t>Github</a:t>
+            </a:r>
+            <a:r>
+              <a:rPr lang="en-US" dirty="0" smtClean="0"/>
+              <a:t>?</a:t>
+            </a:r>
+            <a:endParaRPr lang="en-US" dirty="0"/>
+          </a:p>
+        </p:txBody>
+      </p:sp>
+      <p:sp>
+        <p:nvSpPr>
+          <p:cNvPr id="3" name="Content Placeholder 2"/>
+          <p:cNvSpPr>
+            <a:spLocks noGrp="1"/>
+          </p:cNvSpPr>
+          <p:nvPr>
+            <p:ph idx="1"/>
+          </p:nvPr>
+        </p:nvSpPr>
+        <p:spPr/>
+        <p:txBody>
+          <a:bodyPr/>
+          <a:lstStyle/>
+          <a:p>
+            <a:r>
+              <a:rPr lang="en-US" dirty="0"/>
+              <a:t>The repo</a:t>
+            </a:r>
+          </a:p>
+          <a:p>
+            <a:r>
+              <a:rPr lang="en-US" dirty="0"/>
+              <a:t>What is a pull request?</a:t>
+            </a:r>
+          </a:p>
+          <a:p>
+            <a:r>
+              <a:rPr lang="en-US" dirty="0"/>
+              <a:t>What is a fork?</a:t>
+            </a:r>
+          </a:p>
+          <a:p>
+            <a:r>
+              <a:rPr lang="en-US" dirty="0"/>
+              <a:t>Using the issues page?</a:t>
+            </a:r>
+          </a:p>
+          <a:p>
+            <a:pPr marL="0" indent="0">
+              <a:buNone/>
+            </a:pPr>
+            <a:endParaRPr lang="en-US" dirty="0"/>
+          </a:p>
+        </p:txBody>
+      </p:sp>
+      <p:pic>
+        <p:nvPicPr>
+          <p:cNvPr id="1026" name="Picture 2" descr="Image result for github"/>
+          <p:cNvPicPr>
+            <a:picLocks noChangeAspect="1" noChangeArrowheads="1"/>
+          </p:cNvPicPr>
+          <p:nvPr/>
+        </p:nvPicPr>
+        <p:blipFill>
+          <a:blip r:embed="rId2">
+            <a:extLst>
+              <a:ext uri="{28A0092B-C50C-407E-A947-70E740481C1C}">
+                <a14:useLocalDpi xmlns:a14="http://schemas.microsoft.com/office/drawing/2010/main" val="0"/>
+              </a:ext>
+            </a:extLst>
+          </a:blip>
+          <a:srcRect/>
+          <a:stretch>
+            <a:fillRect/>
+          </a:stretch>
+        </p:blipFill>
+        <p:spPr bwMode="auto">
+          <a:xfrm>
+            <a:off x="8473666" y="198380"/>
+            <a:ext cx="3590515" cy="2984616"/>
+          </a:xfrm>
+          <a:prstGeom prst="rect">
+            <a:avLst/>
+          </a:prstGeom>
+          <a:noFill/>
+          <a:extLst>
+            <a:ext uri="{909E8E84-426E-40DD-AFC4-6F175D3DCCD1}">
+              <a14:hiddenFill xmlns:a14="http://schemas.microsoft.com/office/drawing/2010/main">
+                <a:solidFill>
+                  <a:srgbClr val="FFFFFF"/>
+                </a:solidFill>
+              </a14:hiddenFill>
+            </a:ext>
+          </a:extLst>
+        </p:spPr>
+      </p:pic>
+    </p:spTree>
+    <p:extLst>
+      <p:ext uri="{BB962C8B-B14F-4D97-AF65-F5344CB8AC3E}">
+        <p14:creationId xmlns:p14="http://schemas.microsoft.com/office/powerpoint/2010/main" val="2963071584"/>
       </p:ext>
     </p:extLst>
   </p:cSld>

</xml_diff>

<commit_message>
merging github slides to deck
</commit_message>
<xml_diff>
--- a/pres_deck.pptx
+++ b/pres_deck.pptx
@@ -13,14 +13,19 @@
     <p:sldId id="262" r:id="rId7"/>
     <p:sldId id="261" r:id="rId8"/>
     <p:sldId id="263" r:id="rId9"/>
-    <p:sldId id="264" r:id="rId10"/>
-    <p:sldId id="266" r:id="rId11"/>
-    <p:sldId id="265" r:id="rId12"/>
-    <p:sldId id="267" r:id="rId13"/>
-    <p:sldId id="268" r:id="rId14"/>
-    <p:sldId id="269" r:id="rId15"/>
-    <p:sldId id="271" r:id="rId16"/>
-    <p:sldId id="270" r:id="rId17"/>
+    <p:sldId id="272" r:id="rId10"/>
+    <p:sldId id="273" r:id="rId11"/>
+    <p:sldId id="274" r:id="rId12"/>
+    <p:sldId id="275" r:id="rId13"/>
+    <p:sldId id="276" r:id="rId14"/>
+    <p:sldId id="264" r:id="rId15"/>
+    <p:sldId id="266" r:id="rId16"/>
+    <p:sldId id="265" r:id="rId17"/>
+    <p:sldId id="267" r:id="rId18"/>
+    <p:sldId id="268" r:id="rId19"/>
+    <p:sldId id="269" r:id="rId20"/>
+    <p:sldId id="271" r:id="rId21"/>
+    <p:sldId id="270" r:id="rId22"/>
   </p:sldIdLst>
   <p:sldSz cx="12192000" cy="6858000"/>
   <p:notesSz cx="6858000" cy="9144000"/>
@@ -136,6 +141,11 @@
         <p14:section name="GitHub" id="{22A46AFE-F935-4EFF-A186-87C503576482}">
           <p14:sldIdLst>
             <p14:sldId id="263"/>
+            <p14:sldId id="272"/>
+            <p14:sldId id="273"/>
+            <p14:sldId id="274"/>
+            <p14:sldId id="275"/>
+            <p14:sldId id="276"/>
             <p14:sldId id="264"/>
           </p14:sldIdLst>
         </p14:section>
@@ -310,7 +320,7 @@
           <a:p>
             <a:fld id="{6A2BB79C-6BB1-4438-8F46-9EDF1954807C}" type="datetimeFigureOut">
               <a:rPr lang="en-US" smtClean="0"/>
-              <a:t>9/14/2018</a:t>
+              <a:t>9/17/2018</a:t>
             </a:fld>
             <a:endParaRPr lang="en-US"/>
           </a:p>
@@ -508,7 +518,7 @@
           <a:p>
             <a:fld id="{6A2BB79C-6BB1-4438-8F46-9EDF1954807C}" type="datetimeFigureOut">
               <a:rPr lang="en-US" smtClean="0"/>
-              <a:t>9/14/2018</a:t>
+              <a:t>9/17/2018</a:t>
             </a:fld>
             <a:endParaRPr lang="en-US"/>
           </a:p>
@@ -716,7 +726,7 @@
           <a:p>
             <a:fld id="{6A2BB79C-6BB1-4438-8F46-9EDF1954807C}" type="datetimeFigureOut">
               <a:rPr lang="en-US" smtClean="0"/>
-              <a:t>9/14/2018</a:t>
+              <a:t>9/17/2018</a:t>
             </a:fld>
             <a:endParaRPr lang="en-US"/>
           </a:p>
@@ -914,7 +924,7 @@
           <a:p>
             <a:fld id="{6A2BB79C-6BB1-4438-8F46-9EDF1954807C}" type="datetimeFigureOut">
               <a:rPr lang="en-US" smtClean="0"/>
-              <a:t>9/14/2018</a:t>
+              <a:t>9/17/2018</a:t>
             </a:fld>
             <a:endParaRPr lang="en-US"/>
           </a:p>
@@ -1189,7 +1199,7 @@
           <a:p>
             <a:fld id="{6A2BB79C-6BB1-4438-8F46-9EDF1954807C}" type="datetimeFigureOut">
               <a:rPr lang="en-US" smtClean="0"/>
-              <a:t>9/14/2018</a:t>
+              <a:t>9/17/2018</a:t>
             </a:fld>
             <a:endParaRPr lang="en-US"/>
           </a:p>
@@ -1454,7 +1464,7 @@
           <a:p>
             <a:fld id="{6A2BB79C-6BB1-4438-8F46-9EDF1954807C}" type="datetimeFigureOut">
               <a:rPr lang="en-US" smtClean="0"/>
-              <a:t>9/14/2018</a:t>
+              <a:t>9/17/2018</a:t>
             </a:fld>
             <a:endParaRPr lang="en-US"/>
           </a:p>
@@ -1866,7 +1876,7 @@
           <a:p>
             <a:fld id="{6A2BB79C-6BB1-4438-8F46-9EDF1954807C}" type="datetimeFigureOut">
               <a:rPr lang="en-US" smtClean="0"/>
-              <a:t>9/14/2018</a:t>
+              <a:t>9/17/2018</a:t>
             </a:fld>
             <a:endParaRPr lang="en-US"/>
           </a:p>
@@ -2007,7 +2017,7 @@
           <a:p>
             <a:fld id="{6A2BB79C-6BB1-4438-8F46-9EDF1954807C}" type="datetimeFigureOut">
               <a:rPr lang="en-US" smtClean="0"/>
-              <a:t>9/14/2018</a:t>
+              <a:t>9/17/2018</a:t>
             </a:fld>
             <a:endParaRPr lang="en-US"/>
           </a:p>
@@ -2120,7 +2130,7 @@
           <a:p>
             <a:fld id="{6A2BB79C-6BB1-4438-8F46-9EDF1954807C}" type="datetimeFigureOut">
               <a:rPr lang="en-US" smtClean="0"/>
-              <a:t>9/14/2018</a:t>
+              <a:t>9/17/2018</a:t>
             </a:fld>
             <a:endParaRPr lang="en-US"/>
           </a:p>
@@ -2431,7 +2441,7 @@
           <a:p>
             <a:fld id="{6A2BB79C-6BB1-4438-8F46-9EDF1954807C}" type="datetimeFigureOut">
               <a:rPr lang="en-US" smtClean="0"/>
-              <a:t>9/14/2018</a:t>
+              <a:t>9/17/2018</a:t>
             </a:fld>
             <a:endParaRPr lang="en-US"/>
           </a:p>
@@ -2719,7 +2729,7 @@
           <a:p>
             <a:fld id="{6A2BB79C-6BB1-4438-8F46-9EDF1954807C}" type="datetimeFigureOut">
               <a:rPr lang="en-US" smtClean="0"/>
-              <a:t>9/14/2018</a:t>
+              <a:t>9/17/2018</a:t>
             </a:fld>
             <a:endParaRPr lang="en-US"/>
           </a:p>
@@ -2960,7 +2970,7 @@
           <a:p>
             <a:fld id="{6A2BB79C-6BB1-4438-8F46-9EDF1954807C}" type="datetimeFigureOut">
               <a:rPr lang="en-US" smtClean="0"/>
-              <a:t>9/14/2018</a:t>
+              <a:t>9/17/2018</a:t>
             </a:fld>
             <a:endParaRPr lang="en-US"/>
           </a:p>
@@ -3605,46 +3615,7 @@
       </p:grpSpPr>
       <p:sp>
         <p:nvSpPr>
-          <p:cNvPr id="3" name="Text Placeholder 2">
-            <a:extLst>
-              <a:ext uri="{FF2B5EF4-FFF2-40B4-BE49-F238E27FC236}">
-                <a16:creationId xmlns:a16="http://schemas.microsoft.com/office/drawing/2014/main" id="{CBBEC366-C759-494E-BEFD-6DED92045DAC}"/>
-              </a:ext>
-            </a:extLst>
-          </p:cNvPr>
-          <p:cNvSpPr>
-            <a:spLocks noGrp="1"/>
-          </p:cNvSpPr>
-          <p:nvPr>
-            <p:ph type="body" idx="1"/>
-          </p:nvPr>
-        </p:nvSpPr>
-        <p:spPr>
-          <a:xfrm>
-            <a:off x="831850" y="4589464"/>
-            <a:ext cx="10515600" cy="430212"/>
-          </a:xfrm>
-        </p:spPr>
-        <p:txBody>
-          <a:bodyPr/>
-          <a:lstStyle/>
-          <a:p>
-            <a:r>
-              <a:rPr lang="en-US" dirty="0"/>
-              <a:t>Learning from Past Collaborations</a:t>
-            </a:r>
-          </a:p>
-        </p:txBody>
-      </p:sp>
-      <p:sp>
-        <p:nvSpPr>
-          <p:cNvPr id="7" name="Title 6">
-            <a:extLst>
-              <a:ext uri="{FF2B5EF4-FFF2-40B4-BE49-F238E27FC236}">
-                <a16:creationId xmlns:a16="http://schemas.microsoft.com/office/drawing/2014/main" id="{52783F39-79B3-4870-B7E0-BCD7EAF177B0}"/>
-              </a:ext>
-            </a:extLst>
-          </p:cNvPr>
+          <p:cNvPr id="2" name="Title 1"/>
           <p:cNvSpPr>
             <a:spLocks noGrp="1"/>
           </p:cNvSpPr>
@@ -3652,27 +3623,42 @@
             <p:ph type="title"/>
           </p:nvPr>
         </p:nvSpPr>
-        <p:spPr>
-          <a:xfrm>
-            <a:off x="831850" y="3648075"/>
-            <a:ext cx="10515600" cy="914400"/>
-          </a:xfrm>
-        </p:spPr>
-        <p:txBody>
-          <a:bodyPr/>
-          <a:lstStyle/>
-          <a:p>
-            <a:r>
-              <a:rPr lang="en-US" dirty="0"/>
-              <a:t>Small Group Discussions</a:t>
-            </a:r>
+        <p:spPr/>
+        <p:txBody>
+          <a:bodyPr/>
+          <a:lstStyle/>
+          <a:p>
+            <a:r>
+              <a:rPr lang="en-US" dirty="0" smtClean="0"/>
+              <a:t>Some examples</a:t>
+            </a:r>
+            <a:endParaRPr lang="en-US" dirty="0"/>
+          </a:p>
+        </p:txBody>
+      </p:sp>
+      <p:sp>
+        <p:nvSpPr>
+          <p:cNvPr id="3" name="Content Placeholder 2"/>
+          <p:cNvSpPr>
+            <a:spLocks noGrp="1"/>
+          </p:cNvSpPr>
+          <p:nvPr>
+            <p:ph idx="1"/>
+          </p:nvPr>
+        </p:nvSpPr>
+        <p:spPr/>
+        <p:txBody>
+          <a:bodyPr/>
+          <a:lstStyle/>
+          <a:p>
+            <a:endParaRPr lang="en-US"/>
           </a:p>
         </p:txBody>
       </p:sp>
     </p:spTree>
     <p:extLst>
       <p:ext uri="{BB962C8B-B14F-4D97-AF65-F5344CB8AC3E}">
-        <p14:creationId xmlns:p14="http://schemas.microsoft.com/office/powerpoint/2010/main" val="1827043774"/>
+        <p14:creationId xmlns:p14="http://schemas.microsoft.com/office/powerpoint/2010/main" val="760688889"/>
       </p:ext>
     </p:extLst>
   </p:cSld>
@@ -3701,13 +3687,7 @@
       </p:grpSpPr>
       <p:sp>
         <p:nvSpPr>
-          <p:cNvPr id="2" name="Title 1">
-            <a:extLst>
-              <a:ext uri="{FF2B5EF4-FFF2-40B4-BE49-F238E27FC236}">
-                <a16:creationId xmlns:a16="http://schemas.microsoft.com/office/drawing/2014/main" id="{4DBB3D5F-2B2C-4880-8F07-4EA749825D10}"/>
-              </a:ext>
-            </a:extLst>
-          </p:cNvPr>
+          <p:cNvPr id="2" name="Title 1"/>
           <p:cNvSpPr>
             <a:spLocks noGrp="1"/>
           </p:cNvSpPr>
@@ -3721,21 +3701,24 @@
           <a:lstStyle/>
           <a:p>
             <a:r>
-              <a:rPr lang="en-US" dirty="0"/>
-              <a:t>Small Group Discussions</a:t>
-            </a:r>
-          </a:p>
-        </p:txBody>
-      </p:sp>
-      <p:sp>
-        <p:nvSpPr>
-          <p:cNvPr id="3" name="Content Placeholder 2">
-            <a:extLst>
-              <a:ext uri="{FF2B5EF4-FFF2-40B4-BE49-F238E27FC236}">
-                <a16:creationId xmlns:a16="http://schemas.microsoft.com/office/drawing/2014/main" id="{58DA7441-F606-4D88-B3AB-F330ECBB4130}"/>
-              </a:ext>
-            </a:extLst>
-          </p:cNvPr>
+              <a:rPr lang="en-US" dirty="0" smtClean="0"/>
+              <a:t>What are the pros of </a:t>
+            </a:r>
+            <a:r>
+              <a:rPr lang="en-US" dirty="0" err="1" smtClean="0"/>
+              <a:t>Github</a:t>
+            </a:r>
+            <a:r>
+              <a:rPr lang="en-US" dirty="0" smtClean="0"/>
+              <a:t>?</a:t>
+            </a:r>
+            <a:endParaRPr lang="en-US" dirty="0"/>
+          </a:p>
+        </p:txBody>
+      </p:sp>
+      <p:sp>
+        <p:nvSpPr>
+          <p:cNvPr id="3" name="Content Placeholder 2"/>
           <p:cNvSpPr>
             <a:spLocks noGrp="1"/>
           </p:cNvSpPr>
@@ -3745,90 +3728,21 @@
         </p:nvSpPr>
         <p:spPr/>
         <p:txBody>
-          <a:bodyPr>
-            <a:normAutofit lnSpcReduction="10000"/>
-          </a:bodyPr>
-          <a:lstStyle/>
-          <a:p>
-            <a:pPr marL="0" indent="0">
-              <a:buNone/>
-            </a:pPr>
-            <a:r>
-              <a:rPr lang="en-US" b="1" i="1" dirty="0"/>
-              <a:t>What you’ll need…</a:t>
-            </a:r>
-          </a:p>
-          <a:p>
-            <a:pPr marL="514350" indent="-514350">
-              <a:buAutoNum type="arabicPeriod"/>
-            </a:pPr>
-            <a:r>
-              <a:rPr lang="en-US" dirty="0"/>
-              <a:t>Some people to talk with</a:t>
-            </a:r>
-          </a:p>
-          <a:p>
-            <a:pPr marL="514350" indent="-514350">
-              <a:buAutoNum type="arabicPeriod"/>
-            </a:pPr>
-            <a:r>
-              <a:rPr lang="en-US" dirty="0"/>
-              <a:t>Some notetaking technology (e.g., pen and paper, laptop, tablet)</a:t>
-            </a:r>
-          </a:p>
-          <a:p>
-            <a:pPr marL="514350" indent="-514350">
-              <a:buAutoNum type="arabicPeriod"/>
-            </a:pPr>
+          <a:bodyPr/>
+          <a:lstStyle/>
+          <a:p>
+            <a:r>
+              <a:rPr lang="en-US" dirty="0" smtClean="0"/>
+              <a:t>Discuss in groups (x minutes)</a:t>
+            </a:r>
             <a:endParaRPr lang="en-US" dirty="0"/>
-          </a:p>
-          <a:p>
-            <a:pPr marL="0" indent="0">
-              <a:buNone/>
-            </a:pPr>
-            <a:r>
-              <a:rPr lang="en-US" b="1" i="1" dirty="0"/>
-              <a:t>What we’ll do…</a:t>
-            </a:r>
-          </a:p>
-          <a:p>
-            <a:pPr marL="514350" indent="-514350">
-              <a:buAutoNum type="arabicPeriod"/>
-            </a:pPr>
-            <a:r>
-              <a:rPr lang="en-US" dirty="0"/>
-              <a:t>Reflect on past collaborative experiences</a:t>
-            </a:r>
-          </a:p>
-          <a:p>
-            <a:pPr marL="514350" indent="-514350">
-              <a:buAutoNum type="arabicPeriod"/>
-            </a:pPr>
-            <a:r>
-              <a:rPr lang="en-US" dirty="0"/>
-              <a:t>Gather anecdotal evidence to support </a:t>
-            </a:r>
-            <a:r>
-              <a:rPr lang="en-US" i="1" dirty="0"/>
-              <a:t>The N Commandments of Collaborative Computing</a:t>
-            </a:r>
-            <a:endParaRPr lang="en-US" dirty="0"/>
-          </a:p>
-          <a:p>
-            <a:pPr marL="514350" indent="-514350">
-              <a:buAutoNum type="arabicPeriod"/>
-            </a:pPr>
-            <a:r>
-              <a:rPr lang="en-US" dirty="0"/>
-              <a:t>Focus on digital aspects and tools that worked (or not)</a:t>
-            </a:r>
           </a:p>
         </p:txBody>
       </p:sp>
     </p:spTree>
     <p:extLst>
       <p:ext uri="{BB962C8B-B14F-4D97-AF65-F5344CB8AC3E}">
-        <p14:creationId xmlns:p14="http://schemas.microsoft.com/office/powerpoint/2010/main" val="431935109"/>
+        <p14:creationId xmlns:p14="http://schemas.microsoft.com/office/powerpoint/2010/main" val="729585267"/>
       </p:ext>
     </p:extLst>
   </p:cSld>
@@ -3857,13 +3771,7 @@
       </p:grpSpPr>
       <p:sp>
         <p:nvSpPr>
-          <p:cNvPr id="2" name="Title 1">
-            <a:extLst>
-              <a:ext uri="{FF2B5EF4-FFF2-40B4-BE49-F238E27FC236}">
-                <a16:creationId xmlns:a16="http://schemas.microsoft.com/office/drawing/2014/main" id="{F03E117D-36C5-4FC7-8EEF-CDC513A6F7D0}"/>
-              </a:ext>
-            </a:extLst>
-          </p:cNvPr>
+          <p:cNvPr id="2" name="Title 1"/>
           <p:cNvSpPr>
             <a:spLocks noGrp="1"/>
           </p:cNvSpPr>
@@ -3877,75 +3785,50 @@
           <a:lstStyle/>
           <a:p>
             <a:r>
+              <a:rPr lang="en-US" dirty="0" smtClean="0"/>
+              <a:t>What are the cons of </a:t>
+            </a:r>
+            <a:r>
+              <a:rPr lang="en-US" dirty="0" err="1" smtClean="0"/>
+              <a:t>Github</a:t>
+            </a:r>
+            <a:r>
+              <a:rPr lang="en-US" dirty="0" smtClean="0"/>
+              <a:t>?</a:t>
+            </a:r>
+            <a:endParaRPr lang="en-US" dirty="0"/>
+          </a:p>
+        </p:txBody>
+      </p:sp>
+      <p:sp>
+        <p:nvSpPr>
+          <p:cNvPr id="3" name="Content Placeholder 2"/>
+          <p:cNvSpPr>
+            <a:spLocks noGrp="1"/>
+          </p:cNvSpPr>
+          <p:nvPr>
+            <p:ph idx="1"/>
+          </p:nvPr>
+        </p:nvSpPr>
+        <p:spPr/>
+        <p:txBody>
+          <a:bodyPr/>
+          <a:lstStyle/>
+          <a:p>
+            <a:r>
               <a:rPr lang="en-US" dirty="0"/>
-              <a:t>Part 1: Introductions</a:t>
-            </a:r>
-          </a:p>
-        </p:txBody>
-      </p:sp>
-      <p:sp>
-        <p:nvSpPr>
-          <p:cNvPr id="3" name="Content Placeholder 2">
-            <a:extLst>
-              <a:ext uri="{FF2B5EF4-FFF2-40B4-BE49-F238E27FC236}">
-                <a16:creationId xmlns:a16="http://schemas.microsoft.com/office/drawing/2014/main" id="{C35EAB37-4B0D-4848-B2E9-CCE1852B766C}"/>
-              </a:ext>
-            </a:extLst>
-          </p:cNvPr>
-          <p:cNvSpPr>
-            <a:spLocks noGrp="1"/>
-          </p:cNvSpPr>
-          <p:nvPr>
-            <p:ph idx="1"/>
-          </p:nvPr>
-        </p:nvSpPr>
-        <p:spPr/>
-        <p:txBody>
-          <a:bodyPr/>
-          <a:lstStyle/>
-          <a:p>
-            <a:pPr marL="0" indent="0">
-              <a:buNone/>
-            </a:pPr>
-            <a:r>
-              <a:rPr lang="en-US" b="1" i="1" dirty="0"/>
-              <a:t>Share…</a:t>
-            </a:r>
+              <a:t>Discuss in groups (x minutes)</a:t>
+            </a:r>
+          </a:p>
+          <a:p>
             <a:endParaRPr lang="en-US" dirty="0"/>
-          </a:p>
-          <a:p>
-            <a:pPr marL="514350" indent="-514350">
-              <a:buAutoNum type="arabicPeriod"/>
-            </a:pPr>
-            <a:r>
-              <a:rPr lang="en-US" dirty="0"/>
-              <a:t>Institution and LTER site</a:t>
-            </a:r>
-          </a:p>
-          <a:p>
-            <a:pPr marL="514350" indent="-514350">
-              <a:buAutoNum type="arabicPeriod"/>
-            </a:pPr>
-            <a:r>
-              <a:rPr lang="en-US" dirty="0"/>
-              <a:t>Role (e.g., professor, postdoc, grad student, etc.)</a:t>
-            </a:r>
-          </a:p>
-          <a:p>
-            <a:pPr marL="514350" indent="-514350">
-              <a:buAutoNum type="arabicPeriod"/>
-            </a:pPr>
-            <a:r>
-              <a:rPr lang="en-US" dirty="0"/>
-              <a:t>Research area</a:t>
-            </a:r>
           </a:p>
         </p:txBody>
       </p:sp>
     </p:spTree>
     <p:extLst>
       <p:ext uri="{BB962C8B-B14F-4D97-AF65-F5344CB8AC3E}">
-        <p14:creationId xmlns:p14="http://schemas.microsoft.com/office/powerpoint/2010/main" val="3064312405"/>
+        <p14:creationId xmlns:p14="http://schemas.microsoft.com/office/powerpoint/2010/main" val="2478776565"/>
       </p:ext>
     </p:extLst>
   </p:cSld>
@@ -3974,13 +3857,7 @@
       </p:grpSpPr>
       <p:sp>
         <p:nvSpPr>
-          <p:cNvPr id="2" name="Title 1">
-            <a:extLst>
-              <a:ext uri="{FF2B5EF4-FFF2-40B4-BE49-F238E27FC236}">
-                <a16:creationId xmlns:a16="http://schemas.microsoft.com/office/drawing/2014/main" id="{063DBBFE-8E9D-41E2-BD09-9C4A32165836}"/>
-              </a:ext>
-            </a:extLst>
-          </p:cNvPr>
+          <p:cNvPr id="2" name="Title 1"/>
           <p:cNvSpPr>
             <a:spLocks noGrp="1"/>
           </p:cNvSpPr>
@@ -3994,21 +3871,16 @@
           <a:lstStyle/>
           <a:p>
             <a:r>
-              <a:rPr lang="en-US" dirty="0"/>
-              <a:t>Part 2: Reflecting Back</a:t>
-            </a:r>
-          </a:p>
-        </p:txBody>
-      </p:sp>
-      <p:sp>
-        <p:nvSpPr>
-          <p:cNvPr id="3" name="Content Placeholder 2">
-            <a:extLst>
-              <a:ext uri="{FF2B5EF4-FFF2-40B4-BE49-F238E27FC236}">
-                <a16:creationId xmlns:a16="http://schemas.microsoft.com/office/drawing/2014/main" id="{527F693A-CD83-4ECC-A63D-6E07BDA34141}"/>
-              </a:ext>
-            </a:extLst>
-          </p:cNvPr>
+              <a:rPr lang="en-US" dirty="0" smtClean="0"/>
+              <a:t>Resources for learning more</a:t>
+            </a:r>
+            <a:endParaRPr lang="en-US" dirty="0"/>
+          </a:p>
+        </p:txBody>
+      </p:sp>
+      <p:sp>
+        <p:nvSpPr>
+          <p:cNvPr id="3" name="Content Placeholder 2"/>
           <p:cNvSpPr>
             <a:spLocks noGrp="1"/>
           </p:cNvSpPr>
@@ -4021,48 +3893,14 @@
           <a:bodyPr/>
           <a:lstStyle/>
           <a:p>
-            <a:pPr marL="0" indent="0">
-              <a:buNone/>
-            </a:pPr>
-            <a:r>
-              <a:rPr lang="en-US" b="1" i="1" dirty="0"/>
-              <a:t>Think…</a:t>
-            </a:r>
-            <a:endParaRPr lang="en-US" dirty="0"/>
-          </a:p>
-          <a:p>
-            <a:pPr marL="514350" indent="-514350">
-              <a:buAutoNum type="arabicPeriod"/>
-            </a:pPr>
-            <a:r>
-              <a:rPr lang="en-US" dirty="0"/>
-              <a:t>Blah</a:t>
-            </a:r>
-          </a:p>
-          <a:p>
-            <a:pPr marL="514350" indent="-514350">
-              <a:buAutoNum type="arabicPeriod"/>
-            </a:pPr>
-            <a:r>
-              <a:rPr lang="en-US" dirty="0"/>
-              <a:t>Blah</a:t>
-            </a:r>
-          </a:p>
-          <a:p>
-            <a:pPr marL="0" indent="0">
-              <a:buNone/>
-            </a:pPr>
-            <a:r>
-              <a:rPr lang="en-US" b="1" i="1" dirty="0"/>
-              <a:t>Share…</a:t>
-            </a:r>
+            <a:endParaRPr lang="en-US"/>
           </a:p>
         </p:txBody>
       </p:sp>
     </p:spTree>
     <p:extLst>
       <p:ext uri="{BB962C8B-B14F-4D97-AF65-F5344CB8AC3E}">
-        <p14:creationId xmlns:p14="http://schemas.microsoft.com/office/powerpoint/2010/main" val="2276565651"/>
+        <p14:creationId xmlns:p14="http://schemas.microsoft.com/office/powerpoint/2010/main" val="1669023424"/>
       </p:ext>
     </p:extLst>
   </p:cSld>
@@ -4091,10 +3929,10 @@
       </p:grpSpPr>
       <p:sp>
         <p:nvSpPr>
-          <p:cNvPr id="2" name="Title 1">
-            <a:extLst>
-              <a:ext uri="{FF2B5EF4-FFF2-40B4-BE49-F238E27FC236}">
-                <a16:creationId xmlns:a16="http://schemas.microsoft.com/office/drawing/2014/main" id="{8767DBB4-F5AD-4316-BE61-85136EBF7846}"/>
+          <p:cNvPr id="4" name="Title 3">
+            <a:extLst>
+              <a:ext uri="{FF2B5EF4-FFF2-40B4-BE49-F238E27FC236}">
+                <a16:creationId xmlns:a16="http://schemas.microsoft.com/office/drawing/2014/main" id="{9705A81E-C182-44B8-A2EC-8959D725DCDD}"/>
               </a:ext>
             </a:extLst>
           </p:cNvPr>
@@ -4112,17 +3950,17 @@
           <a:p>
             <a:r>
               <a:rPr lang="en-US" dirty="0"/>
-              <a:t>Part 3: Looking Forward</a:t>
-            </a:r>
-          </a:p>
-        </p:txBody>
-      </p:sp>
-      <p:sp>
-        <p:nvSpPr>
-          <p:cNvPr id="3" name="Content Placeholder 2">
-            <a:extLst>
-              <a:ext uri="{FF2B5EF4-FFF2-40B4-BE49-F238E27FC236}">
-                <a16:creationId xmlns:a16="http://schemas.microsoft.com/office/drawing/2014/main" id="{29E78B52-C2A3-4828-A172-D913CA1C5929}"/>
+              <a:t>GitHub Slide Content Placeholder</a:t>
+            </a:r>
+          </a:p>
+        </p:txBody>
+      </p:sp>
+      <p:sp>
+        <p:nvSpPr>
+          <p:cNvPr id="5" name="Content Placeholder 4">
+            <a:extLst>
+              <a:ext uri="{FF2B5EF4-FFF2-40B4-BE49-F238E27FC236}">
+                <a16:creationId xmlns:a16="http://schemas.microsoft.com/office/drawing/2014/main" id="{D3373681-B988-4E83-81E7-EA69C522C2D7}"/>
               </a:ext>
             </a:extLst>
           </p:cNvPr>
@@ -4138,54 +3976,14 @@
           <a:bodyPr/>
           <a:lstStyle/>
           <a:p>
-            <a:pPr marL="0" indent="0">
-              <a:buNone/>
-            </a:pPr>
-            <a:r>
-              <a:rPr lang="en-US" b="1" i="1" dirty="0"/>
-              <a:t>Think…</a:t>
-            </a:r>
-            <a:endParaRPr lang="en-US" dirty="0"/>
-          </a:p>
-          <a:p>
-            <a:pPr marL="514350" indent="-514350">
-              <a:buAutoNum type="arabicPeriod"/>
-            </a:pPr>
-            <a:r>
-              <a:rPr lang="en-US" dirty="0"/>
-              <a:t>Blah</a:t>
-            </a:r>
-          </a:p>
-          <a:p>
-            <a:pPr marL="514350" indent="-514350">
-              <a:buAutoNum type="arabicPeriod"/>
-            </a:pPr>
-            <a:r>
-              <a:rPr lang="en-US" dirty="0"/>
-              <a:t>Blah</a:t>
-            </a:r>
-          </a:p>
-          <a:p>
-            <a:pPr marL="0" indent="0">
-              <a:buNone/>
-            </a:pPr>
-            <a:r>
-              <a:rPr lang="en-US" b="1" i="1" dirty="0"/>
-              <a:t>Share…</a:t>
-            </a:r>
-          </a:p>
-          <a:p>
-            <a:pPr marL="0" indent="0">
-              <a:buNone/>
-            </a:pPr>
-            <a:endParaRPr lang="en-US" dirty="0"/>
+            <a:endParaRPr lang="en-US"/>
           </a:p>
         </p:txBody>
       </p:sp>
     </p:spTree>
     <p:extLst>
       <p:ext uri="{BB962C8B-B14F-4D97-AF65-F5344CB8AC3E}">
-        <p14:creationId xmlns:p14="http://schemas.microsoft.com/office/powerpoint/2010/main" val="323198984"/>
+        <p14:creationId xmlns:p14="http://schemas.microsoft.com/office/powerpoint/2010/main" val="4004850297"/>
       </p:ext>
     </p:extLst>
   </p:cSld>
@@ -4240,7 +4038,7 @@
           <a:p>
             <a:r>
               <a:rPr lang="en-US" dirty="0"/>
-              <a:t>Developing the N Commandments</a:t>
+              <a:t>Learning from Past Collaborations</a:t>
             </a:r>
           </a:p>
         </p:txBody>
@@ -4273,7 +4071,7 @@
           <a:p>
             <a:r>
               <a:rPr lang="en-US" dirty="0"/>
-              <a:t>Consensus Building</a:t>
+              <a:t>Small Group Discussions</a:t>
             </a:r>
           </a:p>
         </p:txBody>
@@ -4281,7 +4079,7 @@
     </p:spTree>
     <p:extLst>
       <p:ext uri="{BB962C8B-B14F-4D97-AF65-F5344CB8AC3E}">
-        <p14:creationId xmlns:p14="http://schemas.microsoft.com/office/powerpoint/2010/main" val="885996570"/>
+        <p14:creationId xmlns:p14="http://schemas.microsoft.com/office/powerpoint/2010/main" val="1827043774"/>
       </p:ext>
     </p:extLst>
   </p:cSld>
@@ -4313,7 +4111,7 @@
           <p:cNvPr id="2" name="Title 1">
             <a:extLst>
               <a:ext uri="{FF2B5EF4-FFF2-40B4-BE49-F238E27FC236}">
-                <a16:creationId xmlns:a16="http://schemas.microsoft.com/office/drawing/2014/main" id="{D341A550-712D-4A10-8D9F-CD327680AA41}"/>
+                <a16:creationId xmlns:a16="http://schemas.microsoft.com/office/drawing/2014/main" id="{4DBB3D5F-2B2C-4880-8F07-4EA749825D10}"/>
               </a:ext>
             </a:extLst>
           </p:cNvPr>
@@ -4329,39 +4127,472 @@
           <a:bodyPr/>
           <a:lstStyle/>
           <a:p>
+            <a:r>
+              <a:rPr lang="en-US" dirty="0"/>
+              <a:t>Small Group Discussions</a:t>
+            </a:r>
+          </a:p>
+        </p:txBody>
+      </p:sp>
+      <p:sp>
+        <p:nvSpPr>
+          <p:cNvPr id="3" name="Content Placeholder 2">
+            <a:extLst>
+              <a:ext uri="{FF2B5EF4-FFF2-40B4-BE49-F238E27FC236}">
+                <a16:creationId xmlns:a16="http://schemas.microsoft.com/office/drawing/2014/main" id="{58DA7441-F606-4D88-B3AB-F330ECBB4130}"/>
+              </a:ext>
+            </a:extLst>
+          </p:cNvPr>
+          <p:cNvSpPr>
+            <a:spLocks noGrp="1"/>
+          </p:cNvSpPr>
+          <p:nvPr>
+            <p:ph idx="1"/>
+          </p:nvPr>
+        </p:nvSpPr>
+        <p:spPr/>
+        <p:txBody>
+          <a:bodyPr>
+            <a:normAutofit lnSpcReduction="10000"/>
+          </a:bodyPr>
+          <a:lstStyle/>
+          <a:p>
+            <a:pPr marL="0" indent="0">
+              <a:buNone/>
+            </a:pPr>
+            <a:r>
+              <a:rPr lang="en-US" b="1" i="1" dirty="0"/>
+              <a:t>What you’ll need…</a:t>
+            </a:r>
+          </a:p>
+          <a:p>
+            <a:pPr marL="514350" indent="-514350">
+              <a:buAutoNum type="arabicPeriod"/>
+            </a:pPr>
+            <a:r>
+              <a:rPr lang="en-US" dirty="0"/>
+              <a:t>Some people to talk with</a:t>
+            </a:r>
+          </a:p>
+          <a:p>
+            <a:pPr marL="514350" indent="-514350">
+              <a:buAutoNum type="arabicPeriod"/>
+            </a:pPr>
+            <a:r>
+              <a:rPr lang="en-US" dirty="0"/>
+              <a:t>Some notetaking technology (e.g., pen and paper, laptop, tablet)</a:t>
+            </a:r>
+          </a:p>
+          <a:p>
+            <a:pPr marL="514350" indent="-514350">
+              <a:buAutoNum type="arabicPeriod"/>
+            </a:pPr>
             <a:endParaRPr lang="en-US" dirty="0"/>
           </a:p>
-        </p:txBody>
-      </p:sp>
-      <p:sp>
-        <p:nvSpPr>
-          <p:cNvPr id="3" name="Content Placeholder 2">
-            <a:extLst>
-              <a:ext uri="{FF2B5EF4-FFF2-40B4-BE49-F238E27FC236}">
-                <a16:creationId xmlns:a16="http://schemas.microsoft.com/office/drawing/2014/main" id="{62C8C4C7-120E-4230-8E60-B64F8C51C634}"/>
-              </a:ext>
-            </a:extLst>
-          </p:cNvPr>
-          <p:cNvSpPr>
-            <a:spLocks noGrp="1"/>
-          </p:cNvSpPr>
-          <p:nvPr>
-            <p:ph idx="1"/>
-          </p:nvPr>
-        </p:nvSpPr>
-        <p:spPr/>
-        <p:txBody>
-          <a:bodyPr/>
-          <a:lstStyle/>
-          <a:p>
+          <a:p>
+            <a:pPr marL="0" indent="0">
+              <a:buNone/>
+            </a:pPr>
+            <a:r>
+              <a:rPr lang="en-US" b="1" i="1" dirty="0"/>
+              <a:t>What we’ll do…</a:t>
+            </a:r>
+          </a:p>
+          <a:p>
+            <a:pPr marL="514350" indent="-514350">
+              <a:buAutoNum type="arabicPeriod"/>
+            </a:pPr>
+            <a:r>
+              <a:rPr lang="en-US" dirty="0"/>
+              <a:t>Reflect on past collaborative experiences</a:t>
+            </a:r>
+          </a:p>
+          <a:p>
+            <a:pPr marL="514350" indent="-514350">
+              <a:buAutoNum type="arabicPeriod"/>
+            </a:pPr>
+            <a:r>
+              <a:rPr lang="en-US" dirty="0"/>
+              <a:t>Gather anecdotal evidence to support </a:t>
+            </a:r>
+            <a:r>
+              <a:rPr lang="en-US" i="1" dirty="0"/>
+              <a:t>The N Commandments of Collaborative Computing</a:t>
+            </a:r>
             <a:endParaRPr lang="en-US" dirty="0"/>
+          </a:p>
+          <a:p>
+            <a:pPr marL="514350" indent="-514350">
+              <a:buAutoNum type="arabicPeriod"/>
+            </a:pPr>
+            <a:r>
+              <a:rPr lang="en-US" dirty="0"/>
+              <a:t>Focus on digital aspects and tools that worked (or not)</a:t>
+            </a:r>
           </a:p>
         </p:txBody>
       </p:sp>
     </p:spTree>
     <p:extLst>
       <p:ext uri="{BB962C8B-B14F-4D97-AF65-F5344CB8AC3E}">
-        <p14:creationId xmlns:p14="http://schemas.microsoft.com/office/powerpoint/2010/main" val="3269339386"/>
+        <p14:creationId xmlns:p14="http://schemas.microsoft.com/office/powerpoint/2010/main" val="431935109"/>
+      </p:ext>
+    </p:extLst>
+  </p:cSld>
+  <p:clrMapOvr>
+    <a:masterClrMapping/>
+  </p:clrMapOvr>
+</p:sld>
+</file>
+
+<file path=ppt/slides/slide17.xml><?xml version="1.0" encoding="utf-8"?>
+<p:sld xmlns:a="http://schemas.openxmlformats.org/drawingml/2006/main" xmlns:r="http://schemas.openxmlformats.org/officeDocument/2006/relationships" xmlns:p="http://schemas.openxmlformats.org/presentationml/2006/main">
+  <p:cSld>
+    <p:spTree>
+      <p:nvGrpSpPr>
+        <p:cNvPr id="1" name=""/>
+        <p:cNvGrpSpPr/>
+        <p:nvPr/>
+      </p:nvGrpSpPr>
+      <p:grpSpPr>
+        <a:xfrm>
+          <a:off x="0" y="0"/>
+          <a:ext cx="0" cy="0"/>
+          <a:chOff x="0" y="0"/>
+          <a:chExt cx="0" cy="0"/>
+        </a:xfrm>
+      </p:grpSpPr>
+      <p:sp>
+        <p:nvSpPr>
+          <p:cNvPr id="2" name="Title 1">
+            <a:extLst>
+              <a:ext uri="{FF2B5EF4-FFF2-40B4-BE49-F238E27FC236}">
+                <a16:creationId xmlns:a16="http://schemas.microsoft.com/office/drawing/2014/main" id="{F03E117D-36C5-4FC7-8EEF-CDC513A6F7D0}"/>
+              </a:ext>
+            </a:extLst>
+          </p:cNvPr>
+          <p:cNvSpPr>
+            <a:spLocks noGrp="1"/>
+          </p:cNvSpPr>
+          <p:nvPr>
+            <p:ph type="title"/>
+          </p:nvPr>
+        </p:nvSpPr>
+        <p:spPr/>
+        <p:txBody>
+          <a:bodyPr/>
+          <a:lstStyle/>
+          <a:p>
+            <a:r>
+              <a:rPr lang="en-US" dirty="0"/>
+              <a:t>Part 1: Introductions</a:t>
+            </a:r>
+          </a:p>
+        </p:txBody>
+      </p:sp>
+      <p:sp>
+        <p:nvSpPr>
+          <p:cNvPr id="3" name="Content Placeholder 2">
+            <a:extLst>
+              <a:ext uri="{FF2B5EF4-FFF2-40B4-BE49-F238E27FC236}">
+                <a16:creationId xmlns:a16="http://schemas.microsoft.com/office/drawing/2014/main" id="{C35EAB37-4B0D-4848-B2E9-CCE1852B766C}"/>
+              </a:ext>
+            </a:extLst>
+          </p:cNvPr>
+          <p:cNvSpPr>
+            <a:spLocks noGrp="1"/>
+          </p:cNvSpPr>
+          <p:nvPr>
+            <p:ph idx="1"/>
+          </p:nvPr>
+        </p:nvSpPr>
+        <p:spPr/>
+        <p:txBody>
+          <a:bodyPr/>
+          <a:lstStyle/>
+          <a:p>
+            <a:pPr marL="0" indent="0">
+              <a:buNone/>
+            </a:pPr>
+            <a:r>
+              <a:rPr lang="en-US" b="1" i="1" dirty="0"/>
+              <a:t>Share…</a:t>
+            </a:r>
+            <a:endParaRPr lang="en-US" dirty="0"/>
+          </a:p>
+          <a:p>
+            <a:pPr marL="514350" indent="-514350">
+              <a:buAutoNum type="arabicPeriod"/>
+            </a:pPr>
+            <a:r>
+              <a:rPr lang="en-US" dirty="0"/>
+              <a:t>Institution and LTER site</a:t>
+            </a:r>
+          </a:p>
+          <a:p>
+            <a:pPr marL="514350" indent="-514350">
+              <a:buAutoNum type="arabicPeriod"/>
+            </a:pPr>
+            <a:r>
+              <a:rPr lang="en-US" dirty="0"/>
+              <a:t>Role (e.g., professor, postdoc, grad student, etc.)</a:t>
+            </a:r>
+          </a:p>
+          <a:p>
+            <a:pPr marL="514350" indent="-514350">
+              <a:buAutoNum type="arabicPeriod"/>
+            </a:pPr>
+            <a:r>
+              <a:rPr lang="en-US" dirty="0"/>
+              <a:t>Research area</a:t>
+            </a:r>
+          </a:p>
+        </p:txBody>
+      </p:sp>
+    </p:spTree>
+    <p:extLst>
+      <p:ext uri="{BB962C8B-B14F-4D97-AF65-F5344CB8AC3E}">
+        <p14:creationId xmlns:p14="http://schemas.microsoft.com/office/powerpoint/2010/main" val="3064312405"/>
+      </p:ext>
+    </p:extLst>
+  </p:cSld>
+  <p:clrMapOvr>
+    <a:masterClrMapping/>
+  </p:clrMapOvr>
+</p:sld>
+</file>
+
+<file path=ppt/slides/slide18.xml><?xml version="1.0" encoding="utf-8"?>
+<p:sld xmlns:a="http://schemas.openxmlformats.org/drawingml/2006/main" xmlns:r="http://schemas.openxmlformats.org/officeDocument/2006/relationships" xmlns:p="http://schemas.openxmlformats.org/presentationml/2006/main">
+  <p:cSld>
+    <p:spTree>
+      <p:nvGrpSpPr>
+        <p:cNvPr id="1" name=""/>
+        <p:cNvGrpSpPr/>
+        <p:nvPr/>
+      </p:nvGrpSpPr>
+      <p:grpSpPr>
+        <a:xfrm>
+          <a:off x="0" y="0"/>
+          <a:ext cx="0" cy="0"/>
+          <a:chOff x="0" y="0"/>
+          <a:chExt cx="0" cy="0"/>
+        </a:xfrm>
+      </p:grpSpPr>
+      <p:sp>
+        <p:nvSpPr>
+          <p:cNvPr id="2" name="Title 1">
+            <a:extLst>
+              <a:ext uri="{FF2B5EF4-FFF2-40B4-BE49-F238E27FC236}">
+                <a16:creationId xmlns:a16="http://schemas.microsoft.com/office/drawing/2014/main" id="{063DBBFE-8E9D-41E2-BD09-9C4A32165836}"/>
+              </a:ext>
+            </a:extLst>
+          </p:cNvPr>
+          <p:cNvSpPr>
+            <a:spLocks noGrp="1"/>
+          </p:cNvSpPr>
+          <p:nvPr>
+            <p:ph type="title"/>
+          </p:nvPr>
+        </p:nvSpPr>
+        <p:spPr/>
+        <p:txBody>
+          <a:bodyPr/>
+          <a:lstStyle/>
+          <a:p>
+            <a:r>
+              <a:rPr lang="en-US" dirty="0"/>
+              <a:t>Part 2: Reflecting Back</a:t>
+            </a:r>
+          </a:p>
+        </p:txBody>
+      </p:sp>
+      <p:sp>
+        <p:nvSpPr>
+          <p:cNvPr id="3" name="Content Placeholder 2">
+            <a:extLst>
+              <a:ext uri="{FF2B5EF4-FFF2-40B4-BE49-F238E27FC236}">
+                <a16:creationId xmlns:a16="http://schemas.microsoft.com/office/drawing/2014/main" id="{527F693A-CD83-4ECC-A63D-6E07BDA34141}"/>
+              </a:ext>
+            </a:extLst>
+          </p:cNvPr>
+          <p:cNvSpPr>
+            <a:spLocks noGrp="1"/>
+          </p:cNvSpPr>
+          <p:nvPr>
+            <p:ph idx="1"/>
+          </p:nvPr>
+        </p:nvSpPr>
+        <p:spPr/>
+        <p:txBody>
+          <a:bodyPr/>
+          <a:lstStyle/>
+          <a:p>
+            <a:pPr marL="0" indent="0">
+              <a:buNone/>
+            </a:pPr>
+            <a:r>
+              <a:rPr lang="en-US" b="1" i="1" dirty="0"/>
+              <a:t>Think…</a:t>
+            </a:r>
+            <a:endParaRPr lang="en-US" dirty="0"/>
+          </a:p>
+          <a:p>
+            <a:pPr marL="514350" indent="-514350">
+              <a:buAutoNum type="arabicPeriod"/>
+            </a:pPr>
+            <a:r>
+              <a:rPr lang="en-US" dirty="0"/>
+              <a:t>Blah</a:t>
+            </a:r>
+          </a:p>
+          <a:p>
+            <a:pPr marL="514350" indent="-514350">
+              <a:buAutoNum type="arabicPeriod"/>
+            </a:pPr>
+            <a:r>
+              <a:rPr lang="en-US" dirty="0"/>
+              <a:t>Blah</a:t>
+            </a:r>
+          </a:p>
+          <a:p>
+            <a:pPr marL="0" indent="0">
+              <a:buNone/>
+            </a:pPr>
+            <a:r>
+              <a:rPr lang="en-US" b="1" i="1" dirty="0"/>
+              <a:t>Share…</a:t>
+            </a:r>
+          </a:p>
+        </p:txBody>
+      </p:sp>
+    </p:spTree>
+    <p:extLst>
+      <p:ext uri="{BB962C8B-B14F-4D97-AF65-F5344CB8AC3E}">
+        <p14:creationId xmlns:p14="http://schemas.microsoft.com/office/powerpoint/2010/main" val="2276565651"/>
+      </p:ext>
+    </p:extLst>
+  </p:cSld>
+  <p:clrMapOvr>
+    <a:masterClrMapping/>
+  </p:clrMapOvr>
+</p:sld>
+</file>
+
+<file path=ppt/slides/slide19.xml><?xml version="1.0" encoding="utf-8"?>
+<p:sld xmlns:a="http://schemas.openxmlformats.org/drawingml/2006/main" xmlns:r="http://schemas.openxmlformats.org/officeDocument/2006/relationships" xmlns:p="http://schemas.openxmlformats.org/presentationml/2006/main">
+  <p:cSld>
+    <p:spTree>
+      <p:nvGrpSpPr>
+        <p:cNvPr id="1" name=""/>
+        <p:cNvGrpSpPr/>
+        <p:nvPr/>
+      </p:nvGrpSpPr>
+      <p:grpSpPr>
+        <a:xfrm>
+          <a:off x="0" y="0"/>
+          <a:ext cx="0" cy="0"/>
+          <a:chOff x="0" y="0"/>
+          <a:chExt cx="0" cy="0"/>
+        </a:xfrm>
+      </p:grpSpPr>
+      <p:sp>
+        <p:nvSpPr>
+          <p:cNvPr id="2" name="Title 1">
+            <a:extLst>
+              <a:ext uri="{FF2B5EF4-FFF2-40B4-BE49-F238E27FC236}">
+                <a16:creationId xmlns:a16="http://schemas.microsoft.com/office/drawing/2014/main" id="{8767DBB4-F5AD-4316-BE61-85136EBF7846}"/>
+              </a:ext>
+            </a:extLst>
+          </p:cNvPr>
+          <p:cNvSpPr>
+            <a:spLocks noGrp="1"/>
+          </p:cNvSpPr>
+          <p:nvPr>
+            <p:ph type="title"/>
+          </p:nvPr>
+        </p:nvSpPr>
+        <p:spPr/>
+        <p:txBody>
+          <a:bodyPr/>
+          <a:lstStyle/>
+          <a:p>
+            <a:r>
+              <a:rPr lang="en-US" dirty="0"/>
+              <a:t>Part 3: Looking Forward</a:t>
+            </a:r>
+          </a:p>
+        </p:txBody>
+      </p:sp>
+      <p:sp>
+        <p:nvSpPr>
+          <p:cNvPr id="3" name="Content Placeholder 2">
+            <a:extLst>
+              <a:ext uri="{FF2B5EF4-FFF2-40B4-BE49-F238E27FC236}">
+                <a16:creationId xmlns:a16="http://schemas.microsoft.com/office/drawing/2014/main" id="{29E78B52-C2A3-4828-A172-D913CA1C5929}"/>
+              </a:ext>
+            </a:extLst>
+          </p:cNvPr>
+          <p:cNvSpPr>
+            <a:spLocks noGrp="1"/>
+          </p:cNvSpPr>
+          <p:nvPr>
+            <p:ph idx="1"/>
+          </p:nvPr>
+        </p:nvSpPr>
+        <p:spPr/>
+        <p:txBody>
+          <a:bodyPr/>
+          <a:lstStyle/>
+          <a:p>
+            <a:pPr marL="0" indent="0">
+              <a:buNone/>
+            </a:pPr>
+            <a:r>
+              <a:rPr lang="en-US" b="1" i="1" dirty="0"/>
+              <a:t>Think…</a:t>
+            </a:r>
+            <a:endParaRPr lang="en-US" dirty="0"/>
+          </a:p>
+          <a:p>
+            <a:pPr marL="514350" indent="-514350">
+              <a:buAutoNum type="arabicPeriod"/>
+            </a:pPr>
+            <a:r>
+              <a:rPr lang="en-US" dirty="0"/>
+              <a:t>Blah</a:t>
+            </a:r>
+          </a:p>
+          <a:p>
+            <a:pPr marL="514350" indent="-514350">
+              <a:buAutoNum type="arabicPeriod"/>
+            </a:pPr>
+            <a:r>
+              <a:rPr lang="en-US" dirty="0"/>
+              <a:t>Blah</a:t>
+            </a:r>
+          </a:p>
+          <a:p>
+            <a:pPr marL="0" indent="0">
+              <a:buNone/>
+            </a:pPr>
+            <a:r>
+              <a:rPr lang="en-US" b="1" i="1" dirty="0"/>
+              <a:t>Share…</a:t>
+            </a:r>
+          </a:p>
+          <a:p>
+            <a:pPr marL="0" indent="0">
+              <a:buNone/>
+            </a:pPr>
+            <a:endParaRPr lang="en-US" dirty="0"/>
+          </a:p>
+        </p:txBody>
+      </p:sp>
+    </p:spTree>
+    <p:extLst>
+      <p:ext uri="{BB962C8B-B14F-4D97-AF65-F5344CB8AC3E}">
+        <p14:creationId xmlns:p14="http://schemas.microsoft.com/office/powerpoint/2010/main" val="323198984"/>
       </p:ext>
     </p:extLst>
   </p:cSld>
@@ -4796,6 +5027,182 @@
 </p:sld>
 </file>
 
+<file path=ppt/slides/slide20.xml><?xml version="1.0" encoding="utf-8"?>
+<p:sld xmlns:a="http://schemas.openxmlformats.org/drawingml/2006/main" xmlns:r="http://schemas.openxmlformats.org/officeDocument/2006/relationships" xmlns:p="http://schemas.openxmlformats.org/presentationml/2006/main">
+  <p:cSld>
+    <p:spTree>
+      <p:nvGrpSpPr>
+        <p:cNvPr id="1" name=""/>
+        <p:cNvGrpSpPr/>
+        <p:nvPr/>
+      </p:nvGrpSpPr>
+      <p:grpSpPr>
+        <a:xfrm>
+          <a:off x="0" y="0"/>
+          <a:ext cx="0" cy="0"/>
+          <a:chOff x="0" y="0"/>
+          <a:chExt cx="0" cy="0"/>
+        </a:xfrm>
+      </p:grpSpPr>
+      <p:sp>
+        <p:nvSpPr>
+          <p:cNvPr id="3" name="Text Placeholder 2">
+            <a:extLst>
+              <a:ext uri="{FF2B5EF4-FFF2-40B4-BE49-F238E27FC236}">
+                <a16:creationId xmlns:a16="http://schemas.microsoft.com/office/drawing/2014/main" id="{CBBEC366-C759-494E-BEFD-6DED92045DAC}"/>
+              </a:ext>
+            </a:extLst>
+          </p:cNvPr>
+          <p:cNvSpPr>
+            <a:spLocks noGrp="1"/>
+          </p:cNvSpPr>
+          <p:nvPr>
+            <p:ph type="body" idx="1"/>
+          </p:nvPr>
+        </p:nvSpPr>
+        <p:spPr>
+          <a:xfrm>
+            <a:off x="831850" y="4589464"/>
+            <a:ext cx="10515600" cy="430212"/>
+          </a:xfrm>
+        </p:spPr>
+        <p:txBody>
+          <a:bodyPr/>
+          <a:lstStyle/>
+          <a:p>
+            <a:r>
+              <a:rPr lang="en-US" dirty="0"/>
+              <a:t>Developing the N Commandments</a:t>
+            </a:r>
+          </a:p>
+        </p:txBody>
+      </p:sp>
+      <p:sp>
+        <p:nvSpPr>
+          <p:cNvPr id="7" name="Title 6">
+            <a:extLst>
+              <a:ext uri="{FF2B5EF4-FFF2-40B4-BE49-F238E27FC236}">
+                <a16:creationId xmlns:a16="http://schemas.microsoft.com/office/drawing/2014/main" id="{52783F39-79B3-4870-B7E0-BCD7EAF177B0}"/>
+              </a:ext>
+            </a:extLst>
+          </p:cNvPr>
+          <p:cNvSpPr>
+            <a:spLocks noGrp="1"/>
+          </p:cNvSpPr>
+          <p:nvPr>
+            <p:ph type="title"/>
+          </p:nvPr>
+        </p:nvSpPr>
+        <p:spPr>
+          <a:xfrm>
+            <a:off x="831850" y="3648075"/>
+            <a:ext cx="10515600" cy="914400"/>
+          </a:xfrm>
+        </p:spPr>
+        <p:txBody>
+          <a:bodyPr/>
+          <a:lstStyle/>
+          <a:p>
+            <a:r>
+              <a:rPr lang="en-US" dirty="0"/>
+              <a:t>Consensus Building</a:t>
+            </a:r>
+          </a:p>
+        </p:txBody>
+      </p:sp>
+    </p:spTree>
+    <p:extLst>
+      <p:ext uri="{BB962C8B-B14F-4D97-AF65-F5344CB8AC3E}">
+        <p14:creationId xmlns:p14="http://schemas.microsoft.com/office/powerpoint/2010/main" val="885996570"/>
+      </p:ext>
+    </p:extLst>
+  </p:cSld>
+  <p:clrMapOvr>
+    <a:masterClrMapping/>
+  </p:clrMapOvr>
+</p:sld>
+</file>
+
+<file path=ppt/slides/slide21.xml><?xml version="1.0" encoding="utf-8"?>
+<p:sld xmlns:a="http://schemas.openxmlformats.org/drawingml/2006/main" xmlns:r="http://schemas.openxmlformats.org/officeDocument/2006/relationships" xmlns:p="http://schemas.openxmlformats.org/presentationml/2006/main">
+  <p:cSld>
+    <p:spTree>
+      <p:nvGrpSpPr>
+        <p:cNvPr id="1" name=""/>
+        <p:cNvGrpSpPr/>
+        <p:nvPr/>
+      </p:nvGrpSpPr>
+      <p:grpSpPr>
+        <a:xfrm>
+          <a:off x="0" y="0"/>
+          <a:ext cx="0" cy="0"/>
+          <a:chOff x="0" y="0"/>
+          <a:chExt cx="0" cy="0"/>
+        </a:xfrm>
+      </p:grpSpPr>
+      <p:sp>
+        <p:nvSpPr>
+          <p:cNvPr id="2" name="Title 1">
+            <a:extLst>
+              <a:ext uri="{FF2B5EF4-FFF2-40B4-BE49-F238E27FC236}">
+                <a16:creationId xmlns:a16="http://schemas.microsoft.com/office/drawing/2014/main" id="{D341A550-712D-4A10-8D9F-CD327680AA41}"/>
+              </a:ext>
+            </a:extLst>
+          </p:cNvPr>
+          <p:cNvSpPr>
+            <a:spLocks noGrp="1"/>
+          </p:cNvSpPr>
+          <p:nvPr>
+            <p:ph type="title"/>
+          </p:nvPr>
+        </p:nvSpPr>
+        <p:spPr/>
+        <p:txBody>
+          <a:bodyPr/>
+          <a:lstStyle/>
+          <a:p>
+            <a:endParaRPr lang="en-US" dirty="0"/>
+          </a:p>
+        </p:txBody>
+      </p:sp>
+      <p:sp>
+        <p:nvSpPr>
+          <p:cNvPr id="3" name="Content Placeholder 2">
+            <a:extLst>
+              <a:ext uri="{FF2B5EF4-FFF2-40B4-BE49-F238E27FC236}">
+                <a16:creationId xmlns:a16="http://schemas.microsoft.com/office/drawing/2014/main" id="{62C8C4C7-120E-4230-8E60-B64F8C51C634}"/>
+              </a:ext>
+            </a:extLst>
+          </p:cNvPr>
+          <p:cNvSpPr>
+            <a:spLocks noGrp="1"/>
+          </p:cNvSpPr>
+          <p:nvPr>
+            <p:ph idx="1"/>
+          </p:nvPr>
+        </p:nvSpPr>
+        <p:spPr/>
+        <p:txBody>
+          <a:bodyPr/>
+          <a:lstStyle/>
+          <a:p>
+            <a:endParaRPr lang="en-US" dirty="0"/>
+          </a:p>
+        </p:txBody>
+      </p:sp>
+    </p:spTree>
+    <p:extLst>
+      <p:ext uri="{BB962C8B-B14F-4D97-AF65-F5344CB8AC3E}">
+        <p14:creationId xmlns:p14="http://schemas.microsoft.com/office/powerpoint/2010/main" val="3269339386"/>
+      </p:ext>
+    </p:extLst>
+  </p:cSld>
+  <p:clrMapOvr>
+    <a:masterClrMapping/>
+  </p:clrMapOvr>
+</p:sld>
+</file>
+
 <file path=ppt/slides/slide3.xml><?xml version="1.0" encoding="utf-8"?>
 <p:sld xmlns:a="http://schemas.openxmlformats.org/drawingml/2006/main" xmlns:r="http://schemas.openxmlformats.org/officeDocument/2006/relationships" xmlns:p="http://schemas.openxmlformats.org/presentationml/2006/main">
   <p:cSld>
@@ -5495,15 +5902,9 @@
       </p:sp>
       <p:pic>
         <p:nvPicPr>
-          <p:cNvPr id="9" name="Picture 8">
-            <a:extLst>
-              <a:ext uri="{FF2B5EF4-FFF2-40B4-BE49-F238E27FC236}">
-                <a16:creationId xmlns:a16="http://schemas.microsoft.com/office/drawing/2014/main" id="{42E912D8-9912-46ED-926B-7589D0A17E4C}"/>
-              </a:ext>
-            </a:extLst>
-          </p:cNvPr>
+          <p:cNvPr id="5" name="Picture 2" descr="Image result for github"/>
           <p:cNvPicPr>
-            <a:picLocks noChangeAspect="1"/>
+            <a:picLocks noChangeAspect="1" noChangeArrowheads="1"/>
           </p:cNvPicPr>
           <p:nvPr/>
         </p:nvPicPr>
@@ -5515,18 +5916,29 @@
               </a:ext>
             </a:extLst>
           </a:blip>
+          <a:srcRect/>
           <a:stretch>
             <a:fillRect/>
           </a:stretch>
         </p:blipFill>
-        <p:spPr>
+        <p:spPr bwMode="auto">
           <a:xfrm>
-            <a:off x="9710104" y="3648075"/>
-            <a:ext cx="1650046" cy="1371601"/>
+            <a:off x="6821847" y="2035060"/>
+            <a:ext cx="3590515" cy="2984616"/>
           </a:xfrm>
           <a:prstGeom prst="rect">
             <a:avLst/>
           </a:prstGeom>
+          <a:noFill/>
+          <a:extLst>
+            <a:ext uri="{909E8E84-426E-40DD-AFC4-6F175D3DCCD1}">
+              <a14:hiddenFill xmlns:a14="http://schemas.microsoft.com/office/drawing/2010/main">
+                <a:solidFill>
+                  <a:srgbClr val="FFFFFF"/>
+                </a:solidFill>
+              </a14:hiddenFill>
+            </a:ext>
+          </a:extLst>
         </p:spPr>
       </p:pic>
     </p:spTree>
@@ -5561,13 +5973,7 @@
       </p:grpSpPr>
       <p:sp>
         <p:nvSpPr>
-          <p:cNvPr id="4" name="Title 3">
-            <a:extLst>
-              <a:ext uri="{FF2B5EF4-FFF2-40B4-BE49-F238E27FC236}">
-                <a16:creationId xmlns:a16="http://schemas.microsoft.com/office/drawing/2014/main" id="{9705A81E-C182-44B8-A2EC-8959D725DCDD}"/>
-              </a:ext>
-            </a:extLst>
-          </p:cNvPr>
+          <p:cNvPr id="2" name="Title 1"/>
           <p:cNvSpPr>
             <a:spLocks noGrp="1"/>
           </p:cNvSpPr>
@@ -5581,41 +5987,71 @@
           <a:lstStyle/>
           <a:p>
             <a:r>
+              <a:rPr lang="en-US" dirty="0" smtClean="0"/>
+              <a:t>What is </a:t>
+            </a:r>
+            <a:r>
+              <a:rPr lang="en-US" dirty="0" err="1" smtClean="0"/>
+              <a:t>Github</a:t>
+            </a:r>
+            <a:r>
+              <a:rPr lang="en-US" dirty="0" smtClean="0"/>
+              <a:t>?</a:t>
+            </a:r>
+            <a:endParaRPr lang="en-US" dirty="0"/>
+          </a:p>
+        </p:txBody>
+      </p:sp>
+      <p:sp>
+        <p:nvSpPr>
+          <p:cNvPr id="3" name="Content Placeholder 2"/>
+          <p:cNvSpPr>
+            <a:spLocks noGrp="1"/>
+          </p:cNvSpPr>
+          <p:nvPr>
+            <p:ph idx="1"/>
+          </p:nvPr>
+        </p:nvSpPr>
+        <p:spPr/>
+        <p:txBody>
+          <a:bodyPr/>
+          <a:lstStyle/>
+          <a:p>
+            <a:r>
               <a:rPr lang="en-US" dirty="0"/>
-              <a:t>GitHub Slide Content Placeholder</a:t>
-            </a:r>
-          </a:p>
-        </p:txBody>
-      </p:sp>
-      <p:sp>
-        <p:nvSpPr>
-          <p:cNvPr id="5" name="Content Placeholder 4">
-            <a:extLst>
-              <a:ext uri="{FF2B5EF4-FFF2-40B4-BE49-F238E27FC236}">
-                <a16:creationId xmlns:a16="http://schemas.microsoft.com/office/drawing/2014/main" id="{D3373681-B988-4E83-81E7-EA69C522C2D7}"/>
-              </a:ext>
-            </a:extLst>
-          </p:cNvPr>
-          <p:cNvSpPr>
-            <a:spLocks noGrp="1"/>
-          </p:cNvSpPr>
-          <p:nvPr>
-            <p:ph idx="1"/>
-          </p:nvPr>
-        </p:nvSpPr>
-        <p:spPr/>
-        <p:txBody>
-          <a:bodyPr/>
-          <a:lstStyle/>
-          <a:p>
-            <a:endParaRPr lang="en-US"/>
+              <a:t>The repo</a:t>
+            </a:r>
+          </a:p>
+          <a:p>
+            <a:r>
+              <a:rPr lang="en-US" dirty="0"/>
+              <a:t>What is a pull request?</a:t>
+            </a:r>
+          </a:p>
+          <a:p>
+            <a:r>
+              <a:rPr lang="en-US" dirty="0"/>
+              <a:t>What is a fork?</a:t>
+            </a:r>
+          </a:p>
+          <a:p>
+            <a:r>
+              <a:rPr lang="en-US" dirty="0"/>
+              <a:t>Using the issues page?</a:t>
+            </a:r>
+          </a:p>
+          <a:p>
+            <a:pPr marL="0" indent="0">
+              <a:buNone/>
+            </a:pPr>
+            <a:endParaRPr lang="en-US" dirty="0"/>
           </a:p>
         </p:txBody>
       </p:sp>
     </p:spTree>
     <p:extLst>
       <p:ext uri="{BB962C8B-B14F-4D97-AF65-F5344CB8AC3E}">
-        <p14:creationId xmlns:p14="http://schemas.microsoft.com/office/powerpoint/2010/main" val="4004850297"/>
+        <p14:creationId xmlns:p14="http://schemas.microsoft.com/office/powerpoint/2010/main" val="2786982912"/>
       </p:ext>
     </p:extLst>
   </p:cSld>

</xml_diff>

<commit_message>
Small edits, stored in branch
</commit_message>
<xml_diff>
--- a/pres_deck.pptx
+++ b/pres_deck.pptx
@@ -4240,7 +4240,11 @@
           <a:p>
             <a:r>
               <a:rPr lang="en-US" dirty="0"/>
-              <a:t>Developing the N Commandments</a:t>
+              <a:t>Developing </a:t>
+            </a:r>
+            <a:r>
+              <a:rPr lang="en-US" i="1" dirty="0"/>
+              <a:t>The N Commandments</a:t>
             </a:r>
           </a:p>
         </p:txBody>

</xml_diff>

<commit_message>
Added prompts to discussion slides, guidelines to consensus building slides
</commit_message>
<xml_diff>
--- a/pres_deck.pptx
+++ b/pres_deck.pptx
@@ -38,6 +38,8 @@
     <p:sldId id="269" r:id="rId32"/>
     <p:sldId id="271" r:id="rId33"/>
     <p:sldId id="270" r:id="rId34"/>
+    <p:sldId id="292" r:id="rId35"/>
+    <p:sldId id="293" r:id="rId36"/>
   </p:sldIdLst>
   <p:sldSz cx="12192000" cy="6858000"/>
   <p:notesSz cx="6858000" cy="9144000"/>
@@ -186,6 +188,8 @@
           <p14:sldIdLst>
             <p14:sldId id="271"/>
             <p14:sldId id="270"/>
+            <p14:sldId id="292"/>
+            <p14:sldId id="293"/>
           </p14:sldIdLst>
         </p14:section>
       </p14:sectionLst>
@@ -344,7 +348,7 @@
           <a:p>
             <a:fld id="{6A2BB79C-6BB1-4438-8F46-9EDF1954807C}" type="datetimeFigureOut">
               <a:rPr lang="en-US" smtClean="0"/>
-              <a:t>9/24/2018</a:t>
+              <a:t>9/25/2018</a:t>
             </a:fld>
             <a:endParaRPr lang="en-US"/>
           </a:p>
@@ -542,7 +546,7 @@
           <a:p>
             <a:fld id="{6A2BB79C-6BB1-4438-8F46-9EDF1954807C}" type="datetimeFigureOut">
               <a:rPr lang="en-US" smtClean="0"/>
-              <a:t>9/24/2018</a:t>
+              <a:t>9/25/2018</a:t>
             </a:fld>
             <a:endParaRPr lang="en-US"/>
           </a:p>
@@ -750,7 +754,7 @@
           <a:p>
             <a:fld id="{6A2BB79C-6BB1-4438-8F46-9EDF1954807C}" type="datetimeFigureOut">
               <a:rPr lang="en-US" smtClean="0"/>
-              <a:t>9/24/2018</a:t>
+              <a:t>9/25/2018</a:t>
             </a:fld>
             <a:endParaRPr lang="en-US"/>
           </a:p>
@@ -948,7 +952,7 @@
           <a:p>
             <a:fld id="{6A2BB79C-6BB1-4438-8F46-9EDF1954807C}" type="datetimeFigureOut">
               <a:rPr lang="en-US" smtClean="0"/>
-              <a:t>9/24/2018</a:t>
+              <a:t>9/25/2018</a:t>
             </a:fld>
             <a:endParaRPr lang="en-US"/>
           </a:p>
@@ -1223,7 +1227,7 @@
           <a:p>
             <a:fld id="{6A2BB79C-6BB1-4438-8F46-9EDF1954807C}" type="datetimeFigureOut">
               <a:rPr lang="en-US" smtClean="0"/>
-              <a:t>9/24/2018</a:t>
+              <a:t>9/25/2018</a:t>
             </a:fld>
             <a:endParaRPr lang="en-US"/>
           </a:p>
@@ -1488,7 +1492,7 @@
           <a:p>
             <a:fld id="{6A2BB79C-6BB1-4438-8F46-9EDF1954807C}" type="datetimeFigureOut">
               <a:rPr lang="en-US" smtClean="0"/>
-              <a:t>9/24/2018</a:t>
+              <a:t>9/25/2018</a:t>
             </a:fld>
             <a:endParaRPr lang="en-US"/>
           </a:p>
@@ -1900,7 +1904,7 @@
           <a:p>
             <a:fld id="{6A2BB79C-6BB1-4438-8F46-9EDF1954807C}" type="datetimeFigureOut">
               <a:rPr lang="en-US" smtClean="0"/>
-              <a:t>9/24/2018</a:t>
+              <a:t>9/25/2018</a:t>
             </a:fld>
             <a:endParaRPr lang="en-US"/>
           </a:p>
@@ -2041,7 +2045,7 @@
           <a:p>
             <a:fld id="{6A2BB79C-6BB1-4438-8F46-9EDF1954807C}" type="datetimeFigureOut">
               <a:rPr lang="en-US" smtClean="0"/>
-              <a:t>9/24/2018</a:t>
+              <a:t>9/25/2018</a:t>
             </a:fld>
             <a:endParaRPr lang="en-US"/>
           </a:p>
@@ -2154,7 +2158,7 @@
           <a:p>
             <a:fld id="{6A2BB79C-6BB1-4438-8F46-9EDF1954807C}" type="datetimeFigureOut">
               <a:rPr lang="en-US" smtClean="0"/>
-              <a:t>9/24/2018</a:t>
+              <a:t>9/25/2018</a:t>
             </a:fld>
             <a:endParaRPr lang="en-US"/>
           </a:p>
@@ -2465,7 +2469,7 @@
           <a:p>
             <a:fld id="{6A2BB79C-6BB1-4438-8F46-9EDF1954807C}" type="datetimeFigureOut">
               <a:rPr lang="en-US" smtClean="0"/>
-              <a:t>9/24/2018</a:t>
+              <a:t>9/25/2018</a:t>
             </a:fld>
             <a:endParaRPr lang="en-US"/>
           </a:p>
@@ -2753,7 +2757,7 @@
           <a:p>
             <a:fld id="{6A2BB79C-6BB1-4438-8F46-9EDF1954807C}" type="datetimeFigureOut">
               <a:rPr lang="en-US" smtClean="0"/>
-              <a:t>9/24/2018</a:t>
+              <a:t>9/25/2018</a:t>
             </a:fld>
             <a:endParaRPr lang="en-US"/>
           </a:p>
@@ -2994,7 +2998,7 @@
           <a:p>
             <a:fld id="{6A2BB79C-6BB1-4438-8F46-9EDF1954807C}" type="datetimeFigureOut">
               <a:rPr lang="en-US" smtClean="0"/>
-              <a:t>9/24/2018</a:t>
+              <a:t>9/25/2018</a:t>
             </a:fld>
             <a:endParaRPr lang="en-US"/>
           </a:p>
@@ -3653,26 +3657,25 @@
           <a:lstStyle/>
           <a:p>
             <a:r>
-              <a:rPr lang="en-US" dirty="0" smtClean="0"/>
+              <a:rPr lang="en-US" dirty="0"/>
               <a:t>What is </a:t>
             </a:r>
             <a:r>
-              <a:rPr lang="en-US" dirty="0" err="1" smtClean="0"/>
+              <a:rPr lang="en-US" dirty="0" err="1"/>
               <a:t>Git</a:t>
             </a:r>
             <a:r>
-              <a:rPr lang="en-US" dirty="0" smtClean="0"/>
+              <a:rPr lang="en-US" dirty="0"/>
               <a:t>/ </a:t>
             </a:r>
             <a:r>
-              <a:rPr lang="en-US" dirty="0" err="1" smtClean="0"/>
+              <a:rPr lang="en-US" dirty="0" err="1"/>
               <a:t>Github</a:t>
             </a:r>
             <a:r>
-              <a:rPr lang="en-US" dirty="0" smtClean="0"/>
+              <a:rPr lang="en-US" dirty="0"/>
               <a:t>?</a:t>
             </a:r>
-            <a:endParaRPr lang="en-US" dirty="0"/>
           </a:p>
         </p:txBody>
       </p:sp>
@@ -3697,25 +3700,25 @@
           <a:lstStyle/>
           <a:p>
             <a:r>
-              <a:rPr lang="en-US" dirty="0" err="1" smtClean="0"/>
+              <a:rPr lang="en-US" dirty="0" err="1"/>
               <a:t>Git</a:t>
             </a:r>
             <a:r>
-              <a:rPr lang="en-US" dirty="0" smtClean="0"/>
+              <a:rPr lang="en-US" dirty="0"/>
               <a:t> is a command line language for version control</a:t>
             </a:r>
           </a:p>
           <a:p>
             <a:r>
-              <a:rPr lang="en-US" dirty="0" err="1" smtClean="0"/>
+              <a:rPr lang="en-US" dirty="0" err="1"/>
               <a:t>Git</a:t>
             </a:r>
             <a:r>
-              <a:rPr lang="en-US" dirty="0" smtClean="0"/>
+              <a:rPr lang="en-US" dirty="0"/>
               <a:t> is running in the background when you use </a:t>
             </a:r>
             <a:r>
-              <a:rPr lang="en-US" dirty="0" err="1" smtClean="0"/>
+              <a:rPr lang="en-US" dirty="0" err="1"/>
               <a:t>Github</a:t>
             </a:r>
             <a:endParaRPr lang="en-US" dirty="0"/>
@@ -3909,20 +3912,19 @@
           </a:lstStyle>
           <a:p>
             <a:r>
-              <a:rPr lang="en-US" dirty="0" err="1" smtClean="0"/>
+              <a:rPr lang="en-US" dirty="0" err="1"/>
               <a:t>Github</a:t>
             </a:r>
             <a:r>
-              <a:rPr lang="en-US" dirty="0" smtClean="0"/>
+              <a:rPr lang="en-US" dirty="0"/>
               <a:t> is a web/desktop interface for version control</a:t>
             </a:r>
           </a:p>
           <a:p>
             <a:r>
-              <a:rPr lang="en-US" dirty="0" smtClean="0"/>
+              <a:rPr lang="en-US" dirty="0"/>
               <a:t>Free hosting service that allows you to work collaboratively online</a:t>
             </a:r>
-            <a:endParaRPr lang="en-US" dirty="0"/>
           </a:p>
         </p:txBody>
       </p:sp>
@@ -4233,23 +4235,23 @@
           </a:lstStyle>
           <a:p>
             <a:r>
-              <a:rPr lang="en-US" dirty="0" smtClean="0"/>
+              <a:rPr lang="en-US" dirty="0"/>
               <a:t>You can use </a:t>
             </a:r>
             <a:r>
-              <a:rPr lang="en-US" dirty="0" err="1" smtClean="0"/>
+              <a:rPr lang="en-US" dirty="0" err="1"/>
               <a:t>Github</a:t>
             </a:r>
             <a:r>
-              <a:rPr lang="en-US" dirty="0" smtClean="0"/>
+              <a:rPr lang="en-US" dirty="0"/>
               <a:t> without knowing </a:t>
             </a:r>
             <a:r>
-              <a:rPr lang="en-US" dirty="0" err="1" smtClean="0"/>
+              <a:rPr lang="en-US" dirty="0" err="1"/>
               <a:t>Git</a:t>
             </a:r>
             <a:r>
-              <a:rPr lang="en-US" dirty="0" smtClean="0"/>
+              <a:rPr lang="en-US" dirty="0"/>
               <a:t> or how to use the command line</a:t>
             </a:r>
           </a:p>
@@ -4257,30 +4259,29 @@
             <a:pPr marL="0" indent="0">
               <a:buNone/>
             </a:pPr>
-            <a:endParaRPr lang="en-US" dirty="0" smtClean="0"/>
-          </a:p>
-          <a:p>
-            <a:r>
-              <a:rPr lang="en-US" dirty="0" smtClean="0"/>
+            <a:endParaRPr lang="en-US" dirty="0"/>
+          </a:p>
+          <a:p>
+            <a:r>
+              <a:rPr lang="en-US" dirty="0"/>
               <a:t>Today we will focus on </a:t>
             </a:r>
             <a:r>
-              <a:rPr lang="en-US" dirty="0" err="1" smtClean="0"/>
+              <a:rPr lang="en-US" dirty="0" err="1"/>
               <a:t>Github</a:t>
             </a:r>
             <a:r>
-              <a:rPr lang="en-US" dirty="0" smtClean="0"/>
+              <a:rPr lang="en-US" dirty="0"/>
               <a:t> and </a:t>
             </a:r>
             <a:r>
-              <a:rPr lang="en-US" dirty="0" err="1" smtClean="0"/>
+              <a:rPr lang="en-US" dirty="0" err="1"/>
               <a:t>Github</a:t>
             </a:r>
             <a:r>
-              <a:rPr lang="en-US" dirty="0" smtClean="0"/>
+              <a:rPr lang="en-US" dirty="0"/>
               <a:t> desktop </a:t>
             </a:r>
-            <a:endParaRPr lang="en-US" dirty="0"/>
           </a:p>
         </p:txBody>
       </p:sp>
@@ -4294,13 +4295,6 @@
   <p:clrMapOvr>
     <a:masterClrMapping/>
   </p:clrMapOvr>
-  <p:timing>
-    <p:tnLst>
-      <p:par>
-        <p:cTn id="1" dur="indefinite" restart="never" nodeType="tmRoot"/>
-      </p:par>
-    </p:tnLst>
-  </p:timing>
 </p:sld>
 </file>
 
@@ -4337,10 +4331,9 @@
           <a:lstStyle/>
           <a:p>
             <a:r>
-              <a:rPr lang="en-US" dirty="0" smtClean="0"/>
+              <a:rPr lang="en-US" dirty="0"/>
               <a:t>The repo (repository)</a:t>
             </a:r>
-            <a:endParaRPr lang="en-US" dirty="0"/>
           </a:p>
         </p:txBody>
       </p:sp>
@@ -4360,23 +4353,23 @@
           <a:lstStyle/>
           <a:p>
             <a:r>
-              <a:rPr lang="en-US" dirty="0" smtClean="0"/>
+              <a:rPr lang="en-US" dirty="0"/>
               <a:t>The home for your project</a:t>
             </a:r>
           </a:p>
           <a:p>
             <a:r>
-              <a:rPr lang="en-US" dirty="0" smtClean="0"/>
+              <a:rPr lang="en-US" dirty="0"/>
               <a:t>All of the files are stored here (including old versions)</a:t>
             </a:r>
           </a:p>
           <a:p>
             <a:r>
-              <a:rPr lang="en-US" dirty="0" smtClean="0"/>
+              <a:rPr lang="en-US" dirty="0"/>
               <a:t>Files in the repo are stored both locally and on </a:t>
             </a:r>
             <a:r>
-              <a:rPr lang="en-US" dirty="0" err="1" smtClean="0"/>
+              <a:rPr lang="en-US" dirty="0" err="1"/>
               <a:t>Github</a:t>
             </a:r>
             <a:endParaRPr lang="en-US" dirty="0"/>
@@ -4393,13 +4386,6 @@
   <p:clrMapOvr>
     <a:masterClrMapping/>
   </p:clrMapOvr>
-  <p:timing>
-    <p:tnLst>
-      <p:par>
-        <p:cTn id="1" dur="indefinite" restart="never" nodeType="tmRoot"/>
-      </p:par>
-    </p:tnLst>
-  </p:timing>
 </p:sld>
 </file>
 
@@ -4436,10 +4422,9 @@
           <a:lstStyle/>
           <a:p>
             <a:r>
-              <a:rPr lang="en-US" dirty="0" smtClean="0"/>
+              <a:rPr lang="en-US" dirty="0"/>
               <a:t>Version control</a:t>
             </a:r>
-            <a:endParaRPr lang="en-US" dirty="0"/>
           </a:p>
         </p:txBody>
       </p:sp>
@@ -4459,38 +4444,21 @@
           <a:lstStyle/>
           <a:p>
             <a:r>
-              <a:rPr lang="en-US" dirty="0" smtClean="0"/>
-              <a:t>Track changes to </a:t>
-            </a:r>
-            <a:r>
-              <a:rPr lang="en-US" dirty="0"/>
-              <a:t>a </a:t>
-            </a:r>
-            <a:r>
-              <a:rPr lang="en-US" dirty="0" smtClean="0"/>
-              <a:t>file</a:t>
-            </a:r>
-          </a:p>
-          <a:p>
-            <a:r>
-              <a:rPr lang="en-US" dirty="0" smtClean="0"/>
-              <a:t>go </a:t>
-            </a:r>
-            <a:r>
-              <a:rPr lang="en-US" dirty="0"/>
-              <a:t>back to previous versions of a </a:t>
-            </a:r>
-            <a:r>
-              <a:rPr lang="en-US" dirty="0" smtClean="0"/>
-              <a:t>file</a:t>
-            </a:r>
-          </a:p>
-          <a:p>
-            <a:r>
-              <a:rPr lang="en-US" dirty="0" smtClean="0"/>
+              <a:rPr lang="en-US" dirty="0"/>
+              <a:t>Track changes to a file</a:t>
+            </a:r>
+          </a:p>
+          <a:p>
+            <a:r>
+              <a:rPr lang="en-US" dirty="0"/>
+              <a:t>go back to previous versions of a file</a:t>
+            </a:r>
+          </a:p>
+          <a:p>
+            <a:r>
+              <a:rPr lang="en-US" dirty="0"/>
               <a:t>Merge/resolve conflicting versions of a file</a:t>
             </a:r>
-            <a:endParaRPr lang="en-US" dirty="0"/>
           </a:p>
         </p:txBody>
       </p:sp>
@@ -4504,13 +4472,6 @@
   <p:clrMapOvr>
     <a:masterClrMapping/>
   </p:clrMapOvr>
-  <p:timing>
-    <p:tnLst>
-      <p:par>
-        <p:cTn id="1" dur="indefinite" restart="never" nodeType="tmRoot"/>
-      </p:par>
-    </p:tnLst>
-  </p:timing>
 </p:sld>
 </file>
 
@@ -4547,10 +4508,9 @@
           <a:lstStyle/>
           <a:p>
             <a:r>
-              <a:rPr lang="en-US" dirty="0" smtClean="0"/>
+              <a:rPr lang="en-US" dirty="0"/>
               <a:t>Commit</a:t>
             </a:r>
-            <a:endParaRPr lang="en-US" dirty="0"/>
           </a:p>
         </p:txBody>
       </p:sp>
@@ -4570,12 +4530,8 @@
           <a:lstStyle/>
           <a:p>
             <a:r>
-              <a:rPr lang="en-US" dirty="0" smtClean="0"/>
-              <a:t>save </a:t>
-            </a:r>
-            <a:r>
-              <a:rPr lang="en-US" dirty="0"/>
-              <a:t>of a version of a file. </a:t>
+              <a:rPr lang="en-US" dirty="0"/>
+              <a:t>save of a version of a file. </a:t>
             </a:r>
           </a:p>
         </p:txBody>
@@ -4650,10 +4606,9 @@
           <a:lstStyle/>
           <a:p>
             <a:r>
-              <a:rPr lang="en-US" dirty="0" smtClean="0"/>
+              <a:rPr lang="en-US" dirty="0"/>
               <a:t>Branch/Merge</a:t>
             </a:r>
-            <a:endParaRPr lang="en-US" dirty="0"/>
           </a:p>
         </p:txBody>
       </p:sp>
@@ -4673,16 +4628,15 @@
           <a:lstStyle/>
           <a:p>
             <a:r>
-              <a:rPr lang="en-US" dirty="0" smtClean="0"/>
+              <a:rPr lang="en-US" dirty="0"/>
               <a:t>Try new things without messing up a project</a:t>
             </a:r>
           </a:p>
           <a:p>
             <a:r>
-              <a:rPr lang="en-US" dirty="0" smtClean="0"/>
+              <a:rPr lang="en-US" dirty="0"/>
               <a:t>Make code better without breaking existing code</a:t>
             </a:r>
-            <a:endParaRPr lang="en-US" dirty="0"/>
           </a:p>
         </p:txBody>
       </p:sp>
@@ -4755,10 +4709,9 @@
           <a:lstStyle/>
           <a:p>
             <a:r>
-              <a:rPr lang="en-US" dirty="0" smtClean="0"/>
+              <a:rPr lang="en-US" dirty="0"/>
               <a:t>Issues</a:t>
             </a:r>
-            <a:endParaRPr lang="en-US" dirty="0"/>
           </a:p>
         </p:txBody>
       </p:sp>
@@ -4783,57 +4736,56 @@
           <a:lstStyle/>
           <a:p>
             <a:r>
-              <a:rPr lang="en-US" dirty="0" smtClean="0"/>
+              <a:rPr lang="en-US" dirty="0"/>
               <a:t>To-do list for the project</a:t>
             </a:r>
           </a:p>
           <a:p>
             <a:pPr lvl="1"/>
             <a:r>
-              <a:rPr lang="en-US" dirty="0" smtClean="0"/>
+              <a:rPr lang="en-US" dirty="0"/>
               <a:t>Bugs that need fixing</a:t>
             </a:r>
           </a:p>
           <a:p>
             <a:pPr lvl="1"/>
             <a:r>
-              <a:rPr lang="en-US" dirty="0" smtClean="0"/>
+              <a:rPr lang="en-US" dirty="0"/>
               <a:t>Tasks needed to be done</a:t>
             </a:r>
           </a:p>
           <a:p>
             <a:pPr lvl="1"/>
             <a:r>
-              <a:rPr lang="en-US" dirty="0" smtClean="0"/>
+              <a:rPr lang="en-US" dirty="0"/>
               <a:t>Future plans</a:t>
             </a:r>
           </a:p>
           <a:p>
             <a:r>
-              <a:rPr lang="en-US" dirty="0" smtClean="0"/>
+              <a:rPr lang="en-US" dirty="0"/>
               <a:t>Can assign issues to</a:t>
             </a:r>
             <a:br>
-              <a:rPr lang="en-US" dirty="0" smtClean="0"/>
+              <a:rPr lang="en-US" dirty="0"/>
             </a:br>
             <a:r>
-              <a:rPr lang="en-US" dirty="0" smtClean="0"/>
+              <a:rPr lang="en-US" dirty="0"/>
               <a:t>collaborators (or yourself)</a:t>
             </a:r>
           </a:p>
           <a:p>
             <a:r>
-              <a:rPr lang="en-US" dirty="0" smtClean="0"/>
+              <a:rPr lang="en-US" dirty="0"/>
               <a:t>Can label issues for certain</a:t>
             </a:r>
             <a:br>
-              <a:rPr lang="en-US" dirty="0" smtClean="0"/>
+              <a:rPr lang="en-US" dirty="0"/>
             </a:br>
             <a:r>
-              <a:rPr lang="en-US" dirty="0" smtClean="0"/>
+              <a:rPr lang="en-US" dirty="0"/>
               <a:t>parts of the project</a:t>
             </a:r>
-            <a:endParaRPr lang="en-US" dirty="0"/>
           </a:p>
         </p:txBody>
       </p:sp>
@@ -4907,10 +4859,9 @@
           <a:lstStyle/>
           <a:p>
             <a:r>
-              <a:rPr lang="en-US" dirty="0" smtClean="0"/>
+              <a:rPr lang="en-US" dirty="0"/>
               <a:t>Forking/Pull requests</a:t>
             </a:r>
-            <a:endParaRPr lang="en-US" dirty="0"/>
           </a:p>
         </p:txBody>
       </p:sp>
@@ -4930,28 +4881,28 @@
           <a:lstStyle/>
           <a:p>
             <a:r>
-              <a:rPr lang="en-US" dirty="0" smtClean="0"/>
+              <a:rPr lang="en-US" dirty="0"/>
               <a:t>Make a copy of a repository</a:t>
             </a:r>
           </a:p>
           <a:p>
             <a:pPr lvl="1"/>
             <a:r>
-              <a:rPr lang="en-US" dirty="0" smtClean="0"/>
+              <a:rPr lang="en-US" dirty="0"/>
               <a:t>Make changes</a:t>
             </a:r>
           </a:p>
           <a:p>
             <a:pPr lvl="1"/>
             <a:r>
-              <a:rPr lang="en-US" dirty="0" smtClean="0"/>
+              <a:rPr lang="en-US" dirty="0"/>
               <a:t>re-deploy as a different project</a:t>
             </a:r>
           </a:p>
           <a:p>
             <a:pPr lvl="1"/>
             <a:r>
-              <a:rPr lang="en-US" dirty="0" smtClean="0"/>
+              <a:rPr lang="en-US" dirty="0"/>
               <a:t>Create a different/better version of the current repo</a:t>
             </a:r>
           </a:p>
@@ -4964,7 +4915,7 @@
               <a:buNone/>
             </a:pPr>
             <a:r>
-              <a:rPr lang="en-US" dirty="0" smtClean="0">
+              <a:rPr lang="en-US" dirty="0">
                 <a:solidFill>
                   <a:srgbClr val="FF0000"/>
                 </a:solidFill>
@@ -4974,7 +4925,7 @@
           </a:p>
           <a:p>
             <a:pPr lvl="1"/>
-            <a:endParaRPr lang="en-US" dirty="0" smtClean="0"/>
+            <a:endParaRPr lang="en-US" dirty="0"/>
           </a:p>
         </p:txBody>
       </p:sp>
@@ -4988,14 +4939,6 @@
   <p:clrMapOvr>
     <a:masterClrMapping/>
   </p:clrMapOvr>
-  <mc:AlternateContent xmlns:mc="http://schemas.openxmlformats.org/markup-compatibility/2006" xmlns:p14="http://schemas.microsoft.com/office/powerpoint/2010/main">
-    <mc:Choice Requires="p14">
-      <p:transition spd="slow" p14:dur="2000"/>
-    </mc:Choice>
-    <mc:Fallback xmlns="">
-      <p:transition spd="slow"/>
-    </mc:Fallback>
-  </mc:AlternateContent>
 </p:sld>
 </file>
 
@@ -5043,11 +4986,11 @@
           <a:lstStyle/>
           <a:p>
             <a:r>
-              <a:rPr lang="en-US" dirty="0" smtClean="0"/>
+              <a:rPr lang="en-US" dirty="0"/>
               <a:t>A few scenarios that sound </a:t>
             </a:r>
             <a:r>
-              <a:rPr lang="en-US" dirty="0" err="1" smtClean="0"/>
+              <a:rPr lang="en-US" dirty="0" err="1"/>
               <a:t>familar</a:t>
             </a:r>
             <a:endParaRPr lang="en-US" dirty="0"/>
@@ -5081,18 +5024,17 @@
           <a:lstStyle/>
           <a:p>
             <a:r>
-              <a:rPr lang="en-US" dirty="0" smtClean="0"/>
+              <a:rPr lang="en-US" dirty="0"/>
               <a:t>Using </a:t>
             </a:r>
             <a:r>
-              <a:rPr lang="en-US" dirty="0" err="1" smtClean="0"/>
+              <a:rPr lang="en-US" dirty="0" err="1"/>
               <a:t>Github</a:t>
             </a:r>
             <a:r>
-              <a:rPr lang="en-US" dirty="0" smtClean="0"/>
+              <a:rPr lang="en-US" dirty="0"/>
               <a:t> for collaboration</a:t>
             </a:r>
-            <a:endParaRPr lang="en-US" dirty="0"/>
           </a:p>
         </p:txBody>
       </p:sp>
@@ -5130,13 +5072,6 @@
   <p:clrMapOvr>
     <a:masterClrMapping/>
   </p:clrMapOvr>
-  <p:timing>
-    <p:tnLst>
-      <p:par>
-        <p:cTn id="1" dur="indefinite" restart="never" nodeType="tmRoot"/>
-      </p:par>
-    </p:tnLst>
-  </p:timing>
 </p:sld>
 </file>
 
@@ -5173,10 +5108,9 @@
           <a:lstStyle/>
           <a:p>
             <a:r>
-              <a:rPr lang="en-US" dirty="0" smtClean="0"/>
+              <a:rPr lang="en-US" dirty="0"/>
               <a:t>Multiple people working on the same files</a:t>
             </a:r>
-            <a:endParaRPr lang="en-US" dirty="0"/>
           </a:p>
         </p:txBody>
       </p:sp>
@@ -5196,10 +5130,9 @@
           <a:lstStyle/>
           <a:p>
             <a:r>
-              <a:rPr lang="en-US" dirty="0" smtClean="0"/>
+              <a:rPr lang="en-US" dirty="0"/>
               <a:t>The multiple conflicting versions monster</a:t>
             </a:r>
-            <a:endParaRPr lang="en-US" dirty="0"/>
           </a:p>
         </p:txBody>
       </p:sp>
@@ -5213,13 +5146,6 @@
   <p:clrMapOvr>
     <a:masterClrMapping/>
   </p:clrMapOvr>
-  <p:timing>
-    <p:tnLst>
-      <p:par>
-        <p:cTn id="1" dur="indefinite" restart="never" nodeType="tmRoot"/>
-      </p:par>
-    </p:tnLst>
-  </p:timing>
 </p:sld>
 </file>
 
@@ -5256,10 +5182,9 @@
           <a:lstStyle/>
           <a:p>
             <a:r>
-              <a:rPr lang="en-US" dirty="0" smtClean="0"/>
+              <a:rPr lang="en-US" dirty="0"/>
               <a:t>Version control and merge conflict resolution</a:t>
             </a:r>
-            <a:endParaRPr lang="en-US" dirty="0"/>
           </a:p>
         </p:txBody>
       </p:sp>
@@ -5457,11 +5382,7 @@
             <a:p>
               <a:r>
                 <a:rPr lang="en-US" dirty="0"/>
-                <a:t>Kent </a:t>
-              </a:r>
-              <a:r>
-                <a:rPr lang="en-US" dirty="0" smtClean="0"/>
-                <a:t>State</a:t>
+                <a:t>Kent State</a:t>
               </a:r>
             </a:p>
             <a:p>
@@ -5582,11 +5503,7 @@
             <a:p>
               <a:r>
                 <a:rPr lang="en-US" dirty="0"/>
-                <a:t>Michigan </a:t>
-              </a:r>
-              <a:r>
-                <a:rPr lang="en-US" dirty="0" smtClean="0"/>
-                <a:t>State</a:t>
+                <a:t>Michigan State</a:t>
               </a:r>
             </a:p>
           </p:txBody>
@@ -5686,13 +5603,6 @@
   <p:clrMapOvr>
     <a:masterClrMapping/>
   </p:clrMapOvr>
-  <p:timing>
-    <p:tnLst>
-      <p:par>
-        <p:cTn id="1" dur="indefinite" restart="never" nodeType="tmRoot"/>
-      </p:par>
-    </p:tnLst>
-  </p:timing>
 </p:sld>
 </file>
 
@@ -5732,13 +5642,8 @@
           <a:p>
             <a:r>
               <a:rPr lang="en-US" dirty="0"/>
-              <a:t>20 tasks to do, 3 people working on the project, and no common to-do </a:t>
-            </a:r>
-            <a:r>
-              <a:rPr lang="en-US" dirty="0" smtClean="0"/>
-              <a:t>list</a:t>
-            </a:r>
-            <a:endParaRPr lang="en-US" dirty="0"/>
+              <a:t>20 tasks to do, 3 people working on the project, and no common to-do list</a:t>
+            </a:r>
           </a:p>
         </p:txBody>
       </p:sp>
@@ -5758,10 +5663,9 @@
           <a:lstStyle/>
           <a:p>
             <a:r>
-              <a:rPr lang="en-US" dirty="0" smtClean="0"/>
+              <a:rPr lang="en-US" dirty="0"/>
               <a:t>Who is doing what?</a:t>
             </a:r>
-            <a:endParaRPr lang="en-US" dirty="0"/>
           </a:p>
         </p:txBody>
       </p:sp>
@@ -6108,13 +6012,6 @@
   <p:clrMapOvr>
     <a:masterClrMapping/>
   </p:clrMapOvr>
-  <p:timing>
-    <p:tnLst>
-      <p:par>
-        <p:cTn id="1" dur="indefinite" restart="never" nodeType="tmRoot"/>
-      </p:par>
-    </p:tnLst>
-  </p:timing>
 </p:sld>
 </file>
 
@@ -6151,10 +6048,9 @@
           <a:lstStyle/>
           <a:p>
             <a:r>
-              <a:rPr lang="en-US" dirty="0" smtClean="0"/>
+              <a:rPr lang="en-US" dirty="0"/>
               <a:t>Using issues</a:t>
             </a:r>
-            <a:endParaRPr lang="en-US" dirty="0"/>
           </a:p>
         </p:txBody>
       </p:sp>
@@ -6224,13 +6120,8 @@
           <a:p>
             <a:r>
               <a:rPr lang="en-US" dirty="0"/>
-              <a:t>T</a:t>
-            </a:r>
-            <a:r>
-              <a:rPr lang="en-US" dirty="0" smtClean="0"/>
-              <a:t>ry something new without messing up your project.</a:t>
-            </a:r>
-            <a:endParaRPr lang="en-US" dirty="0"/>
+              <a:t>Try something new without messing up your project.</a:t>
+            </a:r>
           </a:p>
         </p:txBody>
       </p:sp>
@@ -6299,10 +6190,9 @@
           <a:lstStyle/>
           <a:p>
             <a:r>
-              <a:rPr lang="en-US" dirty="0" smtClean="0"/>
+              <a:rPr lang="en-US" dirty="0"/>
               <a:t>Using branches and merge</a:t>
             </a:r>
-            <a:endParaRPr lang="en-US" dirty="0"/>
           </a:p>
         </p:txBody>
       </p:sp>
@@ -6371,18 +6261,17 @@
           <a:lstStyle/>
           <a:p>
             <a:r>
-              <a:rPr lang="en-US" dirty="0" smtClean="0"/>
+              <a:rPr lang="en-US" dirty="0"/>
               <a:t>What are the pros of </a:t>
             </a:r>
             <a:r>
-              <a:rPr lang="en-US" dirty="0" err="1" smtClean="0"/>
+              <a:rPr lang="en-US" dirty="0" err="1"/>
               <a:t>Github</a:t>
             </a:r>
             <a:r>
-              <a:rPr lang="en-US" dirty="0" smtClean="0"/>
+              <a:rPr lang="en-US" dirty="0"/>
               <a:t>?</a:t>
             </a:r>
-            <a:endParaRPr lang="en-US" dirty="0"/>
           </a:p>
         </p:txBody>
       </p:sp>
@@ -6402,10 +6291,9 @@
           <a:lstStyle/>
           <a:p>
             <a:r>
-              <a:rPr lang="en-US" dirty="0" smtClean="0"/>
+              <a:rPr lang="en-US" dirty="0"/>
               <a:t>Discuss in groups (x minutes)</a:t>
             </a:r>
-            <a:endParaRPr lang="en-US" dirty="0"/>
           </a:p>
         </p:txBody>
       </p:sp>
@@ -6455,18 +6343,17 @@
           <a:lstStyle/>
           <a:p>
             <a:r>
-              <a:rPr lang="en-US" dirty="0" smtClean="0"/>
+              <a:rPr lang="en-US" dirty="0"/>
               <a:t>What are the cons of </a:t>
             </a:r>
             <a:r>
-              <a:rPr lang="en-US" dirty="0" err="1" smtClean="0"/>
+              <a:rPr lang="en-US" dirty="0" err="1"/>
               <a:t>Github</a:t>
             </a:r>
             <a:r>
-              <a:rPr lang="en-US" dirty="0" smtClean="0"/>
+              <a:rPr lang="en-US" dirty="0"/>
               <a:t>?</a:t>
             </a:r>
-            <a:endParaRPr lang="en-US" dirty="0"/>
           </a:p>
         </p:txBody>
       </p:sp>
@@ -6541,10 +6428,9 @@
           <a:lstStyle/>
           <a:p>
             <a:r>
-              <a:rPr lang="en-US" dirty="0" smtClean="0"/>
+              <a:rPr lang="en-US" dirty="0"/>
               <a:t>Resources for learning more</a:t>
             </a:r>
-            <a:endParaRPr lang="en-US" dirty="0"/>
           </a:p>
         </p:txBody>
       </p:sp>
@@ -7090,13 +6976,6 @@
   <p:clrMapOvr>
     <a:masterClrMapping/>
   </p:clrMapOvr>
-  <p:timing>
-    <p:tnLst>
-      <p:par>
-        <p:cTn id="1" dur="indefinite" restart="never" nodeType="tmRoot"/>
-      </p:par>
-    </p:tnLst>
-  </p:timing>
 </p:sld>
 </file>
 
@@ -7163,7 +7042,9 @@
         </p:nvSpPr>
         <p:spPr/>
         <p:txBody>
-          <a:bodyPr/>
+          <a:bodyPr>
+            <a:normAutofit/>
+          </a:bodyPr>
           <a:lstStyle/>
           <a:p>
             <a:pPr marL="0" indent="0">
@@ -7177,20 +7058,32 @@
           </a:p>
           <a:p>
             <a:pPr marL="514350" indent="-514350">
+              <a:buFont typeface="+mj-lt"/>
               <a:buAutoNum type="arabicPeriod"/>
             </a:pPr>
             <a:r>
               <a:rPr lang="en-US" dirty="0"/>
-              <a:t>Blah</a:t>
+              <a:t>What was the goal of the project (e.g., a paper, a novel dataset, a grant proposal, an outreach program, etc.)?</a:t>
             </a:r>
           </a:p>
           <a:p>
             <a:pPr marL="514350" indent="-514350">
+              <a:buFont typeface="+mj-lt"/>
               <a:buAutoNum type="arabicPeriod"/>
             </a:pPr>
             <a:r>
               <a:rPr lang="en-US" dirty="0"/>
-              <a:t>Blah</a:t>
+              <a:t>How many people were involved? What kind of people (e.g., interdisciplinary, different career stages, different technical expertise, etc.)?</a:t>
+            </a:r>
+          </a:p>
+          <a:p>
+            <a:pPr marL="514350" indent="-514350">
+              <a:buFont typeface="+mj-lt"/>
+              <a:buAutoNum type="arabicPeriod"/>
+            </a:pPr>
+            <a:r>
+              <a:rPr lang="en-US" dirty="0"/>
+              <a:t>Was the group based in one location? How long did the collaboration last?</a:t>
             </a:r>
           </a:p>
           <a:p>
@@ -7298,7 +7191,7 @@
             </a:pPr>
             <a:r>
               <a:rPr lang="en-US" dirty="0"/>
-              <a:t>Blah</a:t>
+              <a:t>What tools, resources, or workflows do you consider necessary for a successful collaboration?</a:t>
             </a:r>
           </a:p>
           <a:p>
@@ -7307,7 +7200,7 @@
             </a:pPr>
             <a:r>
               <a:rPr lang="en-US" dirty="0"/>
-              <a:t>Blah</a:t>
+              <a:t>What can be done to more easily facilitate the use of these tools throughout a project’s lifecycle?</a:t>
             </a:r>
           </a:p>
           <a:p>
@@ -7474,32 +7367,56 @@
           <a:bodyPr/>
           <a:lstStyle/>
           <a:p>
+            <a:r>
+              <a:rPr lang="en-US" dirty="0"/>
+              <a:t>What Consensus Is</a:t>
+            </a:r>
+          </a:p>
+        </p:txBody>
+      </p:sp>
+      <p:sp>
+        <p:nvSpPr>
+          <p:cNvPr id="3" name="Content Placeholder 2">
+            <a:extLst>
+              <a:ext uri="{FF2B5EF4-FFF2-40B4-BE49-F238E27FC236}">
+                <a16:creationId xmlns:a16="http://schemas.microsoft.com/office/drawing/2014/main" id="{62C8C4C7-120E-4230-8E60-B64F8C51C634}"/>
+              </a:ext>
+            </a:extLst>
+          </p:cNvPr>
+          <p:cNvSpPr>
+            <a:spLocks noGrp="1"/>
+          </p:cNvSpPr>
+          <p:nvPr>
+            <p:ph idx="1"/>
+          </p:nvPr>
+        </p:nvSpPr>
+        <p:spPr/>
+        <p:txBody>
+          <a:bodyPr/>
+          <a:lstStyle/>
+          <a:p>
+            <a:r>
+              <a:rPr lang="en-US" dirty="0"/>
+              <a:t>Everyone’s opinions are heard and encouraged</a:t>
+            </a:r>
+          </a:p>
+          <a:p>
             <a:endParaRPr lang="en-US" dirty="0"/>
           </a:p>
-        </p:txBody>
-      </p:sp>
-      <p:sp>
-        <p:nvSpPr>
-          <p:cNvPr id="3" name="Content Placeholder 2">
-            <a:extLst>
-              <a:ext uri="{FF2B5EF4-FFF2-40B4-BE49-F238E27FC236}">
-                <a16:creationId xmlns:a16="http://schemas.microsoft.com/office/drawing/2014/main" id="{62C8C4C7-120E-4230-8E60-B64F8C51C634}"/>
-              </a:ext>
-            </a:extLst>
-          </p:cNvPr>
-          <p:cNvSpPr>
-            <a:spLocks noGrp="1"/>
-          </p:cNvSpPr>
-          <p:nvPr>
-            <p:ph idx="1"/>
-          </p:nvPr>
-        </p:nvSpPr>
-        <p:spPr/>
-        <p:txBody>
-          <a:bodyPr/>
-          <a:lstStyle/>
+          <a:p>
+            <a:r>
+              <a:rPr lang="en-US" dirty="0"/>
+              <a:t>Differences viewed as helpful, chances to learn more</a:t>
+            </a:r>
+          </a:p>
           <a:p>
             <a:endParaRPr lang="en-US" dirty="0"/>
+          </a:p>
+          <a:p>
+            <a:r>
+              <a:rPr lang="en-US" dirty="0"/>
+              <a:t>Everyone can understand the result and how it was reached</a:t>
+            </a:r>
           </a:p>
         </p:txBody>
       </p:sp>
@@ -7507,6 +7424,222 @@
     <p:extLst>
       <p:ext uri="{BB962C8B-B14F-4D97-AF65-F5344CB8AC3E}">
         <p14:creationId xmlns:p14="http://schemas.microsoft.com/office/powerpoint/2010/main" val="3269339386"/>
+      </p:ext>
+    </p:extLst>
+  </p:cSld>
+  <p:clrMapOvr>
+    <a:masterClrMapping/>
+  </p:clrMapOvr>
+</p:sld>
+</file>
+
+<file path=ppt/slides/slide34.xml><?xml version="1.0" encoding="utf-8"?>
+<p:sld xmlns:a="http://schemas.openxmlformats.org/drawingml/2006/main" xmlns:r="http://schemas.openxmlformats.org/officeDocument/2006/relationships" xmlns:p="http://schemas.openxmlformats.org/presentationml/2006/main">
+  <p:cSld>
+    <p:spTree>
+      <p:nvGrpSpPr>
+        <p:cNvPr id="1" name=""/>
+        <p:cNvGrpSpPr/>
+        <p:nvPr/>
+      </p:nvGrpSpPr>
+      <p:grpSpPr>
+        <a:xfrm>
+          <a:off x="0" y="0"/>
+          <a:ext cx="0" cy="0"/>
+          <a:chOff x="0" y="0"/>
+          <a:chExt cx="0" cy="0"/>
+        </a:xfrm>
+      </p:grpSpPr>
+      <p:sp>
+        <p:nvSpPr>
+          <p:cNvPr id="2" name="Title 1">
+            <a:extLst>
+              <a:ext uri="{FF2B5EF4-FFF2-40B4-BE49-F238E27FC236}">
+                <a16:creationId xmlns:a16="http://schemas.microsoft.com/office/drawing/2014/main" id="{FCA70632-4B1A-4E6A-974B-3AD2013F76EB}"/>
+              </a:ext>
+            </a:extLst>
+          </p:cNvPr>
+          <p:cNvSpPr>
+            <a:spLocks noGrp="1"/>
+          </p:cNvSpPr>
+          <p:nvPr>
+            <p:ph type="title"/>
+          </p:nvPr>
+        </p:nvSpPr>
+        <p:spPr/>
+        <p:txBody>
+          <a:bodyPr/>
+          <a:lstStyle/>
+          <a:p>
+            <a:r>
+              <a:rPr lang="en-US" dirty="0"/>
+              <a:t>What Consensus Is Not</a:t>
+            </a:r>
+          </a:p>
+        </p:txBody>
+      </p:sp>
+      <p:sp>
+        <p:nvSpPr>
+          <p:cNvPr id="3" name="Content Placeholder 2">
+            <a:extLst>
+              <a:ext uri="{FF2B5EF4-FFF2-40B4-BE49-F238E27FC236}">
+                <a16:creationId xmlns:a16="http://schemas.microsoft.com/office/drawing/2014/main" id="{1D1EACA7-1198-47A0-980E-5B8568AA18B3}"/>
+              </a:ext>
+            </a:extLst>
+          </p:cNvPr>
+          <p:cNvSpPr>
+            <a:spLocks noGrp="1"/>
+          </p:cNvSpPr>
+          <p:nvPr>
+            <p:ph idx="1"/>
+          </p:nvPr>
+        </p:nvSpPr>
+        <p:spPr/>
+        <p:txBody>
+          <a:bodyPr/>
+          <a:lstStyle/>
+          <a:p>
+            <a:r>
+              <a:rPr lang="en-US" dirty="0"/>
+              <a:t>Unanimous agreement on end product</a:t>
+            </a:r>
+          </a:p>
+          <a:p>
+            <a:endParaRPr lang="en-US" dirty="0"/>
+          </a:p>
+          <a:p>
+            <a:r>
+              <a:rPr lang="en-US" dirty="0"/>
+              <a:t>Conflict is avoided, ignored</a:t>
+            </a:r>
+          </a:p>
+          <a:p>
+            <a:endParaRPr lang="en-US" dirty="0"/>
+          </a:p>
+          <a:p>
+            <a:r>
+              <a:rPr lang="en-US" dirty="0"/>
+              <a:t>Result is everyone's first choice</a:t>
+            </a:r>
+          </a:p>
+        </p:txBody>
+      </p:sp>
+    </p:spTree>
+    <p:extLst>
+      <p:ext uri="{BB962C8B-B14F-4D97-AF65-F5344CB8AC3E}">
+        <p14:creationId xmlns:p14="http://schemas.microsoft.com/office/powerpoint/2010/main" val="3692428149"/>
+      </p:ext>
+    </p:extLst>
+  </p:cSld>
+  <p:clrMapOvr>
+    <a:masterClrMapping/>
+  </p:clrMapOvr>
+</p:sld>
+</file>
+
+<file path=ppt/slides/slide35.xml><?xml version="1.0" encoding="utf-8"?>
+<p:sld xmlns:a="http://schemas.openxmlformats.org/drawingml/2006/main" xmlns:r="http://schemas.openxmlformats.org/officeDocument/2006/relationships" xmlns:p="http://schemas.openxmlformats.org/presentationml/2006/main">
+  <p:cSld>
+    <p:spTree>
+      <p:nvGrpSpPr>
+        <p:cNvPr id="1" name=""/>
+        <p:cNvGrpSpPr/>
+        <p:nvPr/>
+      </p:nvGrpSpPr>
+      <p:grpSpPr>
+        <a:xfrm>
+          <a:off x="0" y="0"/>
+          <a:ext cx="0" cy="0"/>
+          <a:chOff x="0" y="0"/>
+          <a:chExt cx="0" cy="0"/>
+        </a:xfrm>
+      </p:grpSpPr>
+      <p:sp>
+        <p:nvSpPr>
+          <p:cNvPr id="2" name="Title 1">
+            <a:extLst>
+              <a:ext uri="{FF2B5EF4-FFF2-40B4-BE49-F238E27FC236}">
+                <a16:creationId xmlns:a16="http://schemas.microsoft.com/office/drawing/2014/main" id="{E57A859E-B88A-46A3-9E68-55EFF37EEE72}"/>
+              </a:ext>
+            </a:extLst>
+          </p:cNvPr>
+          <p:cNvSpPr>
+            <a:spLocks noGrp="1"/>
+          </p:cNvSpPr>
+          <p:nvPr>
+            <p:ph type="title"/>
+          </p:nvPr>
+        </p:nvSpPr>
+        <p:spPr/>
+        <p:txBody>
+          <a:bodyPr/>
+          <a:lstStyle/>
+          <a:p>
+            <a:r>
+              <a:rPr lang="en-US" dirty="0"/>
+              <a:t>Consensus Process</a:t>
+            </a:r>
+          </a:p>
+        </p:txBody>
+      </p:sp>
+      <p:sp>
+        <p:nvSpPr>
+          <p:cNvPr id="3" name="Content Placeholder 2">
+            <a:extLst>
+              <a:ext uri="{FF2B5EF4-FFF2-40B4-BE49-F238E27FC236}">
+                <a16:creationId xmlns:a16="http://schemas.microsoft.com/office/drawing/2014/main" id="{972F0E65-6C7E-4E1C-9BA0-A14525CC6445}"/>
+              </a:ext>
+            </a:extLst>
+          </p:cNvPr>
+          <p:cNvSpPr>
+            <a:spLocks noGrp="1"/>
+          </p:cNvSpPr>
+          <p:nvPr>
+            <p:ph idx="1"/>
+          </p:nvPr>
+        </p:nvSpPr>
+        <p:spPr/>
+        <p:txBody>
+          <a:bodyPr/>
+          <a:lstStyle/>
+          <a:p>
+            <a:pPr marL="0" indent="0">
+              <a:buNone/>
+            </a:pPr>
+            <a:r>
+              <a:rPr lang="en-US" b="1" dirty="0"/>
+              <a:t>Stage 1: </a:t>
+            </a:r>
+            <a:r>
+              <a:rPr lang="en-US" dirty="0"/>
+              <a:t>Share ideas</a:t>
+            </a:r>
+          </a:p>
+          <a:p>
+            <a:pPr marL="0" indent="0">
+              <a:buNone/>
+            </a:pPr>
+            <a:endParaRPr lang="en-US" b="1" dirty="0"/>
+          </a:p>
+          <a:p>
+            <a:pPr marL="0" indent="0">
+              <a:buNone/>
+            </a:pPr>
+            <a:r>
+              <a:rPr lang="en-US" b="1" dirty="0"/>
+              <a:t>Stage 2:</a:t>
+            </a:r>
+            <a:r>
+              <a:rPr lang="en-US" dirty="0"/>
+              <a:t> Review ideas</a:t>
+            </a:r>
+          </a:p>
+        </p:txBody>
+      </p:sp>
+    </p:spTree>
+    <p:extLst>
+      <p:ext uri="{BB962C8B-B14F-4D97-AF65-F5344CB8AC3E}">
+        <p14:creationId xmlns:p14="http://schemas.microsoft.com/office/powerpoint/2010/main" val="1766099802"/>
       </p:ext>
     </p:extLst>
   </p:cSld>
@@ -8120,13 +8253,6 @@
   <p:clrMapOvr>
     <a:masterClrMapping/>
   </p:clrMapOvr>
-  <p:timing>
-    <p:tnLst>
-      <p:par>
-        <p:cTn id="1" dur="indefinite" restart="never" nodeType="tmRoot"/>
-      </p:par>
-    </p:tnLst>
-  </p:timing>
 </p:sld>
 </file>
 
@@ -8163,26 +8289,25 @@
           <a:lstStyle/>
           <a:p>
             <a:r>
-              <a:rPr lang="en-US" dirty="0" smtClean="0"/>
+              <a:rPr lang="en-US" dirty="0"/>
               <a:t>What is </a:t>
             </a:r>
             <a:r>
-              <a:rPr lang="en-US" dirty="0" err="1" smtClean="0"/>
+              <a:rPr lang="en-US" dirty="0" err="1"/>
               <a:t>Git</a:t>
             </a:r>
             <a:r>
-              <a:rPr lang="en-US" dirty="0" smtClean="0"/>
+              <a:rPr lang="en-US" dirty="0"/>
               <a:t>/ </a:t>
             </a:r>
             <a:r>
-              <a:rPr lang="en-US" dirty="0" err="1" smtClean="0"/>
+              <a:rPr lang="en-US" dirty="0" err="1"/>
               <a:t>Github</a:t>
             </a:r>
             <a:r>
-              <a:rPr lang="en-US" dirty="0" smtClean="0"/>
+              <a:rPr lang="en-US" dirty="0"/>
               <a:t>?</a:t>
             </a:r>
-            <a:endParaRPr lang="en-US" dirty="0"/>
           </a:p>
         </p:txBody>
       </p:sp>
@@ -8207,25 +8332,25 @@
           <a:lstStyle/>
           <a:p>
             <a:r>
-              <a:rPr lang="en-US" dirty="0" err="1" smtClean="0"/>
+              <a:rPr lang="en-US" dirty="0" err="1"/>
               <a:t>Git</a:t>
             </a:r>
             <a:r>
-              <a:rPr lang="en-US" dirty="0" smtClean="0"/>
+              <a:rPr lang="en-US" dirty="0"/>
               <a:t> is a command line language for version control</a:t>
             </a:r>
           </a:p>
           <a:p>
             <a:r>
-              <a:rPr lang="en-US" dirty="0" err="1" smtClean="0"/>
+              <a:rPr lang="en-US" dirty="0" err="1"/>
               <a:t>Git</a:t>
             </a:r>
             <a:r>
-              <a:rPr lang="en-US" dirty="0" smtClean="0"/>
+              <a:rPr lang="en-US" dirty="0"/>
               <a:t> is running in the background when you use </a:t>
             </a:r>
             <a:r>
-              <a:rPr lang="en-US" dirty="0" err="1" smtClean="0"/>
+              <a:rPr lang="en-US" dirty="0" err="1"/>
               <a:t>Github</a:t>
             </a:r>
             <a:endParaRPr lang="en-US" dirty="0"/>
@@ -8419,20 +8544,19 @@
           </a:lstStyle>
           <a:p>
             <a:r>
-              <a:rPr lang="en-US" dirty="0" err="1" smtClean="0"/>
+              <a:rPr lang="en-US" dirty="0" err="1"/>
               <a:t>Github</a:t>
             </a:r>
             <a:r>
-              <a:rPr lang="en-US" dirty="0" smtClean="0"/>
+              <a:rPr lang="en-US" dirty="0"/>
               <a:t> is a web/desktop interface for version control</a:t>
             </a:r>
           </a:p>
           <a:p>
             <a:r>
-              <a:rPr lang="en-US" dirty="0" smtClean="0"/>
+              <a:rPr lang="en-US" dirty="0"/>
               <a:t>Free hosting service that allows you to work collaboratively online</a:t>
             </a:r>
-            <a:endParaRPr lang="en-US" dirty="0"/>
           </a:p>
         </p:txBody>
       </p:sp>
@@ -8516,13 +8640,6 @@
   <p:clrMapOvr>
     <a:masterClrMapping/>
   </p:clrMapOvr>
-  <p:timing>
-    <p:tnLst>
-      <p:par>
-        <p:cTn id="1" dur="indefinite" restart="never" nodeType="tmRoot"/>
-      </p:par>
-    </p:tnLst>
-  </p:timing>
 </p:sld>
 </file>
 

</xml_diff>